<commit_message>
Niet werkende versie neergezet
</commit_message>
<xml_diff>
--- a/Fruitvliegen_Presentatie.pptx
+++ b/Fruitvliegen_Presentatie.pptx
@@ -19,7 +19,8 @@
     <p:sldId id="262" r:id="rId13"/>
     <p:sldId id="263" r:id="rId14"/>
     <p:sldId id="272" r:id="rId15"/>
-    <p:sldId id="270" r:id="rId16"/>
+    <p:sldId id="275" r:id="rId16"/>
+    <p:sldId id="270" r:id="rId17"/>
   </p:sldIdLst>
   <p:sldSz cx="9144000" cy="6858000" type="screen4x3"/>
   <p:notesSz cx="6858000" cy="9144000"/>
@@ -6159,8 +6160,13 @@
           <a:p>
             <a:r>
               <a:rPr lang="nl-NL" dirty="0" smtClean="0"/>
-              <a:t>Weinig aaneengesloten getallen: dus meer elementen</a:t>
-            </a:r>
+              <a:t>Weinig aaneengesloten getallen: dus meer </a:t>
+            </a:r>
+            <a:r>
+              <a:rPr lang="nl-NL" dirty="0" smtClean="0"/>
+              <a:t>elementen</a:t>
+            </a:r>
+            <a:endParaRPr lang="nl-NL" dirty="0" smtClean="0"/>
           </a:p>
           <a:p>
             <a:endParaRPr lang="nl-NL" dirty="0"/>
@@ -6207,6 +6213,2275 @@
           <a:chExt cx="0" cy="0"/>
         </a:xfrm>
       </p:grpSpPr>
+      <p:graphicFrame>
+        <p:nvGraphicFramePr>
+          <p:cNvPr id="4" name="Table 3"/>
+          <p:cNvGraphicFramePr>
+            <a:graphicFrameLocks noGrp="1"/>
+          </p:cNvGraphicFramePr>
+          <p:nvPr>
+            <p:extLst>
+              <p:ext uri="{D42A27DB-BD31-4B8C-83A1-F6EECF244321}">
+                <p14:modId xmlns:p14="http://schemas.microsoft.com/office/powerpoint/2010/main" val="192629263"/>
+              </p:ext>
+            </p:extLst>
+          </p:nvPr>
+        </p:nvGraphicFramePr>
+        <p:xfrm>
+          <a:off x="457200" y="1905000"/>
+          <a:ext cx="7086600" cy="3276597"/>
+        </p:xfrm>
+        <a:graphic>
+          <a:graphicData uri="http://schemas.openxmlformats.org/drawingml/2006/table">
+            <a:tbl>
+              <a:tblPr firstRow="1" firstCol="1" bandRow="1">
+                <a:tableStyleId>{5C22544A-7EE6-4342-B048-85BDC9FD1C3A}</a:tableStyleId>
+              </a:tblPr>
+              <a:tblGrid>
+                <a:gridCol w="1351687"/>
+                <a:gridCol w="767045"/>
+                <a:gridCol w="790143"/>
+                <a:gridCol w="677835"/>
+                <a:gridCol w="665887"/>
+                <a:gridCol w="700934"/>
+                <a:gridCol w="778196"/>
+                <a:gridCol w="677038"/>
+                <a:gridCol w="677835"/>
+              </a:tblGrid>
+              <a:tr h="537924">
+                <a:tc>
+                  <a:txBody>
+                    <a:bodyPr/>
+                    <a:lstStyle/>
+                    <a:p>
+                      <a:pPr>
+                        <a:lnSpc>
+                          <a:spcPct val="115000"/>
+                        </a:lnSpc>
+                        <a:spcAft>
+                          <a:spcPts val="0"/>
+                        </a:spcAft>
+                      </a:pPr>
+                      <a:r>
+                        <a:rPr lang="nl-NL" sz="1200" baseline="-25000" dirty="0">
+                          <a:effectLst/>
+                        </a:rPr>
+                        <a:t> </a:t>
+                      </a:r>
+                      <a:endParaRPr lang="nl-NL" sz="1100" dirty="0">
+                        <a:effectLst/>
+                        <a:latin typeface="Calibri"/>
+                        <a:ea typeface="Calibri"/>
+                        <a:cs typeface="Times New Roman"/>
+                      </a:endParaRPr>
+                    </a:p>
+                  </a:txBody>
+                  <a:tcPr marL="68580" marR="68580" marT="0" marB="0"/>
+                </a:tc>
+                <a:tc>
+                  <a:txBody>
+                    <a:bodyPr/>
+                    <a:lstStyle/>
+                    <a:p>
+                      <a:pPr>
+                        <a:lnSpc>
+                          <a:spcPct val="115000"/>
+                        </a:lnSpc>
+                        <a:spcAft>
+                          <a:spcPts val="0"/>
+                        </a:spcAft>
+                      </a:pPr>
+                      <a:r>
+                        <a:rPr lang="nl-NL" sz="800" dirty="0">
+                          <a:effectLst/>
+                        </a:rPr>
+                        <a:t>Grootte</a:t>
+                      </a:r>
+                      <a:endParaRPr lang="nl-NL" sz="1100" dirty="0">
+                        <a:effectLst/>
+                      </a:endParaRPr>
+                    </a:p>
+                    <a:p>
+                      <a:pPr>
+                        <a:lnSpc>
+                          <a:spcPct val="115000"/>
+                        </a:lnSpc>
+                        <a:spcAft>
+                          <a:spcPts val="0"/>
+                        </a:spcAft>
+                      </a:pPr>
+                      <a:r>
+                        <a:rPr lang="nl-NL" sz="800" dirty="0">
+                          <a:effectLst/>
+                        </a:rPr>
+                        <a:t>inversies</a:t>
+                      </a:r>
+                      <a:endParaRPr lang="nl-NL" sz="1100" dirty="0">
+                        <a:effectLst/>
+                        <a:latin typeface="Calibri"/>
+                        <a:ea typeface="Calibri"/>
+                        <a:cs typeface="Times New Roman"/>
+                      </a:endParaRPr>
+                    </a:p>
+                  </a:txBody>
+                  <a:tcPr marL="68580" marR="68580" marT="0" marB="0"/>
+                </a:tc>
+                <a:tc>
+                  <a:txBody>
+                    <a:bodyPr/>
+                    <a:lstStyle/>
+                    <a:p>
+                      <a:pPr>
+                        <a:lnSpc>
+                          <a:spcPct val="115000"/>
+                        </a:lnSpc>
+                        <a:spcAft>
+                          <a:spcPts val="0"/>
+                        </a:spcAft>
+                      </a:pPr>
+                      <a:r>
+                        <a:rPr lang="nl-NL" sz="800">
+                          <a:effectLst/>
+                        </a:rPr>
+                        <a:t>Aantal genen </a:t>
+                      </a:r>
+                      <a:endParaRPr lang="nl-NL" sz="1100">
+                        <a:effectLst/>
+                        <a:latin typeface="Calibri"/>
+                        <a:ea typeface="Calibri"/>
+                        <a:cs typeface="Times New Roman"/>
+                      </a:endParaRPr>
+                    </a:p>
+                  </a:txBody>
+                  <a:tcPr marL="68580" marR="68580" marT="0" marB="0"/>
+                </a:tc>
+                <a:tc>
+                  <a:txBody>
+                    <a:bodyPr/>
+                    <a:lstStyle/>
+                    <a:p>
+                      <a:pPr>
+                        <a:lnSpc>
+                          <a:spcPct val="115000"/>
+                        </a:lnSpc>
+                        <a:spcAft>
+                          <a:spcPts val="0"/>
+                        </a:spcAft>
+                      </a:pPr>
+                      <a:r>
+                        <a:rPr lang="en-US" sz="800">
+                          <a:effectLst/>
+                        </a:rPr>
+                        <a:t>Min. genen</a:t>
+                      </a:r>
+                      <a:endParaRPr lang="nl-NL" sz="1100">
+                        <a:effectLst/>
+                        <a:latin typeface="Calibri"/>
+                        <a:ea typeface="Calibri"/>
+                        <a:cs typeface="Times New Roman"/>
+                      </a:endParaRPr>
+                    </a:p>
+                  </a:txBody>
+                  <a:tcPr marL="68580" marR="68580" marT="0" marB="0"/>
+                </a:tc>
+                <a:tc>
+                  <a:txBody>
+                    <a:bodyPr/>
+                    <a:lstStyle/>
+                    <a:p>
+                      <a:pPr>
+                        <a:lnSpc>
+                          <a:spcPct val="115000"/>
+                        </a:lnSpc>
+                        <a:spcAft>
+                          <a:spcPts val="0"/>
+                        </a:spcAft>
+                      </a:pPr>
+                      <a:r>
+                        <a:rPr lang="en-US" sz="800" dirty="0">
+                          <a:effectLst/>
+                        </a:rPr>
+                        <a:t>Max. genen</a:t>
+                      </a:r>
+                      <a:endParaRPr lang="nl-NL" sz="1100" dirty="0">
+                        <a:effectLst/>
+                        <a:latin typeface="Calibri"/>
+                        <a:ea typeface="Calibri"/>
+                        <a:cs typeface="Times New Roman"/>
+                      </a:endParaRPr>
+                    </a:p>
+                  </a:txBody>
+                  <a:tcPr marL="68580" marR="68580" marT="0" marB="0"/>
+                </a:tc>
+                <a:tc>
+                  <a:txBody>
+                    <a:bodyPr/>
+                    <a:lstStyle/>
+                    <a:p>
+                      <a:pPr>
+                        <a:lnSpc>
+                          <a:spcPct val="115000"/>
+                        </a:lnSpc>
+                        <a:spcAft>
+                          <a:spcPts val="0"/>
+                        </a:spcAft>
+                      </a:pPr>
+                      <a:r>
+                        <a:rPr lang="nl-NL" sz="800" dirty="0">
+                          <a:effectLst/>
+                        </a:rPr>
+                        <a:t>Grootte</a:t>
+                      </a:r>
+                      <a:endParaRPr lang="nl-NL" sz="1100" dirty="0">
+                        <a:effectLst/>
+                      </a:endParaRPr>
+                    </a:p>
+                    <a:p>
+                      <a:pPr>
+                        <a:lnSpc>
+                          <a:spcPct val="115000"/>
+                        </a:lnSpc>
+                        <a:spcAft>
+                          <a:spcPts val="0"/>
+                        </a:spcAft>
+                      </a:pPr>
+                      <a:r>
+                        <a:rPr lang="nl-NL" sz="800" dirty="0" smtClean="0">
+                          <a:effectLst/>
+                        </a:rPr>
+                        <a:t>Inversies</a:t>
+                      </a:r>
+                      <a:endParaRPr lang="nl-NL" sz="1100" dirty="0">
+                        <a:effectLst/>
+                        <a:latin typeface="Calibri"/>
+                        <a:ea typeface="Calibri"/>
+                        <a:cs typeface="Times New Roman"/>
+                      </a:endParaRPr>
+                    </a:p>
+                  </a:txBody>
+                  <a:tcPr marL="68580" marR="68580" marT="0" marB="0">
+                    <a:solidFill>
+                      <a:schemeClr val="bg1">
+                        <a:lumMod val="65000"/>
+                      </a:schemeClr>
+                    </a:solidFill>
+                  </a:tcPr>
+                </a:tc>
+                <a:tc>
+                  <a:txBody>
+                    <a:bodyPr/>
+                    <a:lstStyle/>
+                    <a:p>
+                      <a:pPr>
+                        <a:lnSpc>
+                          <a:spcPct val="115000"/>
+                        </a:lnSpc>
+                        <a:spcAft>
+                          <a:spcPts val="0"/>
+                        </a:spcAft>
+                      </a:pPr>
+                      <a:r>
+                        <a:rPr lang="nl-NL" sz="800" dirty="0">
+                          <a:effectLst/>
+                        </a:rPr>
+                        <a:t>Aantal genen</a:t>
+                      </a:r>
+                      <a:endParaRPr lang="nl-NL" sz="1100" dirty="0">
+                        <a:effectLst/>
+                        <a:latin typeface="Calibri"/>
+                        <a:ea typeface="Calibri"/>
+                        <a:cs typeface="Times New Roman"/>
+                      </a:endParaRPr>
+                    </a:p>
+                  </a:txBody>
+                  <a:tcPr marL="68580" marR="68580" marT="0" marB="0">
+                    <a:solidFill>
+                      <a:schemeClr val="bg1">
+                        <a:lumMod val="65000"/>
+                      </a:schemeClr>
+                    </a:solidFill>
+                  </a:tcPr>
+                </a:tc>
+                <a:tc>
+                  <a:txBody>
+                    <a:bodyPr/>
+                    <a:lstStyle/>
+                    <a:p>
+                      <a:pPr>
+                        <a:lnSpc>
+                          <a:spcPct val="115000"/>
+                        </a:lnSpc>
+                        <a:spcAft>
+                          <a:spcPts val="0"/>
+                        </a:spcAft>
+                      </a:pPr>
+                      <a:r>
+                        <a:rPr lang="en-US" sz="800" dirty="0">
+                          <a:effectLst/>
+                        </a:rPr>
+                        <a:t>Min. genen</a:t>
+                      </a:r>
+                      <a:endParaRPr lang="nl-NL" sz="1100" dirty="0">
+                        <a:effectLst/>
+                        <a:latin typeface="Calibri"/>
+                        <a:ea typeface="Calibri"/>
+                        <a:cs typeface="Times New Roman"/>
+                      </a:endParaRPr>
+                    </a:p>
+                  </a:txBody>
+                  <a:tcPr marL="68580" marR="68580" marT="0" marB="0">
+                    <a:solidFill>
+                      <a:schemeClr val="bg1">
+                        <a:lumMod val="65000"/>
+                      </a:schemeClr>
+                    </a:solidFill>
+                  </a:tcPr>
+                </a:tc>
+                <a:tc>
+                  <a:txBody>
+                    <a:bodyPr/>
+                    <a:lstStyle/>
+                    <a:p>
+                      <a:pPr>
+                        <a:lnSpc>
+                          <a:spcPct val="115000"/>
+                        </a:lnSpc>
+                        <a:spcAft>
+                          <a:spcPts val="0"/>
+                        </a:spcAft>
+                      </a:pPr>
+                      <a:r>
+                        <a:rPr lang="en-US" sz="800" dirty="0">
+                          <a:effectLst/>
+                        </a:rPr>
+                        <a:t>Max. genen</a:t>
+                      </a:r>
+                      <a:endParaRPr lang="nl-NL" sz="1100" dirty="0">
+                        <a:effectLst/>
+                        <a:latin typeface="Calibri"/>
+                        <a:ea typeface="Calibri"/>
+                        <a:cs typeface="Times New Roman"/>
+                      </a:endParaRPr>
+                    </a:p>
+                  </a:txBody>
+                  <a:tcPr marL="68580" marR="68580" marT="0" marB="0">
+                    <a:solidFill>
+                      <a:schemeClr val="bg1">
+                        <a:lumMod val="65000"/>
+                      </a:schemeClr>
+                    </a:solidFill>
+                  </a:tcPr>
+                </a:tc>
+              </a:tr>
+              <a:tr h="391239">
+                <a:tc>
+                  <a:txBody>
+                    <a:bodyPr/>
+                    <a:lstStyle/>
+                    <a:p>
+                      <a:pPr>
+                        <a:lnSpc>
+                          <a:spcPct val="115000"/>
+                        </a:lnSpc>
+                        <a:spcAft>
+                          <a:spcPts val="0"/>
+                        </a:spcAft>
+                      </a:pPr>
+                      <a:r>
+                        <a:rPr lang="en-US" sz="1200" baseline="-25000" dirty="0">
+                          <a:effectLst/>
+                        </a:rPr>
+                        <a:t>Find&amp;Swap</a:t>
+                      </a:r>
+                      <a:endParaRPr lang="nl-NL" sz="1100" dirty="0">
+                        <a:effectLst/>
+                        <a:latin typeface="Calibri"/>
+                        <a:ea typeface="Calibri"/>
+                        <a:cs typeface="Times New Roman"/>
+                      </a:endParaRPr>
+                    </a:p>
+                  </a:txBody>
+                  <a:tcPr marL="68580" marR="68580" marT="0" marB="0">
+                    <a:solidFill>
+                      <a:srgbClr val="D52525"/>
+                    </a:solidFill>
+                  </a:tcPr>
+                </a:tc>
+                <a:tc>
+                  <a:txBody>
+                    <a:bodyPr/>
+                    <a:lstStyle/>
+                    <a:p>
+                      <a:pPr>
+                        <a:lnSpc>
+                          <a:spcPct val="115000"/>
+                        </a:lnSpc>
+                        <a:spcAft>
+                          <a:spcPts val="0"/>
+                        </a:spcAft>
+                      </a:pPr>
+                      <a:r>
+                        <a:rPr lang="en-US" sz="1200" baseline="-25000" dirty="0">
+                          <a:effectLst/>
+                        </a:rPr>
+                        <a:t>7,60</a:t>
+                      </a:r>
+                      <a:endParaRPr lang="nl-NL" sz="1100" dirty="0">
+                        <a:effectLst/>
+                        <a:latin typeface="Calibri"/>
+                        <a:ea typeface="Calibri"/>
+                        <a:cs typeface="Times New Roman"/>
+                      </a:endParaRPr>
+                    </a:p>
+                  </a:txBody>
+                  <a:tcPr marL="68580" marR="68580" marT="0" marB="0"/>
+                </a:tc>
+                <a:tc>
+                  <a:txBody>
+                    <a:bodyPr/>
+                    <a:lstStyle/>
+                    <a:p>
+                      <a:pPr>
+                        <a:lnSpc>
+                          <a:spcPct val="115000"/>
+                        </a:lnSpc>
+                        <a:spcAft>
+                          <a:spcPts val="0"/>
+                        </a:spcAft>
+                      </a:pPr>
+                      <a:r>
+                        <a:rPr lang="en-US" sz="1200" baseline="-25000">
+                          <a:effectLst/>
+                        </a:rPr>
+                        <a:t>170,59</a:t>
+                      </a:r>
+                      <a:endParaRPr lang="nl-NL" sz="1100">
+                        <a:effectLst/>
+                        <a:latin typeface="Calibri"/>
+                        <a:ea typeface="Calibri"/>
+                        <a:cs typeface="Times New Roman"/>
+                      </a:endParaRPr>
+                    </a:p>
+                  </a:txBody>
+                  <a:tcPr marL="68580" marR="68580" marT="0" marB="0"/>
+                </a:tc>
+                <a:tc>
+                  <a:txBody>
+                    <a:bodyPr/>
+                    <a:lstStyle/>
+                    <a:p>
+                      <a:pPr>
+                        <a:lnSpc>
+                          <a:spcPct val="115000"/>
+                        </a:lnSpc>
+                        <a:spcAft>
+                          <a:spcPts val="0"/>
+                        </a:spcAft>
+                      </a:pPr>
+                      <a:r>
+                        <a:rPr lang="en-US" sz="1200" baseline="-25000">
+                          <a:effectLst/>
+                        </a:rPr>
+                        <a:t>95</a:t>
+                      </a:r>
+                      <a:endParaRPr lang="nl-NL" sz="1100">
+                        <a:effectLst/>
+                        <a:latin typeface="Calibri"/>
+                        <a:ea typeface="Calibri"/>
+                        <a:cs typeface="Times New Roman"/>
+                      </a:endParaRPr>
+                    </a:p>
+                  </a:txBody>
+                  <a:tcPr marL="68580" marR="68580" marT="0" marB="0"/>
+                </a:tc>
+                <a:tc>
+                  <a:txBody>
+                    <a:bodyPr/>
+                    <a:lstStyle/>
+                    <a:p>
+                      <a:pPr>
+                        <a:lnSpc>
+                          <a:spcPct val="115000"/>
+                        </a:lnSpc>
+                        <a:spcAft>
+                          <a:spcPts val="0"/>
+                        </a:spcAft>
+                      </a:pPr>
+                      <a:r>
+                        <a:rPr lang="en-US" sz="1200" baseline="-25000">
+                          <a:effectLst/>
+                        </a:rPr>
+                        <a:t>250</a:t>
+                      </a:r>
+                      <a:endParaRPr lang="nl-NL" sz="1100">
+                        <a:effectLst/>
+                        <a:latin typeface="Calibri"/>
+                        <a:ea typeface="Calibri"/>
+                        <a:cs typeface="Times New Roman"/>
+                      </a:endParaRPr>
+                    </a:p>
+                  </a:txBody>
+                  <a:tcPr marL="68580" marR="68580" marT="0" marB="0"/>
+                </a:tc>
+                <a:tc>
+                  <a:txBody>
+                    <a:bodyPr/>
+                    <a:lstStyle/>
+                    <a:p>
+                      <a:pPr>
+                        <a:lnSpc>
+                          <a:spcPct val="115000"/>
+                        </a:lnSpc>
+                        <a:spcAft>
+                          <a:spcPts val="0"/>
+                        </a:spcAft>
+                      </a:pPr>
+                      <a:r>
+                        <a:rPr lang="en-US" sz="1200" baseline="-25000" dirty="0">
+                          <a:effectLst/>
+                        </a:rPr>
+                        <a:t>4,36</a:t>
+                      </a:r>
+                      <a:endParaRPr lang="nl-NL" sz="1100" dirty="0">
+                        <a:effectLst/>
+                        <a:latin typeface="Calibri"/>
+                        <a:ea typeface="Calibri"/>
+                        <a:cs typeface="Times New Roman"/>
+                      </a:endParaRPr>
+                    </a:p>
+                  </a:txBody>
+                  <a:tcPr marL="68580" marR="68580" marT="0" marB="0"/>
+                </a:tc>
+                <a:tc>
+                  <a:txBody>
+                    <a:bodyPr/>
+                    <a:lstStyle/>
+                    <a:p>
+                      <a:pPr>
+                        <a:lnSpc>
+                          <a:spcPct val="115000"/>
+                        </a:lnSpc>
+                        <a:spcAft>
+                          <a:spcPts val="0"/>
+                        </a:spcAft>
+                      </a:pPr>
+                      <a:r>
+                        <a:rPr lang="en-US" sz="1200" baseline="-25000" dirty="0">
+                          <a:effectLst/>
+                        </a:rPr>
+                        <a:t>90,50</a:t>
+                      </a:r>
+                      <a:endParaRPr lang="nl-NL" sz="1100" dirty="0">
+                        <a:effectLst/>
+                        <a:latin typeface="Calibri"/>
+                        <a:ea typeface="Calibri"/>
+                        <a:cs typeface="Times New Roman"/>
+                      </a:endParaRPr>
+                    </a:p>
+                  </a:txBody>
+                  <a:tcPr marL="68580" marR="68580" marT="0" marB="0"/>
+                </a:tc>
+                <a:tc>
+                  <a:txBody>
+                    <a:bodyPr/>
+                    <a:lstStyle/>
+                    <a:p>
+                      <a:pPr>
+                        <a:lnSpc>
+                          <a:spcPct val="115000"/>
+                        </a:lnSpc>
+                        <a:spcAft>
+                          <a:spcPts val="0"/>
+                        </a:spcAft>
+                      </a:pPr>
+                      <a:r>
+                        <a:rPr lang="en-US" sz="1200" baseline="-25000">
+                          <a:effectLst/>
+                        </a:rPr>
+                        <a:t>51</a:t>
+                      </a:r>
+                      <a:endParaRPr lang="nl-NL" sz="1100">
+                        <a:effectLst/>
+                        <a:latin typeface="Calibri"/>
+                        <a:ea typeface="Calibri"/>
+                        <a:cs typeface="Times New Roman"/>
+                      </a:endParaRPr>
+                    </a:p>
+                  </a:txBody>
+                  <a:tcPr marL="68580" marR="68580" marT="0" marB="0"/>
+                </a:tc>
+                <a:tc>
+                  <a:txBody>
+                    <a:bodyPr/>
+                    <a:lstStyle/>
+                    <a:p>
+                      <a:pPr>
+                        <a:lnSpc>
+                          <a:spcPct val="115000"/>
+                        </a:lnSpc>
+                        <a:spcAft>
+                          <a:spcPts val="0"/>
+                        </a:spcAft>
+                      </a:pPr>
+                      <a:r>
+                        <a:rPr lang="en-US" sz="1200" baseline="-25000">
+                          <a:effectLst/>
+                        </a:rPr>
+                        <a:t>127</a:t>
+                      </a:r>
+                      <a:endParaRPr lang="nl-NL" sz="1100">
+                        <a:effectLst/>
+                        <a:latin typeface="Calibri"/>
+                        <a:ea typeface="Calibri"/>
+                        <a:cs typeface="Times New Roman"/>
+                      </a:endParaRPr>
+                    </a:p>
+                  </a:txBody>
+                  <a:tcPr marL="68580" marR="68580" marT="0" marB="0"/>
+                </a:tc>
+              </a:tr>
+              <a:tr h="391239">
+                <a:tc>
+                  <a:txBody>
+                    <a:bodyPr/>
+                    <a:lstStyle/>
+                    <a:p>
+                      <a:pPr>
+                        <a:lnSpc>
+                          <a:spcPct val="115000"/>
+                        </a:lnSpc>
+                        <a:spcAft>
+                          <a:spcPts val="0"/>
+                        </a:spcAft>
+                      </a:pPr>
+                      <a:r>
+                        <a:rPr lang="en-US" sz="1200" baseline="-25000" dirty="0">
+                          <a:effectLst/>
+                        </a:rPr>
+                        <a:t>Find&amp;SwapRev</a:t>
+                      </a:r>
+                      <a:endParaRPr lang="nl-NL" sz="1100" dirty="0">
+                        <a:effectLst/>
+                        <a:latin typeface="Calibri"/>
+                        <a:ea typeface="Calibri"/>
+                        <a:cs typeface="Times New Roman"/>
+                      </a:endParaRPr>
+                    </a:p>
+                  </a:txBody>
+                  <a:tcPr marL="68580" marR="68580" marT="0" marB="0">
+                    <a:solidFill>
+                      <a:srgbClr val="D52525"/>
+                    </a:solidFill>
+                  </a:tcPr>
+                </a:tc>
+                <a:tc>
+                  <a:txBody>
+                    <a:bodyPr/>
+                    <a:lstStyle/>
+                    <a:p>
+                      <a:pPr>
+                        <a:lnSpc>
+                          <a:spcPct val="115000"/>
+                        </a:lnSpc>
+                        <a:spcAft>
+                          <a:spcPts val="0"/>
+                        </a:spcAft>
+                      </a:pPr>
+                      <a:r>
+                        <a:rPr lang="en-US" sz="1200" baseline="-25000">
+                          <a:effectLst/>
+                        </a:rPr>
+                        <a:t>7,63</a:t>
+                      </a:r>
+                      <a:endParaRPr lang="nl-NL" sz="1100">
+                        <a:effectLst/>
+                        <a:latin typeface="Calibri"/>
+                        <a:ea typeface="Calibri"/>
+                        <a:cs typeface="Times New Roman"/>
+                      </a:endParaRPr>
+                    </a:p>
+                  </a:txBody>
+                  <a:tcPr marL="68580" marR="68580" marT="0" marB="0"/>
+                </a:tc>
+                <a:tc>
+                  <a:txBody>
+                    <a:bodyPr/>
+                    <a:lstStyle/>
+                    <a:p>
+                      <a:pPr>
+                        <a:lnSpc>
+                          <a:spcPct val="115000"/>
+                        </a:lnSpc>
+                        <a:spcAft>
+                          <a:spcPts val="0"/>
+                        </a:spcAft>
+                      </a:pPr>
+                      <a:r>
+                        <a:rPr lang="en-US" sz="1200" baseline="-25000">
+                          <a:effectLst/>
+                        </a:rPr>
+                        <a:t>170,97</a:t>
+                      </a:r>
+                      <a:endParaRPr lang="nl-NL" sz="1100">
+                        <a:effectLst/>
+                        <a:latin typeface="Calibri"/>
+                        <a:ea typeface="Calibri"/>
+                        <a:cs typeface="Times New Roman"/>
+                      </a:endParaRPr>
+                    </a:p>
+                  </a:txBody>
+                  <a:tcPr marL="68580" marR="68580" marT="0" marB="0"/>
+                </a:tc>
+                <a:tc>
+                  <a:txBody>
+                    <a:bodyPr/>
+                    <a:lstStyle/>
+                    <a:p>
+                      <a:pPr>
+                        <a:lnSpc>
+                          <a:spcPct val="115000"/>
+                        </a:lnSpc>
+                        <a:spcAft>
+                          <a:spcPts val="0"/>
+                        </a:spcAft>
+                      </a:pPr>
+                      <a:r>
+                        <a:rPr lang="en-US" sz="1200" baseline="-25000">
+                          <a:effectLst/>
+                        </a:rPr>
+                        <a:t>86</a:t>
+                      </a:r>
+                      <a:endParaRPr lang="nl-NL" sz="1100">
+                        <a:effectLst/>
+                        <a:latin typeface="Calibri"/>
+                        <a:ea typeface="Calibri"/>
+                        <a:cs typeface="Times New Roman"/>
+                      </a:endParaRPr>
+                    </a:p>
+                  </a:txBody>
+                  <a:tcPr marL="68580" marR="68580" marT="0" marB="0"/>
+                </a:tc>
+                <a:tc>
+                  <a:txBody>
+                    <a:bodyPr/>
+                    <a:lstStyle/>
+                    <a:p>
+                      <a:pPr>
+                        <a:lnSpc>
+                          <a:spcPct val="115000"/>
+                        </a:lnSpc>
+                        <a:spcAft>
+                          <a:spcPts val="0"/>
+                        </a:spcAft>
+                      </a:pPr>
+                      <a:r>
+                        <a:rPr lang="en-US" sz="1200" baseline="-25000">
+                          <a:effectLst/>
+                        </a:rPr>
+                        <a:t>248</a:t>
+                      </a:r>
+                      <a:endParaRPr lang="nl-NL" sz="1100">
+                        <a:effectLst/>
+                        <a:latin typeface="Calibri"/>
+                        <a:ea typeface="Calibri"/>
+                        <a:cs typeface="Times New Roman"/>
+                      </a:endParaRPr>
+                    </a:p>
+                  </a:txBody>
+                  <a:tcPr marL="68580" marR="68580" marT="0" marB="0"/>
+                </a:tc>
+                <a:tc>
+                  <a:txBody>
+                    <a:bodyPr/>
+                    <a:lstStyle/>
+                    <a:p>
+                      <a:pPr>
+                        <a:lnSpc>
+                          <a:spcPct val="115000"/>
+                        </a:lnSpc>
+                        <a:spcAft>
+                          <a:spcPts val="0"/>
+                        </a:spcAft>
+                      </a:pPr>
+                      <a:r>
+                        <a:rPr lang="en-US" sz="1200" baseline="-25000" dirty="0">
+                          <a:effectLst/>
+                        </a:rPr>
+                        <a:t>4,37</a:t>
+                      </a:r>
+                      <a:endParaRPr lang="nl-NL" sz="1100" dirty="0">
+                        <a:effectLst/>
+                        <a:latin typeface="Calibri"/>
+                        <a:ea typeface="Calibri"/>
+                        <a:cs typeface="Times New Roman"/>
+                      </a:endParaRPr>
+                    </a:p>
+                  </a:txBody>
+                  <a:tcPr marL="68580" marR="68580" marT="0" marB="0"/>
+                </a:tc>
+                <a:tc>
+                  <a:txBody>
+                    <a:bodyPr/>
+                    <a:lstStyle/>
+                    <a:p>
+                      <a:pPr>
+                        <a:lnSpc>
+                          <a:spcPct val="115000"/>
+                        </a:lnSpc>
+                        <a:spcAft>
+                          <a:spcPts val="0"/>
+                        </a:spcAft>
+                      </a:pPr>
+                      <a:r>
+                        <a:rPr lang="en-US" sz="1200" baseline="-25000">
+                          <a:effectLst/>
+                        </a:rPr>
+                        <a:t>90,89</a:t>
+                      </a:r>
+                      <a:endParaRPr lang="nl-NL" sz="1100">
+                        <a:effectLst/>
+                        <a:latin typeface="Calibri"/>
+                        <a:ea typeface="Calibri"/>
+                        <a:cs typeface="Times New Roman"/>
+                      </a:endParaRPr>
+                    </a:p>
+                  </a:txBody>
+                  <a:tcPr marL="68580" marR="68580" marT="0" marB="0"/>
+                </a:tc>
+                <a:tc>
+                  <a:txBody>
+                    <a:bodyPr/>
+                    <a:lstStyle/>
+                    <a:p>
+                      <a:pPr>
+                        <a:lnSpc>
+                          <a:spcPct val="115000"/>
+                        </a:lnSpc>
+                        <a:spcAft>
+                          <a:spcPts val="0"/>
+                        </a:spcAft>
+                      </a:pPr>
+                      <a:r>
+                        <a:rPr lang="en-US" sz="1200" baseline="-25000">
+                          <a:effectLst/>
+                        </a:rPr>
+                        <a:t>50</a:t>
+                      </a:r>
+                      <a:endParaRPr lang="nl-NL" sz="1100">
+                        <a:effectLst/>
+                        <a:latin typeface="Calibri"/>
+                        <a:ea typeface="Calibri"/>
+                        <a:cs typeface="Times New Roman"/>
+                      </a:endParaRPr>
+                    </a:p>
+                  </a:txBody>
+                  <a:tcPr marL="68580" marR="68580" marT="0" marB="0"/>
+                </a:tc>
+                <a:tc>
+                  <a:txBody>
+                    <a:bodyPr/>
+                    <a:lstStyle/>
+                    <a:p>
+                      <a:pPr>
+                        <a:lnSpc>
+                          <a:spcPct val="115000"/>
+                        </a:lnSpc>
+                        <a:spcAft>
+                          <a:spcPts val="0"/>
+                        </a:spcAft>
+                      </a:pPr>
+                      <a:r>
+                        <a:rPr lang="en-US" sz="1200" baseline="-25000">
+                          <a:effectLst/>
+                        </a:rPr>
+                        <a:t>130</a:t>
+                      </a:r>
+                      <a:endParaRPr lang="nl-NL" sz="1100">
+                        <a:effectLst/>
+                        <a:latin typeface="Calibri"/>
+                        <a:ea typeface="Calibri"/>
+                        <a:cs typeface="Times New Roman"/>
+                      </a:endParaRPr>
+                    </a:p>
+                  </a:txBody>
+                  <a:tcPr marL="68580" marR="68580" marT="0" marB="0"/>
+                </a:tc>
+              </a:tr>
+              <a:tr h="391239">
+                <a:tc>
+                  <a:txBody>
+                    <a:bodyPr/>
+                    <a:lstStyle/>
+                    <a:p>
+                      <a:pPr>
+                        <a:lnSpc>
+                          <a:spcPct val="115000"/>
+                        </a:lnSpc>
+                        <a:spcAft>
+                          <a:spcPts val="0"/>
+                        </a:spcAft>
+                      </a:pPr>
+                      <a:r>
+                        <a:rPr lang="en-US" sz="1200" baseline="-25000" dirty="0">
+                          <a:effectLst/>
+                        </a:rPr>
+                        <a:t>Find&amp;SwapIteratief</a:t>
+                      </a:r>
+                      <a:endParaRPr lang="nl-NL" sz="1100" dirty="0">
+                        <a:effectLst/>
+                        <a:latin typeface="Calibri"/>
+                        <a:ea typeface="Calibri"/>
+                        <a:cs typeface="Times New Roman"/>
+                      </a:endParaRPr>
+                    </a:p>
+                  </a:txBody>
+                  <a:tcPr marL="68580" marR="68580" marT="0" marB="0">
+                    <a:solidFill>
+                      <a:srgbClr val="D52525"/>
+                    </a:solidFill>
+                  </a:tcPr>
+                </a:tc>
+                <a:tc>
+                  <a:txBody>
+                    <a:bodyPr/>
+                    <a:lstStyle/>
+                    <a:p>
+                      <a:pPr>
+                        <a:lnSpc>
+                          <a:spcPct val="115000"/>
+                        </a:lnSpc>
+                        <a:spcAft>
+                          <a:spcPts val="0"/>
+                        </a:spcAft>
+                      </a:pPr>
+                      <a:r>
+                        <a:rPr lang="en-US" sz="1200" baseline="-25000">
+                          <a:effectLst/>
+                        </a:rPr>
+                        <a:t>8,25</a:t>
+                      </a:r>
+                      <a:endParaRPr lang="nl-NL" sz="1100">
+                        <a:effectLst/>
+                        <a:latin typeface="Calibri"/>
+                        <a:ea typeface="Calibri"/>
+                        <a:cs typeface="Times New Roman"/>
+                      </a:endParaRPr>
+                    </a:p>
+                  </a:txBody>
+                  <a:tcPr marL="68580" marR="68580" marT="0" marB="0"/>
+                </a:tc>
+                <a:tc>
+                  <a:txBody>
+                    <a:bodyPr/>
+                    <a:lstStyle/>
+                    <a:p>
+                      <a:pPr>
+                        <a:lnSpc>
+                          <a:spcPct val="115000"/>
+                        </a:lnSpc>
+                        <a:spcAft>
+                          <a:spcPts val="0"/>
+                        </a:spcAft>
+                      </a:pPr>
+                      <a:r>
+                        <a:rPr lang="en-US" sz="1200" baseline="-25000">
+                          <a:effectLst/>
+                        </a:rPr>
+                        <a:t>183,47</a:t>
+                      </a:r>
+                      <a:endParaRPr lang="nl-NL" sz="1100">
+                        <a:effectLst/>
+                        <a:latin typeface="Calibri"/>
+                        <a:ea typeface="Calibri"/>
+                        <a:cs typeface="Times New Roman"/>
+                      </a:endParaRPr>
+                    </a:p>
+                  </a:txBody>
+                  <a:tcPr marL="68580" marR="68580" marT="0" marB="0"/>
+                </a:tc>
+                <a:tc>
+                  <a:txBody>
+                    <a:bodyPr/>
+                    <a:lstStyle/>
+                    <a:p>
+                      <a:pPr>
+                        <a:lnSpc>
+                          <a:spcPct val="115000"/>
+                        </a:lnSpc>
+                        <a:spcAft>
+                          <a:spcPts val="0"/>
+                        </a:spcAft>
+                      </a:pPr>
+                      <a:r>
+                        <a:rPr lang="en-US" sz="1200" baseline="-25000">
+                          <a:effectLst/>
+                        </a:rPr>
+                        <a:t>88</a:t>
+                      </a:r>
+                      <a:endParaRPr lang="nl-NL" sz="1100">
+                        <a:effectLst/>
+                        <a:latin typeface="Calibri"/>
+                        <a:ea typeface="Calibri"/>
+                        <a:cs typeface="Times New Roman"/>
+                      </a:endParaRPr>
+                    </a:p>
+                  </a:txBody>
+                  <a:tcPr marL="68580" marR="68580" marT="0" marB="0"/>
+                </a:tc>
+                <a:tc>
+                  <a:txBody>
+                    <a:bodyPr/>
+                    <a:lstStyle/>
+                    <a:p>
+                      <a:pPr>
+                        <a:lnSpc>
+                          <a:spcPct val="115000"/>
+                        </a:lnSpc>
+                        <a:spcAft>
+                          <a:spcPts val="0"/>
+                        </a:spcAft>
+                      </a:pPr>
+                      <a:r>
+                        <a:rPr lang="en-US" sz="1200" baseline="-25000">
+                          <a:effectLst/>
+                        </a:rPr>
+                        <a:t>242</a:t>
+                      </a:r>
+                      <a:endParaRPr lang="nl-NL" sz="1100">
+                        <a:effectLst/>
+                        <a:latin typeface="Calibri"/>
+                        <a:ea typeface="Calibri"/>
+                        <a:cs typeface="Times New Roman"/>
+                      </a:endParaRPr>
+                    </a:p>
+                  </a:txBody>
+                  <a:tcPr marL="68580" marR="68580" marT="0" marB="0"/>
+                </a:tc>
+                <a:tc>
+                  <a:txBody>
+                    <a:bodyPr/>
+                    <a:lstStyle/>
+                    <a:p>
+                      <a:pPr>
+                        <a:lnSpc>
+                          <a:spcPct val="115000"/>
+                        </a:lnSpc>
+                        <a:spcAft>
+                          <a:spcPts val="0"/>
+                        </a:spcAft>
+                      </a:pPr>
+                      <a:r>
+                        <a:rPr lang="en-US" sz="1200" baseline="-25000">
+                          <a:effectLst/>
+                        </a:rPr>
+                        <a:t>6,04</a:t>
+                      </a:r>
+                      <a:endParaRPr lang="nl-NL" sz="1100">
+                        <a:effectLst/>
+                        <a:latin typeface="Calibri"/>
+                        <a:ea typeface="Calibri"/>
+                        <a:cs typeface="Times New Roman"/>
+                      </a:endParaRPr>
+                    </a:p>
+                  </a:txBody>
+                  <a:tcPr marL="68580" marR="68580" marT="0" marB="0"/>
+                </a:tc>
+                <a:tc>
+                  <a:txBody>
+                    <a:bodyPr/>
+                    <a:lstStyle/>
+                    <a:p>
+                      <a:pPr>
+                        <a:lnSpc>
+                          <a:spcPct val="115000"/>
+                        </a:lnSpc>
+                        <a:spcAft>
+                          <a:spcPts val="0"/>
+                        </a:spcAft>
+                      </a:pPr>
+                      <a:r>
+                        <a:rPr lang="en-US" sz="1200" baseline="-25000">
+                          <a:effectLst/>
+                        </a:rPr>
+                        <a:t>122,29</a:t>
+                      </a:r>
+                      <a:endParaRPr lang="nl-NL" sz="1100">
+                        <a:effectLst/>
+                        <a:latin typeface="Calibri"/>
+                        <a:ea typeface="Calibri"/>
+                        <a:cs typeface="Times New Roman"/>
+                      </a:endParaRPr>
+                    </a:p>
+                  </a:txBody>
+                  <a:tcPr marL="68580" marR="68580" marT="0" marB="0"/>
+                </a:tc>
+                <a:tc>
+                  <a:txBody>
+                    <a:bodyPr/>
+                    <a:lstStyle/>
+                    <a:p>
+                      <a:pPr>
+                        <a:lnSpc>
+                          <a:spcPct val="115000"/>
+                        </a:lnSpc>
+                        <a:spcAft>
+                          <a:spcPts val="0"/>
+                        </a:spcAft>
+                      </a:pPr>
+                      <a:r>
+                        <a:rPr lang="en-US" sz="1200" baseline="-25000">
+                          <a:effectLst/>
+                        </a:rPr>
+                        <a:t>51</a:t>
+                      </a:r>
+                      <a:endParaRPr lang="nl-NL" sz="1100">
+                        <a:effectLst/>
+                        <a:latin typeface="Calibri"/>
+                        <a:ea typeface="Calibri"/>
+                        <a:cs typeface="Times New Roman"/>
+                      </a:endParaRPr>
+                    </a:p>
+                  </a:txBody>
+                  <a:tcPr marL="68580" marR="68580" marT="0" marB="0"/>
+                </a:tc>
+                <a:tc>
+                  <a:txBody>
+                    <a:bodyPr/>
+                    <a:lstStyle/>
+                    <a:p>
+                      <a:pPr>
+                        <a:lnSpc>
+                          <a:spcPct val="115000"/>
+                        </a:lnSpc>
+                        <a:spcAft>
+                          <a:spcPts val="0"/>
+                        </a:spcAft>
+                      </a:pPr>
+                      <a:r>
+                        <a:rPr lang="en-US" sz="1200" baseline="-25000">
+                          <a:effectLst/>
+                        </a:rPr>
+                        <a:t>214</a:t>
+                      </a:r>
+                      <a:endParaRPr lang="nl-NL" sz="1100">
+                        <a:effectLst/>
+                        <a:latin typeface="Calibri"/>
+                        <a:ea typeface="Calibri"/>
+                        <a:cs typeface="Times New Roman"/>
+                      </a:endParaRPr>
+                    </a:p>
+                  </a:txBody>
+                  <a:tcPr marL="68580" marR="68580" marT="0" marB="0"/>
+                </a:tc>
+              </a:tr>
+              <a:tr h="391239">
+                <a:tc>
+                  <a:txBody>
+                    <a:bodyPr/>
+                    <a:lstStyle/>
+                    <a:p>
+                      <a:pPr>
+                        <a:lnSpc>
+                          <a:spcPct val="115000"/>
+                        </a:lnSpc>
+                        <a:spcAft>
+                          <a:spcPts val="0"/>
+                        </a:spcAft>
+                      </a:pPr>
+                      <a:r>
+                        <a:rPr lang="en-US" sz="1200" baseline="-25000" dirty="0">
+                          <a:effectLst/>
+                        </a:rPr>
+                        <a:t>Fin</a:t>
+                      </a:r>
+                      <a:r>
+                        <a:rPr lang="nl-NL" sz="1200" baseline="-25000" dirty="0">
+                          <a:effectLst/>
+                        </a:rPr>
+                        <a:t>d&amp;SwapLoHi</a:t>
+                      </a:r>
+                      <a:endParaRPr lang="nl-NL" sz="1100" dirty="0">
+                        <a:effectLst/>
+                        <a:latin typeface="Calibri"/>
+                        <a:ea typeface="Calibri"/>
+                        <a:cs typeface="Times New Roman"/>
+                      </a:endParaRPr>
+                    </a:p>
+                  </a:txBody>
+                  <a:tcPr marL="68580" marR="68580" marT="0" marB="0">
+                    <a:solidFill>
+                      <a:srgbClr val="D52525"/>
+                    </a:solidFill>
+                  </a:tcPr>
+                </a:tc>
+                <a:tc>
+                  <a:txBody>
+                    <a:bodyPr/>
+                    <a:lstStyle/>
+                    <a:p>
+                      <a:pPr>
+                        <a:lnSpc>
+                          <a:spcPct val="115000"/>
+                        </a:lnSpc>
+                        <a:spcAft>
+                          <a:spcPts val="0"/>
+                        </a:spcAft>
+                      </a:pPr>
+                      <a:r>
+                        <a:rPr lang="nl-NL" sz="1200" baseline="-25000">
+                          <a:effectLst/>
+                        </a:rPr>
+                        <a:t>7,62</a:t>
+                      </a:r>
+                      <a:endParaRPr lang="nl-NL" sz="1100">
+                        <a:effectLst/>
+                        <a:latin typeface="Calibri"/>
+                        <a:ea typeface="Calibri"/>
+                        <a:cs typeface="Times New Roman"/>
+                      </a:endParaRPr>
+                    </a:p>
+                  </a:txBody>
+                  <a:tcPr marL="68580" marR="68580" marT="0" marB="0"/>
+                </a:tc>
+                <a:tc>
+                  <a:txBody>
+                    <a:bodyPr/>
+                    <a:lstStyle/>
+                    <a:p>
+                      <a:pPr>
+                        <a:lnSpc>
+                          <a:spcPct val="115000"/>
+                        </a:lnSpc>
+                        <a:spcAft>
+                          <a:spcPts val="0"/>
+                        </a:spcAft>
+                      </a:pPr>
+                      <a:r>
+                        <a:rPr lang="nl-NL" sz="1200" baseline="-25000">
+                          <a:effectLst/>
+                        </a:rPr>
+                        <a:t>170,84</a:t>
+                      </a:r>
+                      <a:endParaRPr lang="nl-NL" sz="1100">
+                        <a:effectLst/>
+                        <a:latin typeface="Calibri"/>
+                        <a:ea typeface="Calibri"/>
+                        <a:cs typeface="Times New Roman"/>
+                      </a:endParaRPr>
+                    </a:p>
+                  </a:txBody>
+                  <a:tcPr marL="68580" marR="68580" marT="0" marB="0"/>
+                </a:tc>
+                <a:tc>
+                  <a:txBody>
+                    <a:bodyPr/>
+                    <a:lstStyle/>
+                    <a:p>
+                      <a:pPr>
+                        <a:lnSpc>
+                          <a:spcPct val="115000"/>
+                        </a:lnSpc>
+                        <a:spcAft>
+                          <a:spcPts val="0"/>
+                        </a:spcAft>
+                      </a:pPr>
+                      <a:r>
+                        <a:rPr lang="nl-NL" sz="1200" baseline="-25000">
+                          <a:effectLst/>
+                        </a:rPr>
+                        <a:t>109</a:t>
+                      </a:r>
+                      <a:endParaRPr lang="nl-NL" sz="1100">
+                        <a:effectLst/>
+                        <a:latin typeface="Calibri"/>
+                        <a:ea typeface="Calibri"/>
+                        <a:cs typeface="Times New Roman"/>
+                      </a:endParaRPr>
+                    </a:p>
+                  </a:txBody>
+                  <a:tcPr marL="68580" marR="68580" marT="0" marB="0"/>
+                </a:tc>
+                <a:tc>
+                  <a:txBody>
+                    <a:bodyPr/>
+                    <a:lstStyle/>
+                    <a:p>
+                      <a:pPr>
+                        <a:lnSpc>
+                          <a:spcPct val="115000"/>
+                        </a:lnSpc>
+                        <a:spcAft>
+                          <a:spcPts val="0"/>
+                        </a:spcAft>
+                      </a:pPr>
+                      <a:r>
+                        <a:rPr lang="nl-NL" sz="1200" baseline="-25000">
+                          <a:effectLst/>
+                        </a:rPr>
+                        <a:t>252</a:t>
+                      </a:r>
+                      <a:endParaRPr lang="nl-NL" sz="1100">
+                        <a:effectLst/>
+                        <a:latin typeface="Calibri"/>
+                        <a:ea typeface="Calibri"/>
+                        <a:cs typeface="Times New Roman"/>
+                      </a:endParaRPr>
+                    </a:p>
+                  </a:txBody>
+                  <a:tcPr marL="68580" marR="68580" marT="0" marB="0"/>
+                </a:tc>
+                <a:tc>
+                  <a:txBody>
+                    <a:bodyPr/>
+                    <a:lstStyle/>
+                    <a:p>
+                      <a:pPr>
+                        <a:lnSpc>
+                          <a:spcPct val="115000"/>
+                        </a:lnSpc>
+                        <a:spcAft>
+                          <a:spcPts val="0"/>
+                        </a:spcAft>
+                      </a:pPr>
+                      <a:r>
+                        <a:rPr lang="en-US" sz="1200" baseline="-25000">
+                          <a:effectLst/>
+                        </a:rPr>
+                        <a:t>4,37</a:t>
+                      </a:r>
+                      <a:endParaRPr lang="nl-NL" sz="1100">
+                        <a:effectLst/>
+                        <a:latin typeface="Calibri"/>
+                        <a:ea typeface="Calibri"/>
+                        <a:cs typeface="Times New Roman"/>
+                      </a:endParaRPr>
+                    </a:p>
+                  </a:txBody>
+                  <a:tcPr marL="68580" marR="68580" marT="0" marB="0"/>
+                </a:tc>
+                <a:tc>
+                  <a:txBody>
+                    <a:bodyPr/>
+                    <a:lstStyle/>
+                    <a:p>
+                      <a:pPr>
+                        <a:lnSpc>
+                          <a:spcPct val="115000"/>
+                        </a:lnSpc>
+                        <a:spcAft>
+                          <a:spcPts val="0"/>
+                        </a:spcAft>
+                      </a:pPr>
+                      <a:r>
+                        <a:rPr lang="en-US" sz="1200" baseline="-25000">
+                          <a:effectLst/>
+                        </a:rPr>
+                        <a:t>90,77</a:t>
+                      </a:r>
+                      <a:endParaRPr lang="nl-NL" sz="1100">
+                        <a:effectLst/>
+                        <a:latin typeface="Calibri"/>
+                        <a:ea typeface="Calibri"/>
+                        <a:cs typeface="Times New Roman"/>
+                      </a:endParaRPr>
+                    </a:p>
+                  </a:txBody>
+                  <a:tcPr marL="68580" marR="68580" marT="0" marB="0"/>
+                </a:tc>
+                <a:tc>
+                  <a:txBody>
+                    <a:bodyPr/>
+                    <a:lstStyle/>
+                    <a:p>
+                      <a:pPr>
+                        <a:lnSpc>
+                          <a:spcPct val="115000"/>
+                        </a:lnSpc>
+                        <a:spcAft>
+                          <a:spcPts val="0"/>
+                        </a:spcAft>
+                      </a:pPr>
+                      <a:r>
+                        <a:rPr lang="en-US" sz="1200" baseline="-25000">
+                          <a:effectLst/>
+                        </a:rPr>
+                        <a:t>54</a:t>
+                      </a:r>
+                      <a:endParaRPr lang="nl-NL" sz="1100">
+                        <a:effectLst/>
+                        <a:latin typeface="Calibri"/>
+                        <a:ea typeface="Calibri"/>
+                        <a:cs typeface="Times New Roman"/>
+                      </a:endParaRPr>
+                    </a:p>
+                  </a:txBody>
+                  <a:tcPr marL="68580" marR="68580" marT="0" marB="0"/>
+                </a:tc>
+                <a:tc>
+                  <a:txBody>
+                    <a:bodyPr/>
+                    <a:lstStyle/>
+                    <a:p>
+                      <a:pPr>
+                        <a:lnSpc>
+                          <a:spcPct val="115000"/>
+                        </a:lnSpc>
+                        <a:spcAft>
+                          <a:spcPts val="0"/>
+                        </a:spcAft>
+                      </a:pPr>
+                      <a:r>
+                        <a:rPr lang="en-US" sz="1200" baseline="-25000">
+                          <a:effectLst/>
+                        </a:rPr>
+                        <a:t>127</a:t>
+                      </a:r>
+                      <a:endParaRPr lang="nl-NL" sz="1100">
+                        <a:effectLst/>
+                        <a:latin typeface="Calibri"/>
+                        <a:ea typeface="Calibri"/>
+                        <a:cs typeface="Times New Roman"/>
+                      </a:endParaRPr>
+                    </a:p>
+                  </a:txBody>
+                  <a:tcPr marL="68580" marR="68580" marT="0" marB="0"/>
+                </a:tc>
+              </a:tr>
+              <a:tr h="391239">
+                <a:tc>
+                  <a:txBody>
+                    <a:bodyPr/>
+                    <a:lstStyle/>
+                    <a:p>
+                      <a:pPr>
+                        <a:lnSpc>
+                          <a:spcPct val="115000"/>
+                        </a:lnSpc>
+                        <a:spcAft>
+                          <a:spcPts val="0"/>
+                        </a:spcAft>
+                      </a:pPr>
+                      <a:r>
+                        <a:rPr lang="nl-NL" sz="1200" baseline="-25000" dirty="0">
+                          <a:effectLst/>
+                        </a:rPr>
+                        <a:t>ChunkSwap</a:t>
+                      </a:r>
+                      <a:endParaRPr lang="nl-NL" sz="1100" dirty="0">
+                        <a:effectLst/>
+                        <a:latin typeface="Calibri"/>
+                        <a:ea typeface="Calibri"/>
+                        <a:cs typeface="Times New Roman"/>
+                      </a:endParaRPr>
+                    </a:p>
+                  </a:txBody>
+                  <a:tcPr marL="68580" marR="68580" marT="0" marB="0">
+                    <a:solidFill>
+                      <a:srgbClr val="D52525"/>
+                    </a:solidFill>
+                  </a:tcPr>
+                </a:tc>
+                <a:tc>
+                  <a:txBody>
+                    <a:bodyPr/>
+                    <a:lstStyle/>
+                    <a:p>
+                      <a:pPr>
+                        <a:lnSpc>
+                          <a:spcPct val="115000"/>
+                        </a:lnSpc>
+                        <a:spcAft>
+                          <a:spcPts val="0"/>
+                        </a:spcAft>
+                      </a:pPr>
+                      <a:r>
+                        <a:rPr lang="nl-NL" sz="1200" baseline="-25000">
+                          <a:effectLst/>
+                        </a:rPr>
+                        <a:t>7,45</a:t>
+                      </a:r>
+                      <a:endParaRPr lang="nl-NL" sz="1100">
+                        <a:effectLst/>
+                        <a:latin typeface="Calibri"/>
+                        <a:ea typeface="Calibri"/>
+                        <a:cs typeface="Times New Roman"/>
+                      </a:endParaRPr>
+                    </a:p>
+                  </a:txBody>
+                  <a:tcPr marL="68580" marR="68580" marT="0" marB="0"/>
+                </a:tc>
+                <a:tc>
+                  <a:txBody>
+                    <a:bodyPr/>
+                    <a:lstStyle/>
+                    <a:p>
+                      <a:pPr>
+                        <a:lnSpc>
+                          <a:spcPct val="115000"/>
+                        </a:lnSpc>
+                        <a:spcAft>
+                          <a:spcPts val="0"/>
+                        </a:spcAft>
+                      </a:pPr>
+                      <a:r>
+                        <a:rPr lang="nl-NL" sz="1200" baseline="-25000">
+                          <a:effectLst/>
+                        </a:rPr>
+                        <a:t>165,67</a:t>
+                      </a:r>
+                      <a:endParaRPr lang="nl-NL" sz="1100">
+                        <a:effectLst/>
+                        <a:latin typeface="Calibri"/>
+                        <a:ea typeface="Calibri"/>
+                        <a:cs typeface="Times New Roman"/>
+                      </a:endParaRPr>
+                    </a:p>
+                  </a:txBody>
+                  <a:tcPr marL="68580" marR="68580" marT="0" marB="0"/>
+                </a:tc>
+                <a:tc>
+                  <a:txBody>
+                    <a:bodyPr/>
+                    <a:lstStyle/>
+                    <a:p>
+                      <a:pPr>
+                        <a:lnSpc>
+                          <a:spcPct val="115000"/>
+                        </a:lnSpc>
+                        <a:spcAft>
+                          <a:spcPts val="0"/>
+                        </a:spcAft>
+                      </a:pPr>
+                      <a:r>
+                        <a:rPr lang="nl-NL" sz="1200" baseline="-25000">
+                          <a:effectLst/>
+                        </a:rPr>
+                        <a:t>93</a:t>
+                      </a:r>
+                      <a:endParaRPr lang="nl-NL" sz="1100">
+                        <a:effectLst/>
+                        <a:latin typeface="Calibri"/>
+                        <a:ea typeface="Calibri"/>
+                        <a:cs typeface="Times New Roman"/>
+                      </a:endParaRPr>
+                    </a:p>
+                  </a:txBody>
+                  <a:tcPr marL="68580" marR="68580" marT="0" marB="0"/>
+                </a:tc>
+                <a:tc>
+                  <a:txBody>
+                    <a:bodyPr/>
+                    <a:lstStyle/>
+                    <a:p>
+                      <a:pPr>
+                        <a:lnSpc>
+                          <a:spcPct val="115000"/>
+                        </a:lnSpc>
+                        <a:spcAft>
+                          <a:spcPts val="0"/>
+                        </a:spcAft>
+                      </a:pPr>
+                      <a:r>
+                        <a:rPr lang="nl-NL" sz="1200" baseline="-25000">
+                          <a:effectLst/>
+                        </a:rPr>
+                        <a:t>250</a:t>
+                      </a:r>
+                      <a:endParaRPr lang="nl-NL" sz="1100">
+                        <a:effectLst/>
+                        <a:latin typeface="Calibri"/>
+                        <a:ea typeface="Calibri"/>
+                        <a:cs typeface="Times New Roman"/>
+                      </a:endParaRPr>
+                    </a:p>
+                  </a:txBody>
+                  <a:tcPr marL="68580" marR="68580" marT="0" marB="0"/>
+                </a:tc>
+                <a:tc>
+                  <a:txBody>
+                    <a:bodyPr/>
+                    <a:lstStyle/>
+                    <a:p>
+                      <a:pPr>
+                        <a:lnSpc>
+                          <a:spcPct val="115000"/>
+                        </a:lnSpc>
+                        <a:spcAft>
+                          <a:spcPts val="0"/>
+                        </a:spcAft>
+                      </a:pPr>
+                      <a:r>
+                        <a:rPr lang="nl-NL" sz="1200" baseline="-25000">
+                          <a:effectLst/>
+                        </a:rPr>
+                        <a:t>4,33</a:t>
+                      </a:r>
+                      <a:endParaRPr lang="nl-NL" sz="1100">
+                        <a:effectLst/>
+                        <a:latin typeface="Calibri"/>
+                        <a:ea typeface="Calibri"/>
+                        <a:cs typeface="Times New Roman"/>
+                      </a:endParaRPr>
+                    </a:p>
+                  </a:txBody>
+                  <a:tcPr marL="68580" marR="68580" marT="0" marB="0"/>
+                </a:tc>
+                <a:tc>
+                  <a:txBody>
+                    <a:bodyPr/>
+                    <a:lstStyle/>
+                    <a:p>
+                      <a:pPr>
+                        <a:lnSpc>
+                          <a:spcPct val="115000"/>
+                        </a:lnSpc>
+                        <a:spcAft>
+                          <a:spcPts val="0"/>
+                        </a:spcAft>
+                      </a:pPr>
+                      <a:r>
+                        <a:rPr lang="nl-NL" sz="1200" baseline="-25000">
+                          <a:effectLst/>
+                        </a:rPr>
+                        <a:t>88,17</a:t>
+                      </a:r>
+                      <a:endParaRPr lang="nl-NL" sz="1100">
+                        <a:effectLst/>
+                        <a:latin typeface="Calibri"/>
+                        <a:ea typeface="Calibri"/>
+                        <a:cs typeface="Times New Roman"/>
+                      </a:endParaRPr>
+                    </a:p>
+                  </a:txBody>
+                  <a:tcPr marL="68580" marR="68580" marT="0" marB="0"/>
+                </a:tc>
+                <a:tc>
+                  <a:txBody>
+                    <a:bodyPr/>
+                    <a:lstStyle/>
+                    <a:p>
+                      <a:pPr>
+                        <a:lnSpc>
+                          <a:spcPct val="115000"/>
+                        </a:lnSpc>
+                        <a:spcAft>
+                          <a:spcPts val="0"/>
+                        </a:spcAft>
+                      </a:pPr>
+                      <a:r>
+                        <a:rPr lang="nl-NL" sz="1200" baseline="-25000">
+                          <a:effectLst/>
+                        </a:rPr>
+                        <a:t>51</a:t>
+                      </a:r>
+                      <a:endParaRPr lang="nl-NL" sz="1100">
+                        <a:effectLst/>
+                        <a:latin typeface="Calibri"/>
+                        <a:ea typeface="Calibri"/>
+                        <a:cs typeface="Times New Roman"/>
+                      </a:endParaRPr>
+                    </a:p>
+                  </a:txBody>
+                  <a:tcPr marL="68580" marR="68580" marT="0" marB="0"/>
+                </a:tc>
+                <a:tc>
+                  <a:txBody>
+                    <a:bodyPr/>
+                    <a:lstStyle/>
+                    <a:p>
+                      <a:pPr>
+                        <a:lnSpc>
+                          <a:spcPct val="115000"/>
+                        </a:lnSpc>
+                        <a:spcAft>
+                          <a:spcPts val="0"/>
+                        </a:spcAft>
+                      </a:pPr>
+                      <a:r>
+                        <a:rPr lang="nl-NL" sz="1200" baseline="-25000">
+                          <a:effectLst/>
+                        </a:rPr>
+                        <a:t>121</a:t>
+                      </a:r>
+                      <a:endParaRPr lang="nl-NL" sz="1100">
+                        <a:effectLst/>
+                        <a:latin typeface="Calibri"/>
+                        <a:ea typeface="Calibri"/>
+                        <a:cs typeface="Times New Roman"/>
+                      </a:endParaRPr>
+                    </a:p>
+                  </a:txBody>
+                  <a:tcPr marL="68580" marR="68580" marT="0" marB="0"/>
+                </a:tc>
+              </a:tr>
+              <a:tr h="391239">
+                <a:tc>
+                  <a:txBody>
+                    <a:bodyPr/>
+                    <a:lstStyle/>
+                    <a:p>
+                      <a:pPr>
+                        <a:lnSpc>
+                          <a:spcPct val="115000"/>
+                        </a:lnSpc>
+                        <a:spcAft>
+                          <a:spcPts val="0"/>
+                        </a:spcAft>
+                      </a:pPr>
+                      <a:r>
+                        <a:rPr lang="nl-NL" sz="1200" baseline="-25000" dirty="0">
+                          <a:effectLst/>
+                        </a:rPr>
+                        <a:t>EditStar</a:t>
+                      </a:r>
+                      <a:endParaRPr lang="nl-NL" sz="1100" dirty="0">
+                        <a:effectLst/>
+                        <a:latin typeface="Calibri"/>
+                        <a:ea typeface="Calibri"/>
+                        <a:cs typeface="Times New Roman"/>
+                      </a:endParaRPr>
+                    </a:p>
+                  </a:txBody>
+                  <a:tcPr marL="68580" marR="68580" marT="0" marB="0">
+                    <a:solidFill>
+                      <a:srgbClr val="D52525"/>
+                    </a:solidFill>
+                  </a:tcPr>
+                </a:tc>
+                <a:tc>
+                  <a:txBody>
+                    <a:bodyPr/>
+                    <a:lstStyle/>
+                    <a:p>
+                      <a:pPr>
+                        <a:lnSpc>
+                          <a:spcPct val="115000"/>
+                        </a:lnSpc>
+                        <a:spcAft>
+                          <a:spcPts val="0"/>
+                        </a:spcAft>
+                      </a:pPr>
+                      <a:r>
+                        <a:rPr lang="nl-NL" sz="1200" baseline="-25000">
+                          <a:effectLst/>
+                        </a:rPr>
+                        <a:t>9,16</a:t>
+                      </a:r>
+                      <a:endParaRPr lang="nl-NL" sz="1100">
+                        <a:effectLst/>
+                        <a:latin typeface="Calibri"/>
+                        <a:ea typeface="Calibri"/>
+                        <a:cs typeface="Times New Roman"/>
+                      </a:endParaRPr>
+                    </a:p>
+                  </a:txBody>
+                  <a:tcPr marL="68580" marR="68580" marT="0" marB="0"/>
+                </a:tc>
+                <a:tc>
+                  <a:txBody>
+                    <a:bodyPr/>
+                    <a:lstStyle/>
+                    <a:p>
+                      <a:pPr>
+                        <a:lnSpc>
+                          <a:spcPct val="115000"/>
+                        </a:lnSpc>
+                        <a:spcAft>
+                          <a:spcPts val="0"/>
+                        </a:spcAft>
+                      </a:pPr>
+                      <a:r>
+                        <a:rPr lang="nl-NL" sz="1200" baseline="-25000">
+                          <a:effectLst/>
+                        </a:rPr>
+                        <a:t>164,73</a:t>
+                      </a:r>
+                      <a:endParaRPr lang="nl-NL" sz="1100">
+                        <a:effectLst/>
+                        <a:latin typeface="Calibri"/>
+                        <a:ea typeface="Calibri"/>
+                        <a:cs typeface="Times New Roman"/>
+                      </a:endParaRPr>
+                    </a:p>
+                  </a:txBody>
+                  <a:tcPr marL="68580" marR="68580" marT="0" marB="0"/>
+                </a:tc>
+                <a:tc>
+                  <a:txBody>
+                    <a:bodyPr/>
+                    <a:lstStyle/>
+                    <a:p>
+                      <a:pPr>
+                        <a:lnSpc>
+                          <a:spcPct val="115000"/>
+                        </a:lnSpc>
+                        <a:spcAft>
+                          <a:spcPts val="0"/>
+                        </a:spcAft>
+                      </a:pPr>
+                      <a:r>
+                        <a:rPr lang="nl-NL" sz="1200" baseline="-25000" dirty="0">
+                          <a:effectLst/>
+                        </a:rPr>
+                        <a:t>118</a:t>
+                      </a:r>
+                      <a:endParaRPr lang="nl-NL" sz="1100" dirty="0">
+                        <a:effectLst/>
+                        <a:latin typeface="Calibri"/>
+                        <a:ea typeface="Calibri"/>
+                        <a:cs typeface="Times New Roman"/>
+                      </a:endParaRPr>
+                    </a:p>
+                  </a:txBody>
+                  <a:tcPr marL="68580" marR="68580" marT="0" marB="0"/>
+                </a:tc>
+                <a:tc>
+                  <a:txBody>
+                    <a:bodyPr/>
+                    <a:lstStyle/>
+                    <a:p>
+                      <a:pPr>
+                        <a:lnSpc>
+                          <a:spcPct val="115000"/>
+                        </a:lnSpc>
+                        <a:spcAft>
+                          <a:spcPts val="0"/>
+                        </a:spcAft>
+                      </a:pPr>
+                      <a:r>
+                        <a:rPr lang="nl-NL" sz="1200" baseline="-25000">
+                          <a:effectLst/>
+                        </a:rPr>
+                        <a:t>208</a:t>
+                      </a:r>
+                      <a:endParaRPr lang="nl-NL" sz="1100">
+                        <a:effectLst/>
+                        <a:latin typeface="Calibri"/>
+                        <a:ea typeface="Calibri"/>
+                        <a:cs typeface="Times New Roman"/>
+                      </a:endParaRPr>
+                    </a:p>
+                  </a:txBody>
+                  <a:tcPr marL="68580" marR="68580" marT="0" marB="0"/>
+                </a:tc>
+                <a:tc>
+                  <a:txBody>
+                    <a:bodyPr/>
+                    <a:lstStyle/>
+                    <a:p>
+                      <a:pPr>
+                        <a:lnSpc>
+                          <a:spcPct val="115000"/>
+                        </a:lnSpc>
+                        <a:spcAft>
+                          <a:spcPts val="0"/>
+                        </a:spcAft>
+                      </a:pPr>
+                      <a:r>
+                        <a:rPr lang="nl-NL" sz="1200" baseline="-25000">
+                          <a:effectLst/>
+                        </a:rPr>
+                        <a:t>6,22</a:t>
+                      </a:r>
+                      <a:endParaRPr lang="nl-NL" sz="1100">
+                        <a:effectLst/>
+                        <a:latin typeface="Calibri"/>
+                        <a:ea typeface="Calibri"/>
+                        <a:cs typeface="Times New Roman"/>
+                      </a:endParaRPr>
+                    </a:p>
+                  </a:txBody>
+                  <a:tcPr marL="68580" marR="68580" marT="0" marB="0"/>
+                </a:tc>
+                <a:tc>
+                  <a:txBody>
+                    <a:bodyPr/>
+                    <a:lstStyle/>
+                    <a:p>
+                      <a:pPr>
+                        <a:lnSpc>
+                          <a:spcPct val="115000"/>
+                        </a:lnSpc>
+                        <a:spcAft>
+                          <a:spcPts val="0"/>
+                        </a:spcAft>
+                      </a:pPr>
+                      <a:r>
+                        <a:rPr lang="nl-NL" sz="1200" baseline="-25000">
+                          <a:effectLst/>
+                        </a:rPr>
+                        <a:t>103,15</a:t>
+                      </a:r>
+                      <a:endParaRPr lang="nl-NL" sz="1100">
+                        <a:effectLst/>
+                        <a:latin typeface="Calibri"/>
+                        <a:ea typeface="Calibri"/>
+                        <a:cs typeface="Times New Roman"/>
+                      </a:endParaRPr>
+                    </a:p>
+                  </a:txBody>
+                  <a:tcPr marL="68580" marR="68580" marT="0" marB="0"/>
+                </a:tc>
+                <a:tc>
+                  <a:txBody>
+                    <a:bodyPr/>
+                    <a:lstStyle/>
+                    <a:p>
+                      <a:pPr>
+                        <a:lnSpc>
+                          <a:spcPct val="115000"/>
+                        </a:lnSpc>
+                        <a:spcAft>
+                          <a:spcPts val="0"/>
+                        </a:spcAft>
+                      </a:pPr>
+                      <a:r>
+                        <a:rPr lang="nl-NL" sz="1200" baseline="-25000">
+                          <a:effectLst/>
+                        </a:rPr>
+                        <a:t>47</a:t>
+                      </a:r>
+                      <a:endParaRPr lang="nl-NL" sz="1100">
+                        <a:effectLst/>
+                        <a:latin typeface="Calibri"/>
+                        <a:ea typeface="Calibri"/>
+                        <a:cs typeface="Times New Roman"/>
+                      </a:endParaRPr>
+                    </a:p>
+                  </a:txBody>
+                  <a:tcPr marL="68580" marR="68580" marT="0" marB="0"/>
+                </a:tc>
+                <a:tc>
+                  <a:txBody>
+                    <a:bodyPr/>
+                    <a:lstStyle/>
+                    <a:p>
+                      <a:pPr>
+                        <a:lnSpc>
+                          <a:spcPct val="115000"/>
+                        </a:lnSpc>
+                        <a:spcAft>
+                          <a:spcPts val="0"/>
+                        </a:spcAft>
+                      </a:pPr>
+                      <a:r>
+                        <a:rPr lang="nl-NL" sz="1200" baseline="-25000">
+                          <a:effectLst/>
+                        </a:rPr>
+                        <a:t>222</a:t>
+                      </a:r>
+                      <a:endParaRPr lang="nl-NL" sz="1100">
+                        <a:effectLst/>
+                        <a:latin typeface="Calibri"/>
+                        <a:ea typeface="Calibri"/>
+                        <a:cs typeface="Times New Roman"/>
+                      </a:endParaRPr>
+                    </a:p>
+                  </a:txBody>
+                  <a:tcPr marL="68580" marR="68580" marT="0" marB="0"/>
+                </a:tc>
+              </a:tr>
+              <a:tr h="391239">
+                <a:tc>
+                  <a:txBody>
+                    <a:bodyPr/>
+                    <a:lstStyle/>
+                    <a:p>
+                      <a:pPr>
+                        <a:lnSpc>
+                          <a:spcPct val="115000"/>
+                        </a:lnSpc>
+                        <a:spcAft>
+                          <a:spcPts val="0"/>
+                        </a:spcAft>
+                      </a:pPr>
+                      <a:r>
+                        <a:rPr lang="nl-NL" sz="1200" baseline="-25000" dirty="0">
+                          <a:effectLst/>
+                        </a:rPr>
+                        <a:t>EditStarTotalGenes</a:t>
+                      </a:r>
+                      <a:endParaRPr lang="nl-NL" sz="1100" dirty="0">
+                        <a:effectLst/>
+                        <a:latin typeface="Calibri"/>
+                        <a:ea typeface="Calibri"/>
+                        <a:cs typeface="Times New Roman"/>
+                      </a:endParaRPr>
+                    </a:p>
+                  </a:txBody>
+                  <a:tcPr marL="68580" marR="68580" marT="0" marB="0">
+                    <a:solidFill>
+                      <a:srgbClr val="D52525"/>
+                    </a:solidFill>
+                  </a:tcPr>
+                </a:tc>
+                <a:tc>
+                  <a:txBody>
+                    <a:bodyPr/>
+                    <a:lstStyle/>
+                    <a:p>
+                      <a:pPr>
+                        <a:lnSpc>
+                          <a:spcPct val="115000"/>
+                        </a:lnSpc>
+                        <a:spcAft>
+                          <a:spcPts val="0"/>
+                        </a:spcAft>
+                      </a:pPr>
+                      <a:r>
+                        <a:rPr lang="nl-NL" sz="1200" baseline="-25000">
+                          <a:effectLst/>
+                        </a:rPr>
+                        <a:t> </a:t>
+                      </a:r>
+                      <a:endParaRPr lang="nl-NL" sz="1100">
+                        <a:effectLst/>
+                        <a:latin typeface="Calibri"/>
+                        <a:ea typeface="Calibri"/>
+                        <a:cs typeface="Times New Roman"/>
+                      </a:endParaRPr>
+                    </a:p>
+                  </a:txBody>
+                  <a:tcPr marL="68580" marR="68580" marT="0" marB="0"/>
+                </a:tc>
+                <a:tc>
+                  <a:txBody>
+                    <a:bodyPr/>
+                    <a:lstStyle/>
+                    <a:p>
+                      <a:pPr>
+                        <a:lnSpc>
+                          <a:spcPct val="115000"/>
+                        </a:lnSpc>
+                        <a:spcAft>
+                          <a:spcPts val="0"/>
+                        </a:spcAft>
+                      </a:pPr>
+                      <a:r>
+                        <a:rPr lang="nl-NL" sz="1200" baseline="-25000">
+                          <a:effectLst/>
+                        </a:rPr>
+                        <a:t> </a:t>
+                      </a:r>
+                      <a:endParaRPr lang="nl-NL" sz="1100">
+                        <a:effectLst/>
+                        <a:latin typeface="Calibri"/>
+                        <a:ea typeface="Calibri"/>
+                        <a:cs typeface="Times New Roman"/>
+                      </a:endParaRPr>
+                    </a:p>
+                  </a:txBody>
+                  <a:tcPr marL="68580" marR="68580" marT="0" marB="0"/>
+                </a:tc>
+                <a:tc>
+                  <a:txBody>
+                    <a:bodyPr/>
+                    <a:lstStyle/>
+                    <a:p>
+                      <a:pPr>
+                        <a:lnSpc>
+                          <a:spcPct val="115000"/>
+                        </a:lnSpc>
+                        <a:spcAft>
+                          <a:spcPts val="0"/>
+                        </a:spcAft>
+                      </a:pPr>
+                      <a:r>
+                        <a:rPr lang="nl-NL" sz="1200" baseline="-25000" dirty="0">
+                          <a:effectLst/>
+                        </a:rPr>
+                        <a:t> </a:t>
+                      </a:r>
+                      <a:endParaRPr lang="nl-NL" sz="1100" dirty="0">
+                        <a:effectLst/>
+                        <a:latin typeface="Calibri"/>
+                        <a:ea typeface="Calibri"/>
+                        <a:cs typeface="Times New Roman"/>
+                      </a:endParaRPr>
+                    </a:p>
+                  </a:txBody>
+                  <a:tcPr marL="68580" marR="68580" marT="0" marB="0"/>
+                </a:tc>
+                <a:tc>
+                  <a:txBody>
+                    <a:bodyPr/>
+                    <a:lstStyle/>
+                    <a:p>
+                      <a:pPr>
+                        <a:lnSpc>
+                          <a:spcPct val="115000"/>
+                        </a:lnSpc>
+                        <a:spcAft>
+                          <a:spcPts val="0"/>
+                        </a:spcAft>
+                      </a:pPr>
+                      <a:r>
+                        <a:rPr lang="nl-NL" sz="1200" baseline="-25000" dirty="0">
+                          <a:effectLst/>
+                        </a:rPr>
+                        <a:t> </a:t>
+                      </a:r>
+                      <a:endParaRPr lang="nl-NL" sz="1100" dirty="0">
+                        <a:effectLst/>
+                        <a:latin typeface="Calibri"/>
+                        <a:ea typeface="Calibri"/>
+                        <a:cs typeface="Times New Roman"/>
+                      </a:endParaRPr>
+                    </a:p>
+                  </a:txBody>
+                  <a:tcPr marL="68580" marR="68580" marT="0" marB="0"/>
+                </a:tc>
+                <a:tc>
+                  <a:txBody>
+                    <a:bodyPr/>
+                    <a:lstStyle/>
+                    <a:p>
+                      <a:pPr>
+                        <a:lnSpc>
+                          <a:spcPct val="115000"/>
+                        </a:lnSpc>
+                        <a:spcAft>
+                          <a:spcPts val="0"/>
+                        </a:spcAft>
+                      </a:pPr>
+                      <a:r>
+                        <a:rPr lang="nl-NL" sz="1200" baseline="-25000">
+                          <a:effectLst/>
+                        </a:rPr>
+                        <a:t> </a:t>
+                      </a:r>
+                      <a:endParaRPr lang="nl-NL" sz="1100">
+                        <a:effectLst/>
+                        <a:latin typeface="Calibri"/>
+                        <a:ea typeface="Calibri"/>
+                        <a:cs typeface="Times New Roman"/>
+                      </a:endParaRPr>
+                    </a:p>
+                  </a:txBody>
+                  <a:tcPr marL="68580" marR="68580" marT="0" marB="0"/>
+                </a:tc>
+                <a:tc>
+                  <a:txBody>
+                    <a:bodyPr/>
+                    <a:lstStyle/>
+                    <a:p>
+                      <a:pPr>
+                        <a:lnSpc>
+                          <a:spcPct val="115000"/>
+                        </a:lnSpc>
+                        <a:spcAft>
+                          <a:spcPts val="0"/>
+                        </a:spcAft>
+                      </a:pPr>
+                      <a:r>
+                        <a:rPr lang="nl-NL" sz="1200" baseline="-25000">
+                          <a:effectLst/>
+                        </a:rPr>
+                        <a:t> </a:t>
+                      </a:r>
+                      <a:endParaRPr lang="nl-NL" sz="1100">
+                        <a:effectLst/>
+                        <a:latin typeface="Calibri"/>
+                        <a:ea typeface="Calibri"/>
+                        <a:cs typeface="Times New Roman"/>
+                      </a:endParaRPr>
+                    </a:p>
+                  </a:txBody>
+                  <a:tcPr marL="68580" marR="68580" marT="0" marB="0"/>
+                </a:tc>
+                <a:tc>
+                  <a:txBody>
+                    <a:bodyPr/>
+                    <a:lstStyle/>
+                    <a:p>
+                      <a:pPr>
+                        <a:lnSpc>
+                          <a:spcPct val="115000"/>
+                        </a:lnSpc>
+                        <a:spcAft>
+                          <a:spcPts val="0"/>
+                        </a:spcAft>
+                      </a:pPr>
+                      <a:r>
+                        <a:rPr lang="nl-NL" sz="1200" baseline="-25000">
+                          <a:effectLst/>
+                        </a:rPr>
+                        <a:t> </a:t>
+                      </a:r>
+                      <a:endParaRPr lang="nl-NL" sz="1100">
+                        <a:effectLst/>
+                        <a:latin typeface="Calibri"/>
+                        <a:ea typeface="Calibri"/>
+                        <a:cs typeface="Times New Roman"/>
+                      </a:endParaRPr>
+                    </a:p>
+                  </a:txBody>
+                  <a:tcPr marL="68580" marR="68580" marT="0" marB="0"/>
+                </a:tc>
+                <a:tc>
+                  <a:txBody>
+                    <a:bodyPr/>
+                    <a:lstStyle/>
+                    <a:p>
+                      <a:pPr>
+                        <a:lnSpc>
+                          <a:spcPct val="115000"/>
+                        </a:lnSpc>
+                        <a:spcAft>
+                          <a:spcPts val="0"/>
+                        </a:spcAft>
+                      </a:pPr>
+                      <a:r>
+                        <a:rPr lang="nl-NL" sz="1200" baseline="-25000" dirty="0">
+                          <a:effectLst/>
+                        </a:rPr>
+                        <a:t> </a:t>
+                      </a:r>
+                      <a:endParaRPr lang="nl-NL" sz="1100" dirty="0">
+                        <a:effectLst/>
+                        <a:latin typeface="Calibri"/>
+                        <a:ea typeface="Calibri"/>
+                        <a:cs typeface="Times New Roman"/>
+                      </a:endParaRPr>
+                    </a:p>
+                  </a:txBody>
+                  <a:tcPr marL="68580" marR="68580" marT="0" marB="0"/>
+                </a:tc>
+              </a:tr>
+            </a:tbl>
+          </a:graphicData>
+        </a:graphic>
+      </p:graphicFrame>
+    </p:spTree>
+    <p:extLst>
+      <p:ext uri="{BB962C8B-B14F-4D97-AF65-F5344CB8AC3E}">
+        <p14:creationId xmlns:p14="http://schemas.microsoft.com/office/powerpoint/2010/main" val="3100453233"/>
+      </p:ext>
+    </p:extLst>
+  </p:cSld>
+  <p:clrMapOvr>
+    <a:masterClrMapping/>
+  </p:clrMapOvr>
+</p:sld>
+</file>
+
+<file path=ppt/slides/slide16.xml><?xml version="1.0" encoding="utf-8"?>
+<p:sld xmlns:a="http://schemas.openxmlformats.org/drawingml/2006/main" xmlns:r="http://schemas.openxmlformats.org/officeDocument/2006/relationships" xmlns:p="http://schemas.openxmlformats.org/presentationml/2006/main">
+  <p:cSld>
+    <p:spTree>
+      <p:nvGrpSpPr>
+        <p:cNvPr id="1" name=""/>
+        <p:cNvGrpSpPr/>
+        <p:nvPr/>
+      </p:nvGrpSpPr>
+      <p:grpSpPr>
+        <a:xfrm>
+          <a:off x="0" y="0"/>
+          <a:ext cx="0" cy="0"/>
+          <a:chOff x="0" y="0"/>
+          <a:chExt cx="0" cy="0"/>
+        </a:xfrm>
+      </p:grpSpPr>
       <p:sp>
         <p:nvSpPr>
           <p:cNvPr id="2" name="Title 1"/>
@@ -6272,17 +8547,13 @@
           <a:p>
             <a:r>
               <a:rPr lang="nl-NL" dirty="0" smtClean="0"/>
-              <a:t>Geen absolute zekerheid dat 13 laagst mogelijk is, maar vrij aannemelijk dat het hier niet ver meer onder kan</a:t>
-            </a:r>
-          </a:p>
-          <a:p>
-            <a:endParaRPr lang="nl-NL" dirty="0"/>
-          </a:p>
-          <a:p>
+              <a:t>Geen absolute zekerheid dat 13 laagst mogelijk is, maar vrij aannemelijk dat het hier niet ver meer onder </a:t>
+            </a:r>
             <a:r>
               <a:rPr lang="nl-NL" dirty="0" smtClean="0"/>
-              <a:t>EditStar beste in het algemeen: verplaatst iets meer genen maar consistent de minste swaps bij random sample</a:t>
-            </a:r>
+              <a:t>kan</a:t>
+            </a:r>
+            <a:endParaRPr lang="nl-NL" dirty="0" smtClean="0"/>
           </a:p>
           <a:p>
             <a:endParaRPr lang="nl-NL" dirty="0"/>
@@ -7328,10 +9599,10 @@
           <a:lstStyle/>
           <a:p>
             <a:r>
-              <a:rPr lang="nl-NL" smtClean="0"/>
+              <a:rPr lang="nl-NL" dirty="0" smtClean="0"/>
               <a:t>BeamSearch</a:t>
             </a:r>
-            <a:endParaRPr lang="nl-NL"/>
+            <a:endParaRPr lang="nl-NL" dirty="0"/>
           </a:p>
         </p:txBody>
       </p:sp>
@@ -7360,6 +9631,93 @@
           </a:p>
           <a:p>
             <a:endParaRPr lang="nl-NL" dirty="0"/>
+          </a:p>
+        </p:txBody>
+      </p:sp>
+      <p:sp>
+        <p:nvSpPr>
+          <p:cNvPr id="4" name="TextBox 3"/>
+          <p:cNvSpPr txBox="1"/>
+          <p:nvPr/>
+        </p:nvSpPr>
+        <p:spPr>
+          <a:xfrm>
+            <a:off x="5089585" y="1402514"/>
+            <a:ext cx="4054415" cy="4401205"/>
+          </a:xfrm>
+          <a:prstGeom prst="rect">
+            <a:avLst/>
+          </a:prstGeom>
+          <a:noFill/>
+        </p:spPr>
+        <p:txBody>
+          <a:bodyPr wrap="square" rtlCol="0">
+            <a:spAutoFit/>
+          </a:bodyPr>
+          <a:lstStyle/>
+          <a:p>
+            <a:pPr algn="ctr"/>
+            <a:r>
+              <a:rPr lang="nl-NL" sz="4000" dirty="0" smtClean="0"/>
+              <a:t>1</a:t>
+            </a:r>
+          </a:p>
+          <a:p>
+            <a:pPr algn="ctr"/>
+            <a:r>
+              <a:rPr lang="nl-NL" sz="4000" dirty="0" smtClean="0">
+                <a:solidFill>
+                  <a:srgbClr val="FF0000"/>
+                </a:solidFill>
+              </a:rPr>
+              <a:t>V</a:t>
+            </a:r>
+          </a:p>
+          <a:p>
+            <a:pPr algn="ctr"/>
+            <a:r>
+              <a:rPr lang="nl-NL" sz="4000" dirty="0" smtClean="0"/>
+              <a:t>300</a:t>
+            </a:r>
+            <a:endParaRPr lang="nl-NL" sz="4000" dirty="0" smtClean="0"/>
+          </a:p>
+          <a:p>
+            <a:pPr algn="ctr"/>
+            <a:r>
+              <a:rPr lang="nl-NL" sz="4000" dirty="0" smtClean="0">
+                <a:solidFill>
+                  <a:srgbClr val="FF0000"/>
+                </a:solidFill>
+              </a:rPr>
+              <a:t>V</a:t>
+            </a:r>
+            <a:endParaRPr lang="nl-NL" sz="4000" dirty="0" smtClean="0"/>
+          </a:p>
+          <a:p>
+            <a:pPr algn="ctr"/>
+            <a:r>
+              <a:rPr lang="nl-NL" sz="4000" dirty="0" smtClean="0"/>
+              <a:t>90.000</a:t>
+            </a:r>
+          </a:p>
+          <a:p>
+            <a:pPr algn="ctr"/>
+            <a:r>
+              <a:rPr lang="nl-NL" sz="4000" dirty="0" smtClean="0">
+                <a:solidFill>
+                  <a:srgbClr val="FF0000"/>
+                </a:solidFill>
+              </a:rPr>
+              <a:t>V</a:t>
+            </a:r>
+          </a:p>
+          <a:p>
+            <a:pPr algn="ctr"/>
+            <a:r>
+              <a:rPr lang="nl-NL" sz="4000" dirty="0" smtClean="0"/>
+              <a:t>27.000.000</a:t>
+            </a:r>
+            <a:endParaRPr lang="nl-NL" sz="4000" dirty="0"/>
           </a:p>
         </p:txBody>
       </p:sp>

</xml_diff>

<commit_message>
Presentatie vrijwel klaar: moet nog uitleg beam/editstar en elementscore
</commit_message>
<xml_diff>
--- a/Fruitvliegen_Presentatie.pptx
+++ b/Fruitvliegen_Presentatie.pptx
@@ -3363,21 +3363,21 @@
       </p:sp>
       <p:graphicFrame>
         <p:nvGraphicFramePr>
-          <p:cNvPr id="6" name="Table 5"/>
+          <p:cNvPr id="7" name="Table 6"/>
           <p:cNvGraphicFramePr>
             <a:graphicFrameLocks noGrp="1"/>
           </p:cNvGraphicFramePr>
           <p:nvPr>
             <p:extLst>
               <p:ext uri="{D42A27DB-BD31-4B8C-83A1-F6EECF244321}">
-                <p14:modId xmlns:p14="http://schemas.microsoft.com/office/powerpoint/2010/main" val="1784473852"/>
+                <p14:modId xmlns:p14="http://schemas.microsoft.com/office/powerpoint/2010/main" val="2232500880"/>
               </p:ext>
             </p:extLst>
           </p:nvPr>
         </p:nvGraphicFramePr>
         <p:xfrm>
-          <a:off x="685800" y="3429000"/>
-          <a:ext cx="7239000" cy="2667000"/>
+          <a:off x="685800" y="3048000"/>
+          <a:ext cx="6769735" cy="3451694"/>
         </p:xfrm>
         <a:graphic>
           <a:graphicData uri="http://schemas.openxmlformats.org/drawingml/2006/table">
@@ -3386,12 +3386,12 @@
                 <a:tableStyleId>{5C22544A-7EE6-4342-B048-85BDC9FD1C3A}</a:tableStyleId>
               </a:tblPr>
               <a:tblGrid>
-                <a:gridCol w="1788395"/>
-                <a:gridCol w="1788395"/>
-                <a:gridCol w="2011265"/>
-                <a:gridCol w="1650945"/>
+                <a:gridCol w="2240360"/>
+                <a:gridCol w="1376169"/>
+                <a:gridCol w="1707321"/>
+                <a:gridCol w="1445885"/>
               </a:tblGrid>
-              <a:tr h="333375">
+              <a:tr h="620483">
                 <a:tc>
                   <a:txBody>
                     <a:bodyPr/>
@@ -3399,7 +3399,361 @@
                     <a:p>
                       <a:pPr algn="l">
                         <a:lnSpc>
-                          <a:spcPct val="150000"/>
+                          <a:spcPct val="200000"/>
+                        </a:lnSpc>
+                        <a:spcAft>
+                          <a:spcPts val="0"/>
+                        </a:spcAft>
+                      </a:pPr>
+                      <a:r>
+                        <a:rPr lang="nl-NL" sz="1200">
+                          <a:effectLst/>
+                        </a:rPr>
+                        <a:t> </a:t>
+                      </a:r>
+                      <a:endParaRPr lang="nl-NL" sz="1100">
+                        <a:effectLst/>
+                        <a:latin typeface="Calibri"/>
+                        <a:ea typeface="Calibri"/>
+                        <a:cs typeface="Times New Roman"/>
+                      </a:endParaRPr>
+                    </a:p>
+                  </a:txBody>
+                  <a:tcPr marL="68580" marR="68580" marT="0" marB="0"/>
+                </a:tc>
+                <a:tc>
+                  <a:txBody>
+                    <a:bodyPr/>
+                    <a:lstStyle/>
+                    <a:p>
+                      <a:pPr algn="l">
+                        <a:lnSpc>
+                          <a:spcPct val="200000"/>
+                        </a:lnSpc>
+                        <a:spcAft>
+                          <a:spcPts val="0"/>
+                        </a:spcAft>
+                      </a:pPr>
+                      <a:r>
+                        <a:rPr lang="nl-NL" sz="1200">
+                          <a:effectLst/>
+                        </a:rPr>
+                        <a:t>Aantal inversies</a:t>
+                      </a:r>
+                      <a:endParaRPr lang="nl-NL" sz="1100">
+                        <a:effectLst/>
+                        <a:latin typeface="Calibri"/>
+                        <a:ea typeface="Calibri"/>
+                        <a:cs typeface="Times New Roman"/>
+                      </a:endParaRPr>
+                    </a:p>
+                  </a:txBody>
+                  <a:tcPr marL="68580" marR="68580" marT="0" marB="0"/>
+                </a:tc>
+                <a:tc>
+                  <a:txBody>
+                    <a:bodyPr/>
+                    <a:lstStyle/>
+                    <a:p>
+                      <a:pPr algn="l">
+                        <a:lnSpc>
+                          <a:spcPct val="200000"/>
+                        </a:lnSpc>
+                        <a:spcAft>
+                          <a:spcPts val="0"/>
+                        </a:spcAft>
+                      </a:pPr>
+                      <a:r>
+                        <a:rPr lang="nl-NL" sz="1200">
+                          <a:effectLst/>
+                        </a:rPr>
+                        <a:t>Gem. grootte inversies</a:t>
+                      </a:r>
+                      <a:endParaRPr lang="nl-NL" sz="1100">
+                        <a:effectLst/>
+                        <a:latin typeface="Calibri"/>
+                        <a:ea typeface="Calibri"/>
+                        <a:cs typeface="Times New Roman"/>
+                      </a:endParaRPr>
+                    </a:p>
+                  </a:txBody>
+                  <a:tcPr marL="68580" marR="68580" marT="0" marB="0"/>
+                </a:tc>
+                <a:tc>
+                  <a:txBody>
+                    <a:bodyPr/>
+                    <a:lstStyle/>
+                    <a:p>
+                      <a:pPr algn="l">
+                        <a:lnSpc>
+                          <a:spcPct val="200000"/>
+                        </a:lnSpc>
+                        <a:spcAft>
+                          <a:spcPts val="0"/>
+                        </a:spcAft>
+                      </a:pPr>
+                      <a:r>
+                        <a:rPr lang="nl-NL" sz="1200">
+                          <a:effectLst/>
+                        </a:rPr>
+                        <a:t>Genen verplaatst</a:t>
+                      </a:r>
+                      <a:endParaRPr lang="nl-NL" sz="1100">
+                        <a:effectLst/>
+                        <a:latin typeface="Calibri"/>
+                        <a:ea typeface="Calibri"/>
+                        <a:cs typeface="Times New Roman"/>
+                      </a:endParaRPr>
+                    </a:p>
+                  </a:txBody>
+                  <a:tcPr marL="68580" marR="68580" marT="0" marB="0"/>
+                </a:tc>
+              </a:tr>
+              <a:tr h="300881">
+                <a:tc>
+                  <a:txBody>
+                    <a:bodyPr/>
+                    <a:lstStyle/>
+                    <a:p>
+                      <a:pPr algn="l">
+                        <a:lnSpc>
+                          <a:spcPct val="200000"/>
+                        </a:lnSpc>
+                        <a:spcAft>
+                          <a:spcPts val="0"/>
+                        </a:spcAft>
+                      </a:pPr>
+                      <a:r>
+                        <a:rPr lang="nl-NL" sz="1200">
+                          <a:effectLst/>
+                        </a:rPr>
+                        <a:t>Find&amp;Swap</a:t>
+                      </a:r>
+                      <a:endParaRPr lang="nl-NL" sz="1100">
+                        <a:effectLst/>
+                        <a:latin typeface="Calibri"/>
+                        <a:ea typeface="Calibri"/>
+                        <a:cs typeface="Times New Roman"/>
+                      </a:endParaRPr>
+                    </a:p>
+                  </a:txBody>
+                  <a:tcPr marL="68580" marR="68580" marT="0" marB="0"/>
+                </a:tc>
+                <a:tc>
+                  <a:txBody>
+                    <a:bodyPr/>
+                    <a:lstStyle/>
+                    <a:p>
+                      <a:pPr algn="l">
+                        <a:lnSpc>
+                          <a:spcPct val="200000"/>
+                        </a:lnSpc>
+                        <a:spcAft>
+                          <a:spcPts val="0"/>
+                        </a:spcAft>
+                      </a:pPr>
+                      <a:r>
+                        <a:rPr lang="nl-NL" sz="1200">
+                          <a:effectLst/>
+                        </a:rPr>
+                        <a:t>18</a:t>
+                      </a:r>
+                      <a:endParaRPr lang="nl-NL" sz="1100">
+                        <a:effectLst/>
+                        <a:latin typeface="Calibri"/>
+                        <a:ea typeface="Calibri"/>
+                        <a:cs typeface="Times New Roman"/>
+                      </a:endParaRPr>
+                    </a:p>
+                  </a:txBody>
+                  <a:tcPr marL="68580" marR="68580" marT="0" marB="0"/>
+                </a:tc>
+                <a:tc>
+                  <a:txBody>
+                    <a:bodyPr/>
+                    <a:lstStyle/>
+                    <a:p>
+                      <a:pPr algn="l">
+                        <a:lnSpc>
+                          <a:spcPct val="200000"/>
+                        </a:lnSpc>
+                        <a:spcAft>
+                          <a:spcPts val="0"/>
+                        </a:spcAft>
+                      </a:pPr>
+                      <a:r>
+                        <a:rPr lang="nl-NL" sz="1200">
+                          <a:effectLst/>
+                        </a:rPr>
+                        <a:t>8</a:t>
+                      </a:r>
+                      <a:endParaRPr lang="nl-NL" sz="1100">
+                        <a:effectLst/>
+                        <a:latin typeface="Calibri"/>
+                        <a:ea typeface="Calibri"/>
+                        <a:cs typeface="Times New Roman"/>
+                      </a:endParaRPr>
+                    </a:p>
+                  </a:txBody>
+                  <a:tcPr marL="68580" marR="68580" marT="0" marB="0"/>
+                </a:tc>
+                <a:tc>
+                  <a:txBody>
+                    <a:bodyPr/>
+                    <a:lstStyle/>
+                    <a:p>
+                      <a:pPr algn="l">
+                        <a:lnSpc>
+                          <a:spcPct val="200000"/>
+                        </a:lnSpc>
+                        <a:spcAft>
+                          <a:spcPts val="0"/>
+                        </a:spcAft>
+                      </a:pPr>
+                      <a:r>
+                        <a:rPr lang="nl-NL" sz="1200">
+                          <a:effectLst/>
+                        </a:rPr>
+                        <a:t>147</a:t>
+                      </a:r>
+                      <a:endParaRPr lang="nl-NL" sz="1100">
+                        <a:effectLst/>
+                        <a:latin typeface="Calibri"/>
+                        <a:ea typeface="Calibri"/>
+                        <a:cs typeface="Times New Roman"/>
+                      </a:endParaRPr>
+                    </a:p>
+                  </a:txBody>
+                  <a:tcPr marL="68580" marR="68580" marT="0" marB="0"/>
+                </a:tc>
+              </a:tr>
+              <a:tr h="300881">
+                <a:tc>
+                  <a:txBody>
+                    <a:bodyPr/>
+                    <a:lstStyle/>
+                    <a:p>
+                      <a:pPr algn="l">
+                        <a:lnSpc>
+                          <a:spcPct val="200000"/>
+                        </a:lnSpc>
+                        <a:spcAft>
+                          <a:spcPts val="0"/>
+                        </a:spcAft>
+                      </a:pPr>
+                      <a:r>
+                        <a:rPr lang="nl-NL" sz="1200">
+                          <a:effectLst/>
+                        </a:rPr>
+                        <a:t>Find&amp;SwapRev</a:t>
+                      </a:r>
+                      <a:endParaRPr lang="nl-NL" sz="1100">
+                        <a:effectLst/>
+                        <a:latin typeface="Calibri"/>
+                        <a:ea typeface="Calibri"/>
+                        <a:cs typeface="Times New Roman"/>
+                      </a:endParaRPr>
+                    </a:p>
+                  </a:txBody>
+                  <a:tcPr marL="68580" marR="68580" marT="0" marB="0"/>
+                </a:tc>
+                <a:tc>
+                  <a:txBody>
+                    <a:bodyPr/>
+                    <a:lstStyle/>
+                    <a:p>
+                      <a:pPr algn="l">
+                        <a:lnSpc>
+                          <a:spcPct val="200000"/>
+                        </a:lnSpc>
+                        <a:spcAft>
+                          <a:spcPts val="0"/>
+                        </a:spcAft>
+                      </a:pPr>
+                      <a:r>
+                        <a:rPr lang="nl-NL" sz="1200">
+                          <a:effectLst/>
+                        </a:rPr>
+                        <a:t>16</a:t>
+                      </a:r>
+                      <a:endParaRPr lang="nl-NL" sz="1100">
+                        <a:effectLst/>
+                        <a:latin typeface="Calibri"/>
+                        <a:ea typeface="Calibri"/>
+                        <a:cs typeface="Times New Roman"/>
+                      </a:endParaRPr>
+                    </a:p>
+                  </a:txBody>
+                  <a:tcPr marL="68580" marR="68580" marT="0" marB="0"/>
+                </a:tc>
+                <a:tc>
+                  <a:txBody>
+                    <a:bodyPr/>
+                    <a:lstStyle/>
+                    <a:p>
+                      <a:pPr algn="l">
+                        <a:lnSpc>
+                          <a:spcPct val="200000"/>
+                        </a:lnSpc>
+                        <a:spcAft>
+                          <a:spcPts val="0"/>
+                        </a:spcAft>
+                      </a:pPr>
+                      <a:r>
+                        <a:rPr lang="nl-NL" sz="1200">
+                          <a:effectLst/>
+                        </a:rPr>
+                        <a:t>10</a:t>
+                      </a:r>
+                      <a:endParaRPr lang="nl-NL" sz="1100">
+                        <a:effectLst/>
+                        <a:latin typeface="Calibri"/>
+                        <a:ea typeface="Calibri"/>
+                        <a:cs typeface="Times New Roman"/>
+                      </a:endParaRPr>
+                    </a:p>
+                  </a:txBody>
+                  <a:tcPr marL="68580" marR="68580" marT="0" marB="0"/>
+                </a:tc>
+                <a:tc>
+                  <a:txBody>
+                    <a:bodyPr/>
+                    <a:lstStyle/>
+                    <a:p>
+                      <a:pPr algn="l">
+                        <a:lnSpc>
+                          <a:spcPct val="200000"/>
+                        </a:lnSpc>
+                        <a:spcAft>
+                          <a:spcPts val="0"/>
+                        </a:spcAft>
+                      </a:pPr>
+                      <a:r>
+                        <a:rPr lang="nl-NL" sz="1200">
+                          <a:effectLst/>
+                        </a:rPr>
+                        <a:t>161</a:t>
+                      </a:r>
+                      <a:endParaRPr lang="nl-NL" sz="1100">
+                        <a:effectLst/>
+                        <a:latin typeface="Calibri"/>
+                        <a:ea typeface="Calibri"/>
+                        <a:cs typeface="Times New Roman"/>
+                      </a:endParaRPr>
+                    </a:p>
+                  </a:txBody>
+                  <a:tcPr marL="68580" marR="68580" marT="0" marB="0"/>
+                </a:tc>
+              </a:tr>
+              <a:tr h="300881">
+                <a:tc>
+                  <a:txBody>
+                    <a:bodyPr/>
+                    <a:lstStyle/>
+                    <a:p>
+                      <a:pPr algn="l">
+                        <a:lnSpc>
+                          <a:spcPct val="200000"/>
                         </a:lnSpc>
                         <a:spcAft>
                           <a:spcPts val="0"/>
@@ -3409,7 +3763,7 @@
                         <a:rPr lang="nl-NL" sz="1200" dirty="0">
                           <a:effectLst/>
                         </a:rPr>
-                        <a:t> </a:t>
+                        <a:t>Find&amp;SwapIteratief</a:t>
                       </a:r>
                       <a:endParaRPr lang="nl-NL" sz="1100" dirty="0">
                         <a:effectLst/>
@@ -3428,7 +3782,7 @@
                     <a:p>
                       <a:pPr algn="l">
                         <a:lnSpc>
-                          <a:spcPct val="150000"/>
+                          <a:spcPct val="200000"/>
                         </a:lnSpc>
                         <a:spcAft>
                           <a:spcPts val="0"/>
@@ -3438,7 +3792,7 @@
                         <a:rPr lang="nl-NL" sz="1200">
                           <a:effectLst/>
                         </a:rPr>
-                        <a:t>Aantal inversies</a:t>
+                        <a:t>17</a:t>
                       </a:r>
                       <a:endParaRPr lang="nl-NL" sz="1100">
                         <a:effectLst/>
@@ -3457,7 +3811,7 @@
                     <a:p>
                       <a:pPr algn="l">
                         <a:lnSpc>
-                          <a:spcPct val="150000"/>
+                          <a:spcPct val="200000"/>
                         </a:lnSpc>
                         <a:spcAft>
                           <a:spcPts val="0"/>
@@ -3467,7 +3821,7 @@
                         <a:rPr lang="nl-NL" sz="1200">
                           <a:effectLst/>
                         </a:rPr>
-                        <a:t>Gem. grootte inversies</a:t>
+                        <a:t>11</a:t>
                       </a:r>
                       <a:endParaRPr lang="nl-NL" sz="1100">
                         <a:effectLst/>
@@ -3486,7 +3840,7 @@
                     <a:p>
                       <a:pPr algn="l">
                         <a:lnSpc>
-                          <a:spcPct val="150000"/>
+                          <a:spcPct val="200000"/>
                         </a:lnSpc>
                         <a:spcAft>
                           <a:spcPts val="0"/>
@@ -3496,7 +3850,7 @@
                         <a:rPr lang="nl-NL" sz="1200">
                           <a:effectLst/>
                         </a:rPr>
-                        <a:t>Genen verplaatst</a:t>
+                        <a:t>187</a:t>
                       </a:r>
                       <a:endParaRPr lang="nl-NL" sz="1100">
                         <a:effectLst/>
@@ -3509,7 +3863,7 @@
                   <a:tcPr marL="68580" marR="68580" marT="0" marB="0"/>
                 </a:tc>
               </a:tr>
-              <a:tr h="333375">
+              <a:tr h="300881">
                 <a:tc>
                   <a:txBody>
                     <a:bodyPr/>
@@ -3517,7 +3871,7 @@
                     <a:p>
                       <a:pPr algn="l">
                         <a:lnSpc>
-                          <a:spcPct val="150000"/>
+                          <a:spcPct val="200000"/>
                         </a:lnSpc>
                         <a:spcAft>
                           <a:spcPts val="0"/>
@@ -3527,7 +3881,7 @@
                         <a:rPr lang="nl-NL" sz="1200">
                           <a:effectLst/>
                         </a:rPr>
-                        <a:t>Find&amp;Swap</a:t>
+                        <a:t>Find&amp;SwapLoHi</a:t>
                       </a:r>
                       <a:endParaRPr lang="nl-NL" sz="1100">
                         <a:effectLst/>
@@ -3546,19 +3900,19 @@
                     <a:p>
                       <a:pPr algn="l">
                         <a:lnSpc>
-                          <a:spcPct val="150000"/>
-                        </a:lnSpc>
-                        <a:spcAft>
-                          <a:spcPts val="0"/>
-                        </a:spcAft>
-                      </a:pPr>
-                      <a:r>
-                        <a:rPr lang="nl-NL" sz="1400">
+                          <a:spcPct val="200000"/>
+                        </a:lnSpc>
+                        <a:spcAft>
+                          <a:spcPts val="0"/>
+                        </a:spcAft>
+                      </a:pPr>
+                      <a:r>
+                        <a:rPr lang="nl-NL" sz="1200">
                           <a:effectLst/>
                         </a:rPr>
                         <a:t>18</a:t>
                       </a:r>
-                      <a:endParaRPr lang="nl-NL" sz="1200">
+                      <a:endParaRPr lang="nl-NL" sz="1100">
                         <a:effectLst/>
                         <a:latin typeface="Calibri"/>
                         <a:ea typeface="Calibri"/>
@@ -3575,19 +3929,19 @@
                     <a:p>
                       <a:pPr algn="l">
                         <a:lnSpc>
-                          <a:spcPct val="150000"/>
-                        </a:lnSpc>
-                        <a:spcAft>
-                          <a:spcPts val="0"/>
-                        </a:spcAft>
-                      </a:pPr>
-                      <a:r>
-                        <a:rPr lang="nl-NL" sz="1400">
-                          <a:effectLst/>
-                        </a:rPr>
-                        <a:t>8</a:t>
-                      </a:r>
-                      <a:endParaRPr lang="nl-NL" sz="1200">
+                          <a:spcPct val="200000"/>
+                        </a:lnSpc>
+                        <a:spcAft>
+                          <a:spcPts val="0"/>
+                        </a:spcAft>
+                      </a:pPr>
+                      <a:r>
+                        <a:rPr lang="nl-NL" sz="1200">
+                          <a:effectLst/>
+                        </a:rPr>
+                        <a:t>10</a:t>
+                      </a:r>
+                      <a:endParaRPr lang="nl-NL" sz="1100">
                         <a:effectLst/>
                         <a:latin typeface="Calibri"/>
                         <a:ea typeface="Calibri"/>
@@ -3604,19 +3958,19 @@
                     <a:p>
                       <a:pPr algn="l">
                         <a:lnSpc>
-                          <a:spcPct val="150000"/>
-                        </a:lnSpc>
-                        <a:spcAft>
-                          <a:spcPts val="0"/>
-                        </a:spcAft>
-                      </a:pPr>
-                      <a:r>
-                        <a:rPr lang="nl-NL" sz="1400">
-                          <a:effectLst/>
-                        </a:rPr>
-                        <a:t>147</a:t>
-                      </a:r>
-                      <a:endParaRPr lang="nl-NL" sz="1200">
+                          <a:spcPct val="200000"/>
+                        </a:lnSpc>
+                        <a:spcAft>
+                          <a:spcPts val="0"/>
+                        </a:spcAft>
+                      </a:pPr>
+                      <a:r>
+                        <a:rPr lang="nl-NL" sz="1200">
+                          <a:effectLst/>
+                        </a:rPr>
+                        <a:t>182</a:t>
+                      </a:r>
+                      <a:endParaRPr lang="nl-NL" sz="1100">
                         <a:effectLst/>
                         <a:latin typeface="Calibri"/>
                         <a:ea typeface="Calibri"/>
@@ -3627,7 +3981,7 @@
                   <a:tcPr marL="68580" marR="68580" marT="0" marB="0"/>
                 </a:tc>
               </a:tr>
-              <a:tr h="333375">
+              <a:tr h="300881">
                 <a:tc>
                   <a:txBody>
                     <a:bodyPr/>
@@ -3635,361 +3989,7 @@
                     <a:p>
                       <a:pPr algn="l">
                         <a:lnSpc>
-                          <a:spcPct val="150000"/>
-                        </a:lnSpc>
-                        <a:spcAft>
-                          <a:spcPts val="0"/>
-                        </a:spcAft>
-                      </a:pPr>
-                      <a:r>
-                        <a:rPr lang="nl-NL" sz="1200">
-                          <a:effectLst/>
-                        </a:rPr>
-                        <a:t>Find&amp;SwapRev</a:t>
-                      </a:r>
-                      <a:endParaRPr lang="nl-NL" sz="1100">
-                        <a:effectLst/>
-                        <a:latin typeface="Calibri"/>
-                        <a:ea typeface="Calibri"/>
-                        <a:cs typeface="Times New Roman"/>
-                      </a:endParaRPr>
-                    </a:p>
-                  </a:txBody>
-                  <a:tcPr marL="68580" marR="68580" marT="0" marB="0"/>
-                </a:tc>
-                <a:tc>
-                  <a:txBody>
-                    <a:bodyPr/>
-                    <a:lstStyle/>
-                    <a:p>
-                      <a:pPr algn="l">
-                        <a:lnSpc>
-                          <a:spcPct val="150000"/>
-                        </a:lnSpc>
-                        <a:spcAft>
-                          <a:spcPts val="0"/>
-                        </a:spcAft>
-                      </a:pPr>
-                      <a:r>
-                        <a:rPr lang="nl-NL" sz="1400">
-                          <a:effectLst/>
-                        </a:rPr>
-                        <a:t>16</a:t>
-                      </a:r>
-                      <a:endParaRPr lang="nl-NL" sz="1200">
-                        <a:effectLst/>
-                        <a:latin typeface="Calibri"/>
-                        <a:ea typeface="Calibri"/>
-                        <a:cs typeface="Times New Roman"/>
-                      </a:endParaRPr>
-                    </a:p>
-                  </a:txBody>
-                  <a:tcPr marL="68580" marR="68580" marT="0" marB="0"/>
-                </a:tc>
-                <a:tc>
-                  <a:txBody>
-                    <a:bodyPr/>
-                    <a:lstStyle/>
-                    <a:p>
-                      <a:pPr algn="l">
-                        <a:lnSpc>
-                          <a:spcPct val="150000"/>
-                        </a:lnSpc>
-                        <a:spcAft>
-                          <a:spcPts val="0"/>
-                        </a:spcAft>
-                      </a:pPr>
-                      <a:r>
-                        <a:rPr lang="nl-NL" sz="1400">
-                          <a:effectLst/>
-                        </a:rPr>
-                        <a:t>10</a:t>
-                      </a:r>
-                      <a:endParaRPr lang="nl-NL" sz="1200">
-                        <a:effectLst/>
-                        <a:latin typeface="Calibri"/>
-                        <a:ea typeface="Calibri"/>
-                        <a:cs typeface="Times New Roman"/>
-                      </a:endParaRPr>
-                    </a:p>
-                  </a:txBody>
-                  <a:tcPr marL="68580" marR="68580" marT="0" marB="0"/>
-                </a:tc>
-                <a:tc>
-                  <a:txBody>
-                    <a:bodyPr/>
-                    <a:lstStyle/>
-                    <a:p>
-                      <a:pPr algn="l">
-                        <a:lnSpc>
-                          <a:spcPct val="150000"/>
-                        </a:lnSpc>
-                        <a:spcAft>
-                          <a:spcPts val="0"/>
-                        </a:spcAft>
-                      </a:pPr>
-                      <a:r>
-                        <a:rPr lang="nl-NL" sz="1400">
-                          <a:effectLst/>
-                        </a:rPr>
-                        <a:t>161</a:t>
-                      </a:r>
-                      <a:endParaRPr lang="nl-NL" sz="1200">
-                        <a:effectLst/>
-                        <a:latin typeface="Calibri"/>
-                        <a:ea typeface="Calibri"/>
-                        <a:cs typeface="Times New Roman"/>
-                      </a:endParaRPr>
-                    </a:p>
-                  </a:txBody>
-                  <a:tcPr marL="68580" marR="68580" marT="0" marB="0"/>
-                </a:tc>
-              </a:tr>
-              <a:tr h="333375">
-                <a:tc>
-                  <a:txBody>
-                    <a:bodyPr/>
-                    <a:lstStyle/>
-                    <a:p>
-                      <a:pPr algn="l">
-                        <a:lnSpc>
-                          <a:spcPct val="150000"/>
-                        </a:lnSpc>
-                        <a:spcAft>
-                          <a:spcPts val="0"/>
-                        </a:spcAft>
-                      </a:pPr>
-                      <a:r>
-                        <a:rPr lang="nl-NL" sz="1200" dirty="0">
-                          <a:effectLst/>
-                        </a:rPr>
-                        <a:t>Find&amp;SwapIteratief</a:t>
-                      </a:r>
-                      <a:endParaRPr lang="nl-NL" sz="1100" dirty="0">
-                        <a:effectLst/>
-                        <a:latin typeface="Calibri"/>
-                        <a:ea typeface="Calibri"/>
-                        <a:cs typeface="Times New Roman"/>
-                      </a:endParaRPr>
-                    </a:p>
-                  </a:txBody>
-                  <a:tcPr marL="68580" marR="68580" marT="0" marB="0"/>
-                </a:tc>
-                <a:tc>
-                  <a:txBody>
-                    <a:bodyPr/>
-                    <a:lstStyle/>
-                    <a:p>
-                      <a:pPr algn="l">
-                        <a:lnSpc>
-                          <a:spcPct val="150000"/>
-                        </a:lnSpc>
-                        <a:spcAft>
-                          <a:spcPts val="0"/>
-                        </a:spcAft>
-                      </a:pPr>
-                      <a:r>
-                        <a:rPr lang="nl-NL" sz="1400">
-                          <a:effectLst/>
-                        </a:rPr>
-                        <a:t>17</a:t>
-                      </a:r>
-                      <a:endParaRPr lang="nl-NL" sz="1200">
-                        <a:effectLst/>
-                        <a:latin typeface="Calibri"/>
-                        <a:ea typeface="Calibri"/>
-                        <a:cs typeface="Times New Roman"/>
-                      </a:endParaRPr>
-                    </a:p>
-                  </a:txBody>
-                  <a:tcPr marL="68580" marR="68580" marT="0" marB="0"/>
-                </a:tc>
-                <a:tc>
-                  <a:txBody>
-                    <a:bodyPr/>
-                    <a:lstStyle/>
-                    <a:p>
-                      <a:pPr algn="l">
-                        <a:lnSpc>
-                          <a:spcPct val="150000"/>
-                        </a:lnSpc>
-                        <a:spcAft>
-                          <a:spcPts val="0"/>
-                        </a:spcAft>
-                      </a:pPr>
-                      <a:r>
-                        <a:rPr lang="nl-NL" sz="1400">
-                          <a:effectLst/>
-                        </a:rPr>
-                        <a:t>11</a:t>
-                      </a:r>
-                      <a:endParaRPr lang="nl-NL" sz="1200">
-                        <a:effectLst/>
-                        <a:latin typeface="Calibri"/>
-                        <a:ea typeface="Calibri"/>
-                        <a:cs typeface="Times New Roman"/>
-                      </a:endParaRPr>
-                    </a:p>
-                  </a:txBody>
-                  <a:tcPr marL="68580" marR="68580" marT="0" marB="0"/>
-                </a:tc>
-                <a:tc>
-                  <a:txBody>
-                    <a:bodyPr/>
-                    <a:lstStyle/>
-                    <a:p>
-                      <a:pPr algn="l">
-                        <a:lnSpc>
-                          <a:spcPct val="150000"/>
-                        </a:lnSpc>
-                        <a:spcAft>
-                          <a:spcPts val="0"/>
-                        </a:spcAft>
-                      </a:pPr>
-                      <a:r>
-                        <a:rPr lang="nl-NL" sz="1400">
-                          <a:effectLst/>
-                        </a:rPr>
-                        <a:t>187</a:t>
-                      </a:r>
-                      <a:endParaRPr lang="nl-NL" sz="1200">
-                        <a:effectLst/>
-                        <a:latin typeface="Calibri"/>
-                        <a:ea typeface="Calibri"/>
-                        <a:cs typeface="Times New Roman"/>
-                      </a:endParaRPr>
-                    </a:p>
-                  </a:txBody>
-                  <a:tcPr marL="68580" marR="68580" marT="0" marB="0"/>
-                </a:tc>
-              </a:tr>
-              <a:tr h="333375">
-                <a:tc>
-                  <a:txBody>
-                    <a:bodyPr/>
-                    <a:lstStyle/>
-                    <a:p>
-                      <a:pPr algn="l">
-                        <a:lnSpc>
-                          <a:spcPct val="150000"/>
-                        </a:lnSpc>
-                        <a:spcAft>
-                          <a:spcPts val="0"/>
-                        </a:spcAft>
-                      </a:pPr>
-                      <a:r>
-                        <a:rPr lang="nl-NL" sz="1200">
-                          <a:effectLst/>
-                        </a:rPr>
-                        <a:t>Find&amp;SwapLoHi</a:t>
-                      </a:r>
-                      <a:endParaRPr lang="nl-NL" sz="1100">
-                        <a:effectLst/>
-                        <a:latin typeface="Calibri"/>
-                        <a:ea typeface="Calibri"/>
-                        <a:cs typeface="Times New Roman"/>
-                      </a:endParaRPr>
-                    </a:p>
-                  </a:txBody>
-                  <a:tcPr marL="68580" marR="68580" marT="0" marB="0"/>
-                </a:tc>
-                <a:tc>
-                  <a:txBody>
-                    <a:bodyPr/>
-                    <a:lstStyle/>
-                    <a:p>
-                      <a:pPr algn="l">
-                        <a:lnSpc>
-                          <a:spcPct val="150000"/>
-                        </a:lnSpc>
-                        <a:spcAft>
-                          <a:spcPts val="0"/>
-                        </a:spcAft>
-                      </a:pPr>
-                      <a:r>
-                        <a:rPr lang="nl-NL" sz="1400">
-                          <a:effectLst/>
-                        </a:rPr>
-                        <a:t>18</a:t>
-                      </a:r>
-                      <a:endParaRPr lang="nl-NL" sz="1200">
-                        <a:effectLst/>
-                        <a:latin typeface="Calibri"/>
-                        <a:ea typeface="Calibri"/>
-                        <a:cs typeface="Times New Roman"/>
-                      </a:endParaRPr>
-                    </a:p>
-                  </a:txBody>
-                  <a:tcPr marL="68580" marR="68580" marT="0" marB="0"/>
-                </a:tc>
-                <a:tc>
-                  <a:txBody>
-                    <a:bodyPr/>
-                    <a:lstStyle/>
-                    <a:p>
-                      <a:pPr algn="l">
-                        <a:lnSpc>
-                          <a:spcPct val="150000"/>
-                        </a:lnSpc>
-                        <a:spcAft>
-                          <a:spcPts val="0"/>
-                        </a:spcAft>
-                      </a:pPr>
-                      <a:r>
-                        <a:rPr lang="nl-NL" sz="1400">
-                          <a:effectLst/>
-                        </a:rPr>
-                        <a:t>10</a:t>
-                      </a:r>
-                      <a:endParaRPr lang="nl-NL" sz="1200">
-                        <a:effectLst/>
-                        <a:latin typeface="Calibri"/>
-                        <a:ea typeface="Calibri"/>
-                        <a:cs typeface="Times New Roman"/>
-                      </a:endParaRPr>
-                    </a:p>
-                  </a:txBody>
-                  <a:tcPr marL="68580" marR="68580" marT="0" marB="0"/>
-                </a:tc>
-                <a:tc>
-                  <a:txBody>
-                    <a:bodyPr/>
-                    <a:lstStyle/>
-                    <a:p>
-                      <a:pPr algn="l">
-                        <a:lnSpc>
-                          <a:spcPct val="150000"/>
-                        </a:lnSpc>
-                        <a:spcAft>
-                          <a:spcPts val="0"/>
-                        </a:spcAft>
-                      </a:pPr>
-                      <a:r>
-                        <a:rPr lang="nl-NL" sz="1400">
-                          <a:effectLst/>
-                        </a:rPr>
-                        <a:t>182</a:t>
-                      </a:r>
-                      <a:endParaRPr lang="nl-NL" sz="1200">
-                        <a:effectLst/>
-                        <a:latin typeface="Calibri"/>
-                        <a:ea typeface="Calibri"/>
-                        <a:cs typeface="Times New Roman"/>
-                      </a:endParaRPr>
-                    </a:p>
-                  </a:txBody>
-                  <a:tcPr marL="68580" marR="68580" marT="0" marB="0"/>
-                </a:tc>
-              </a:tr>
-              <a:tr h="333375">
-                <a:tc>
-                  <a:txBody>
-                    <a:bodyPr/>
-                    <a:lstStyle/>
-                    <a:p>
-                      <a:pPr algn="l">
-                        <a:lnSpc>
-                          <a:spcPct val="150000"/>
+                          <a:spcPct val="200000"/>
                         </a:lnSpc>
                         <a:spcAft>
                           <a:spcPts val="0"/>
@@ -4021,19 +4021,19 @@
                     <a:p>
                       <a:pPr algn="l">
                         <a:lnSpc>
-                          <a:spcPct val="150000"/>
-                        </a:lnSpc>
-                        <a:spcAft>
-                          <a:spcPts val="0"/>
-                        </a:spcAft>
-                      </a:pPr>
-                      <a:r>
-                        <a:rPr lang="nl-NL" sz="1400">
+                          <a:spcPct val="200000"/>
+                        </a:lnSpc>
+                        <a:spcAft>
+                          <a:spcPts val="0"/>
+                        </a:spcAft>
+                      </a:pPr>
+                      <a:r>
+                        <a:rPr lang="nl-NL" sz="1200">
                           <a:effectLst/>
                         </a:rPr>
                         <a:t>18</a:t>
                       </a:r>
-                      <a:endParaRPr lang="nl-NL" sz="1200">
+                      <a:endParaRPr lang="nl-NL" sz="1100">
                         <a:effectLst/>
                         <a:latin typeface="Calibri"/>
                         <a:ea typeface="Calibri"/>
@@ -4050,19 +4050,19 @@
                     <a:p>
                       <a:pPr algn="l">
                         <a:lnSpc>
-                          <a:spcPct val="150000"/>
-                        </a:lnSpc>
-                        <a:spcAft>
-                          <a:spcPts val="0"/>
-                        </a:spcAft>
-                      </a:pPr>
-                      <a:r>
-                        <a:rPr lang="nl-NL" sz="1400">
+                          <a:spcPct val="200000"/>
+                        </a:lnSpc>
+                        <a:spcAft>
+                          <a:spcPts val="0"/>
+                        </a:spcAft>
+                      </a:pPr>
+                      <a:r>
+                        <a:rPr lang="nl-NL" sz="1200">
                           <a:effectLst/>
                         </a:rPr>
                         <a:t>7</a:t>
                       </a:r>
-                      <a:endParaRPr lang="nl-NL" sz="1200">
+                      <a:endParaRPr lang="nl-NL" sz="1100">
                         <a:effectLst/>
                         <a:latin typeface="Calibri"/>
                         <a:ea typeface="Calibri"/>
@@ -4079,19 +4079,19 @@
                     <a:p>
                       <a:pPr algn="l">
                         <a:lnSpc>
-                          <a:spcPct val="150000"/>
-                        </a:lnSpc>
-                        <a:spcAft>
-                          <a:spcPts val="0"/>
-                        </a:spcAft>
-                      </a:pPr>
-                      <a:r>
-                        <a:rPr lang="nl-NL" sz="1400">
+                          <a:spcPct val="200000"/>
+                        </a:lnSpc>
+                        <a:spcAft>
+                          <a:spcPts val="0"/>
+                        </a:spcAft>
+                      </a:pPr>
+                      <a:r>
+                        <a:rPr lang="nl-NL" sz="1200">
                           <a:effectLst/>
                         </a:rPr>
                         <a:t>132</a:t>
                       </a:r>
-                      <a:endParaRPr lang="nl-NL" sz="1200">
+                      <a:endParaRPr lang="nl-NL" sz="1100">
                         <a:effectLst/>
                         <a:latin typeface="Calibri"/>
                         <a:ea typeface="Calibri"/>
@@ -4102,7 +4102,7 @@
                   <a:tcPr marL="68580" marR="68580" marT="0" marB="0"/>
                 </a:tc>
               </a:tr>
-              <a:tr h="333375">
+              <a:tr h="300881">
                 <a:tc>
                   <a:txBody>
                     <a:bodyPr/>
@@ -4110,7 +4110,7 @@
                     <a:p>
                       <a:pPr algn="l">
                         <a:lnSpc>
-                          <a:spcPct val="150000"/>
+                          <a:spcPct val="200000"/>
                         </a:lnSpc>
                         <a:spcAft>
                           <a:spcPts val="0"/>
@@ -4118,17 +4118,40 @@
                       </a:pPr>
                       <a:r>
                         <a:rPr lang="nl-NL" sz="1200">
-                          <a:solidFill>
-                            <a:schemeClr val="bg1"/>
-                          </a:solidFill>
                           <a:effectLst/>
                         </a:rPr>
                         <a:t>EditStar</a:t>
                       </a:r>
                       <a:endParaRPr lang="nl-NL" sz="1100">
-                        <a:solidFill>
-                          <a:schemeClr val="bg1"/>
-                        </a:solidFill>
+                        <a:effectLst/>
+                        <a:latin typeface="Calibri"/>
+                        <a:ea typeface="Calibri"/>
+                        <a:cs typeface="Times New Roman"/>
+                      </a:endParaRPr>
+                    </a:p>
+                  </a:txBody>
+                  <a:tcPr marL="68580" marR="68580" marT="0" marB="0"/>
+                </a:tc>
+                <a:tc>
+                  <a:txBody>
+                    <a:bodyPr/>
+                    <a:lstStyle/>
+                    <a:p>
+                      <a:pPr algn="l">
+                        <a:lnSpc>
+                          <a:spcPct val="200000"/>
+                        </a:lnSpc>
+                        <a:spcAft>
+                          <a:spcPts val="0"/>
+                        </a:spcAft>
+                      </a:pPr>
+                      <a:r>
+                        <a:rPr lang="nl-NL" sz="1200">
+                          <a:effectLst/>
+                        </a:rPr>
+                        <a:t>13</a:t>
+                      </a:r>
+                      <a:endParaRPr lang="nl-NL" sz="1100">
                         <a:effectLst/>
                         <a:latin typeface="Calibri"/>
                         <a:ea typeface="Calibri"/>
@@ -4138,7 +4161,10 @@
                   </a:txBody>
                   <a:tcPr marL="68580" marR="68580" marT="0" marB="0">
                     <a:solidFill>
-                      <a:srgbClr val="D52525"/>
+                      <a:schemeClr val="tx2">
+                        <a:lumMod val="40000"/>
+                        <a:lumOff val="60000"/>
+                      </a:schemeClr>
                     </a:solidFill>
                   </a:tcPr>
                 </a:tc>
@@ -4149,25 +4175,19 @@
                     <a:p>
                       <a:pPr algn="l">
                         <a:lnSpc>
-                          <a:spcPct val="150000"/>
-                        </a:lnSpc>
-                        <a:spcAft>
-                          <a:spcPts val="0"/>
-                        </a:spcAft>
-                      </a:pPr>
-                      <a:r>
-                        <a:rPr lang="nl-NL" sz="1400" dirty="0">
-                          <a:solidFill>
-                            <a:schemeClr val="bg1"/>
-                          </a:solidFill>
-                          <a:effectLst/>
-                        </a:rPr>
-                        <a:t>13</a:t>
-                      </a:r>
-                      <a:endParaRPr lang="nl-NL" sz="1200" dirty="0">
-                        <a:solidFill>
-                          <a:schemeClr val="bg1"/>
-                        </a:solidFill>
+                          <a:spcPct val="200000"/>
+                        </a:lnSpc>
+                        <a:spcAft>
+                          <a:spcPts val="0"/>
+                        </a:spcAft>
+                      </a:pPr>
+                      <a:r>
+                        <a:rPr lang="nl-NL" sz="1200">
+                          <a:effectLst/>
+                        </a:rPr>
+                        <a:t>9</a:t>
+                      </a:r>
+                      <a:endParaRPr lang="nl-NL" sz="1100">
                         <a:effectLst/>
                         <a:latin typeface="Calibri"/>
                         <a:ea typeface="Calibri"/>
@@ -4177,7 +4197,10 @@
                   </a:txBody>
                   <a:tcPr marL="68580" marR="68580" marT="0" marB="0">
                     <a:solidFill>
-                      <a:srgbClr val="D52525"/>
+                      <a:schemeClr val="tx2">
+                        <a:lumMod val="40000"/>
+                        <a:lumOff val="60000"/>
+                      </a:schemeClr>
                     </a:solidFill>
                   </a:tcPr>
                 </a:tc>
@@ -4188,25 +4211,19 @@
                     <a:p>
                       <a:pPr algn="l">
                         <a:lnSpc>
-                          <a:spcPct val="150000"/>
-                        </a:lnSpc>
-                        <a:spcAft>
-                          <a:spcPts val="0"/>
-                        </a:spcAft>
-                      </a:pPr>
-                      <a:r>
-                        <a:rPr lang="nl-NL" sz="1400">
-                          <a:solidFill>
-                            <a:schemeClr val="bg1"/>
-                          </a:solidFill>
-                          <a:effectLst/>
-                        </a:rPr>
-                        <a:t>9</a:t>
-                      </a:r>
-                      <a:endParaRPr lang="nl-NL" sz="1200">
-                        <a:solidFill>
-                          <a:schemeClr val="bg1"/>
-                        </a:solidFill>
+                          <a:spcPct val="200000"/>
+                        </a:lnSpc>
+                        <a:spcAft>
+                          <a:spcPts val="0"/>
+                        </a:spcAft>
+                      </a:pPr>
+                      <a:r>
+                        <a:rPr lang="nl-NL" sz="1200" dirty="0">
+                          <a:effectLst/>
+                        </a:rPr>
+                        <a:t>122</a:t>
+                      </a:r>
+                      <a:endParaRPr lang="nl-NL" sz="1100" dirty="0">
                         <a:effectLst/>
                         <a:latin typeface="Calibri"/>
                         <a:ea typeface="Calibri"/>
@@ -4216,10 +4233,15 @@
                   </a:txBody>
                   <a:tcPr marL="68580" marR="68580" marT="0" marB="0">
                     <a:solidFill>
-                      <a:srgbClr val="D52525"/>
+                      <a:schemeClr val="tx2">
+                        <a:lumMod val="40000"/>
+                        <a:lumOff val="60000"/>
+                      </a:schemeClr>
                     </a:solidFill>
                   </a:tcPr>
                 </a:tc>
+              </a:tr>
+              <a:tr h="300881">
                 <a:tc>
                   <a:txBody>
                     <a:bodyPr/>
@@ -4227,25 +4249,166 @@
                     <a:p>
                       <a:pPr algn="l">
                         <a:lnSpc>
-                          <a:spcPct val="150000"/>
-                        </a:lnSpc>
-                        <a:spcAft>
-                          <a:spcPts val="0"/>
-                        </a:spcAft>
-                      </a:pPr>
-                      <a:r>
-                        <a:rPr lang="nl-NL" sz="1400" dirty="0">
-                          <a:solidFill>
-                            <a:schemeClr val="bg1"/>
-                          </a:solidFill>
-                          <a:effectLst/>
-                        </a:rPr>
-                        <a:t>122</a:t>
-                      </a:r>
-                      <a:endParaRPr lang="nl-NL" sz="1200" dirty="0">
-                        <a:solidFill>
-                          <a:schemeClr val="bg1"/>
-                        </a:solidFill>
+                          <a:spcPct val="200000"/>
+                        </a:lnSpc>
+                        <a:spcAft>
+                          <a:spcPts val="0"/>
+                        </a:spcAft>
+                      </a:pPr>
+                      <a:r>
+                        <a:rPr lang="nl-NL" sz="1200">
+                          <a:effectLst/>
+                        </a:rPr>
+                        <a:t>EditStarTotalGenes</a:t>
+                      </a:r>
+                      <a:endParaRPr lang="nl-NL" sz="1100">
+                        <a:effectLst/>
+                        <a:latin typeface="Calibri"/>
+                        <a:ea typeface="Calibri"/>
+                        <a:cs typeface="Times New Roman"/>
+                      </a:endParaRPr>
+                    </a:p>
+                  </a:txBody>
+                  <a:tcPr marL="68580" marR="68580" marT="0" marB="0"/>
+                </a:tc>
+                <a:tc>
+                  <a:txBody>
+                    <a:bodyPr/>
+                    <a:lstStyle/>
+                    <a:p>
+                      <a:pPr algn="l">
+                        <a:lnSpc>
+                          <a:spcPct val="200000"/>
+                        </a:lnSpc>
+                        <a:spcAft>
+                          <a:spcPts val="0"/>
+                        </a:spcAft>
+                      </a:pPr>
+                      <a:r>
+                        <a:rPr lang="nl-NL" sz="1200">
+                          <a:effectLst/>
+                        </a:rPr>
+                        <a:t>15</a:t>
+                      </a:r>
+                      <a:endParaRPr lang="nl-NL" sz="1100">
+                        <a:effectLst/>
+                        <a:latin typeface="Calibri"/>
+                        <a:ea typeface="Calibri"/>
+                        <a:cs typeface="Times New Roman"/>
+                      </a:endParaRPr>
+                    </a:p>
+                  </a:txBody>
+                  <a:tcPr marL="68580" marR="68580" marT="0" marB="0"/>
+                </a:tc>
+                <a:tc>
+                  <a:txBody>
+                    <a:bodyPr/>
+                    <a:lstStyle/>
+                    <a:p>
+                      <a:pPr algn="l">
+                        <a:lnSpc>
+                          <a:spcPct val="200000"/>
+                        </a:lnSpc>
+                        <a:spcAft>
+                          <a:spcPts val="0"/>
+                        </a:spcAft>
+                      </a:pPr>
+                      <a:r>
+                        <a:rPr lang="nl-NL" sz="1200">
+                          <a:effectLst/>
+                        </a:rPr>
+                        <a:t>7</a:t>
+                      </a:r>
+                      <a:endParaRPr lang="nl-NL" sz="1100">
+                        <a:effectLst/>
+                        <a:latin typeface="Calibri"/>
+                        <a:ea typeface="Calibri"/>
+                        <a:cs typeface="Times New Roman"/>
+                      </a:endParaRPr>
+                    </a:p>
+                  </a:txBody>
+                  <a:tcPr marL="68580" marR="68580" marT="0" marB="0"/>
+                </a:tc>
+                <a:tc>
+                  <a:txBody>
+                    <a:bodyPr/>
+                    <a:lstStyle/>
+                    <a:p>
+                      <a:pPr algn="l">
+                        <a:lnSpc>
+                          <a:spcPct val="200000"/>
+                        </a:lnSpc>
+                        <a:spcAft>
+                          <a:spcPts val="0"/>
+                        </a:spcAft>
+                      </a:pPr>
+                      <a:r>
+                        <a:rPr lang="nl-NL" sz="1200">
+                          <a:effectLst/>
+                        </a:rPr>
+                        <a:t>111</a:t>
+                      </a:r>
+                      <a:endParaRPr lang="nl-NL" sz="1100">
+                        <a:effectLst/>
+                        <a:latin typeface="Calibri"/>
+                        <a:ea typeface="Calibri"/>
+                        <a:cs typeface="Times New Roman"/>
+                      </a:endParaRPr>
+                    </a:p>
+                  </a:txBody>
+                  <a:tcPr marL="68580" marR="68580" marT="0" marB="0"/>
+                </a:tc>
+              </a:tr>
+              <a:tr h="300881">
+                <a:tc>
+                  <a:txBody>
+                    <a:bodyPr/>
+                    <a:lstStyle/>
+                    <a:p>
+                      <a:pPr algn="l">
+                        <a:lnSpc>
+                          <a:spcPct val="200000"/>
+                        </a:lnSpc>
+                        <a:spcAft>
+                          <a:spcPts val="0"/>
+                        </a:spcAft>
+                      </a:pPr>
+                      <a:r>
+                        <a:rPr lang="nl-NL" sz="1200">
+                          <a:effectLst/>
+                        </a:rPr>
+                        <a:t>BeamSearch</a:t>
+                      </a:r>
+                      <a:endParaRPr lang="nl-NL" sz="1100">
+                        <a:effectLst/>
+                        <a:latin typeface="Calibri"/>
+                        <a:ea typeface="Calibri"/>
+                        <a:cs typeface="Times New Roman"/>
+                      </a:endParaRPr>
+                    </a:p>
+                  </a:txBody>
+                  <a:tcPr marL="68580" marR="68580" marT="0" marB="0"/>
+                </a:tc>
+                <a:tc>
+                  <a:txBody>
+                    <a:bodyPr/>
+                    <a:lstStyle/>
+                    <a:p>
+                      <a:pPr algn="l">
+                        <a:lnSpc>
+                          <a:spcPct val="200000"/>
+                        </a:lnSpc>
+                        <a:spcAft>
+                          <a:spcPts val="0"/>
+                        </a:spcAft>
+                      </a:pPr>
+                      <a:r>
+                        <a:rPr lang="nl-NL" sz="1200">
+                          <a:effectLst/>
+                        </a:rPr>
+                        <a:t>13</a:t>
+                      </a:r>
+                      <a:endParaRPr lang="nl-NL" sz="1100">
                         <a:effectLst/>
                         <a:latin typeface="Calibri"/>
                         <a:ea typeface="Calibri"/>
@@ -4255,12 +4418,13 @@
                   </a:txBody>
                   <a:tcPr marL="68580" marR="68580" marT="0" marB="0">
                     <a:solidFill>
-                      <a:srgbClr val="D52525"/>
+                      <a:schemeClr val="tx2">
+                        <a:lumMod val="40000"/>
+                        <a:lumOff val="60000"/>
+                      </a:schemeClr>
                     </a:solidFill>
                   </a:tcPr>
                 </a:tc>
-              </a:tr>
-              <a:tr h="333375">
                 <a:tc>
                   <a:txBody>
                     <a:bodyPr/>
@@ -4268,25 +4432,19 @@
                     <a:p>
                       <a:pPr algn="l">
                         <a:lnSpc>
-                          <a:spcPct val="150000"/>
-                        </a:lnSpc>
-                        <a:spcAft>
-                          <a:spcPts val="0"/>
-                        </a:spcAft>
-                      </a:pPr>
-                      <a:r>
-                        <a:rPr lang="nl-NL" sz="1200" dirty="0">
-                          <a:solidFill>
-                            <a:schemeClr val="bg1"/>
-                          </a:solidFill>
-                          <a:effectLst/>
-                        </a:rPr>
-                        <a:t>BeamSearch</a:t>
-                      </a:r>
-                      <a:endParaRPr lang="nl-NL" sz="1100" dirty="0">
-                        <a:solidFill>
-                          <a:schemeClr val="bg1"/>
-                        </a:solidFill>
+                          <a:spcPct val="200000"/>
+                        </a:lnSpc>
+                        <a:spcAft>
+                          <a:spcPts val="0"/>
+                        </a:spcAft>
+                      </a:pPr>
+                      <a:r>
+                        <a:rPr lang="nl-NL" sz="1200">
+                          <a:effectLst/>
+                        </a:rPr>
+                        <a:t>9</a:t>
+                      </a:r>
+                      <a:endParaRPr lang="nl-NL" sz="1100">
                         <a:effectLst/>
                         <a:latin typeface="Calibri"/>
                         <a:ea typeface="Calibri"/>
@@ -4296,7 +4454,10 @@
                   </a:txBody>
                   <a:tcPr marL="68580" marR="68580" marT="0" marB="0">
                     <a:solidFill>
-                      <a:srgbClr val="D52525"/>
+                      <a:schemeClr val="tx2">
+                        <a:lumMod val="40000"/>
+                        <a:lumOff val="60000"/>
+                      </a:schemeClr>
                     </a:solidFill>
                   </a:tcPr>
                 </a:tc>
@@ -4307,25 +4468,19 @@
                     <a:p>
                       <a:pPr algn="l">
                         <a:lnSpc>
-                          <a:spcPct val="150000"/>
-                        </a:lnSpc>
-                        <a:spcAft>
-                          <a:spcPts val="0"/>
-                        </a:spcAft>
-                      </a:pPr>
-                      <a:r>
-                        <a:rPr lang="nl-NL" sz="1400">
-                          <a:solidFill>
-                            <a:schemeClr val="bg1"/>
-                          </a:solidFill>
-                          <a:effectLst/>
-                        </a:rPr>
-                        <a:t>13</a:t>
-                      </a:r>
-                      <a:endParaRPr lang="nl-NL" sz="1200">
-                        <a:solidFill>
-                          <a:schemeClr val="bg1"/>
-                        </a:solidFill>
+                          <a:spcPct val="200000"/>
+                        </a:lnSpc>
+                        <a:spcAft>
+                          <a:spcPts val="0"/>
+                        </a:spcAft>
+                      </a:pPr>
+                      <a:r>
+                        <a:rPr lang="nl-NL" sz="1200">
+                          <a:effectLst/>
+                        </a:rPr>
+                        <a:t>116</a:t>
+                      </a:r>
+                      <a:endParaRPr lang="nl-NL" sz="1100">
                         <a:effectLst/>
                         <a:latin typeface="Calibri"/>
                         <a:ea typeface="Calibri"/>
@@ -4335,10 +4490,15 @@
                   </a:txBody>
                   <a:tcPr marL="68580" marR="68580" marT="0" marB="0">
                     <a:solidFill>
-                      <a:srgbClr val="D52525"/>
+                      <a:schemeClr val="tx2">
+                        <a:lumMod val="40000"/>
+                        <a:lumOff val="60000"/>
+                      </a:schemeClr>
                     </a:solidFill>
                   </a:tcPr>
                 </a:tc>
+              </a:tr>
+              <a:tr h="300881">
                 <a:tc>
                   <a:txBody>
                     <a:bodyPr/>
@@ -4346,25 +4506,48 @@
                     <a:p>
                       <a:pPr algn="l">
                         <a:lnSpc>
-                          <a:spcPct val="150000"/>
-                        </a:lnSpc>
-                        <a:spcAft>
-                          <a:spcPts val="0"/>
-                        </a:spcAft>
-                      </a:pPr>
-                      <a:r>
-                        <a:rPr lang="nl-NL" sz="1400">
-                          <a:solidFill>
-                            <a:schemeClr val="bg1"/>
-                          </a:solidFill>
-                          <a:effectLst/>
-                        </a:rPr>
-                        <a:t>9</a:t>
-                      </a:r>
-                      <a:endParaRPr lang="nl-NL" sz="1200">
-                        <a:solidFill>
-                          <a:schemeClr val="bg1"/>
-                        </a:solidFill>
+                          <a:spcPct val="200000"/>
+                        </a:lnSpc>
+                        <a:spcAft>
+                          <a:spcPts val="0"/>
+                        </a:spcAft>
+                      </a:pPr>
+                      <a:r>
+                        <a:rPr lang="nl-NL" sz="1200">
+                          <a:effectLst/>
+                        </a:rPr>
+                        <a:t>BeamSearchTotalGenes</a:t>
+                      </a:r>
+                      <a:endParaRPr lang="nl-NL" sz="1100">
+                        <a:effectLst/>
+                        <a:latin typeface="Calibri"/>
+                        <a:ea typeface="Calibri"/>
+                        <a:cs typeface="Times New Roman"/>
+                      </a:endParaRPr>
+                    </a:p>
+                  </a:txBody>
+                  <a:tcPr marL="68580" marR="68580" marT="0" marB="0"/>
+                </a:tc>
+                <a:tc>
+                  <a:txBody>
+                    <a:bodyPr/>
+                    <a:lstStyle/>
+                    <a:p>
+                      <a:pPr algn="l">
+                        <a:lnSpc>
+                          <a:spcPct val="200000"/>
+                        </a:lnSpc>
+                        <a:spcAft>
+                          <a:spcPts val="0"/>
+                        </a:spcAft>
+                      </a:pPr>
+                      <a:r>
+                        <a:rPr lang="nl-NL" sz="1200">
+                          <a:effectLst/>
+                        </a:rPr>
+                        <a:t>15</a:t>
+                      </a:r>
+                      <a:endParaRPr lang="nl-NL" sz="1100">
                         <a:effectLst/>
                         <a:latin typeface="Calibri"/>
                         <a:ea typeface="Calibri"/>
@@ -4374,7 +4557,10 @@
                   </a:txBody>
                   <a:tcPr marL="68580" marR="68580" marT="0" marB="0">
                     <a:solidFill>
-                      <a:srgbClr val="D52525"/>
+                      <a:schemeClr val="tx2">
+                        <a:lumMod val="40000"/>
+                        <a:lumOff val="60000"/>
+                      </a:schemeClr>
                     </a:solidFill>
                   </a:tcPr>
                 </a:tc>
@@ -4385,25 +4571,19 @@
                     <a:p>
                       <a:pPr algn="l">
                         <a:lnSpc>
-                          <a:spcPct val="150000"/>
-                        </a:lnSpc>
-                        <a:spcAft>
-                          <a:spcPts val="0"/>
-                        </a:spcAft>
-                      </a:pPr>
-                      <a:r>
-                        <a:rPr lang="nl-NL" sz="1400" dirty="0">
-                          <a:solidFill>
-                            <a:schemeClr val="bg1"/>
-                          </a:solidFill>
-                          <a:effectLst/>
-                        </a:rPr>
-                        <a:t>116</a:t>
-                      </a:r>
-                      <a:endParaRPr lang="nl-NL" sz="1200" dirty="0">
-                        <a:solidFill>
-                          <a:schemeClr val="bg1"/>
-                        </a:solidFill>
+                          <a:spcPct val="200000"/>
+                        </a:lnSpc>
+                        <a:spcAft>
+                          <a:spcPts val="0"/>
+                        </a:spcAft>
+                      </a:pPr>
+                      <a:r>
+                        <a:rPr lang="nl-NL" sz="1200">
+                          <a:effectLst/>
+                        </a:rPr>
+                        <a:t>7</a:t>
+                      </a:r>
+                      <a:endParaRPr lang="nl-NL" sz="1100">
                         <a:effectLst/>
                         <a:latin typeface="Calibri"/>
                         <a:ea typeface="Calibri"/>
@@ -4413,7 +4593,46 @@
                   </a:txBody>
                   <a:tcPr marL="68580" marR="68580" marT="0" marB="0">
                     <a:solidFill>
-                      <a:srgbClr val="D52525"/>
+                      <a:schemeClr val="tx2">
+                        <a:lumMod val="40000"/>
+                        <a:lumOff val="60000"/>
+                      </a:schemeClr>
+                    </a:solidFill>
+                  </a:tcPr>
+                </a:tc>
+                <a:tc>
+                  <a:txBody>
+                    <a:bodyPr/>
+                    <a:lstStyle/>
+                    <a:p>
+                      <a:pPr algn="l">
+                        <a:lnSpc>
+                          <a:spcPct val="200000"/>
+                        </a:lnSpc>
+                        <a:spcAft>
+                          <a:spcPts val="0"/>
+                        </a:spcAft>
+                      </a:pPr>
+                      <a:r>
+                        <a:rPr lang="nl-NL" sz="1200" dirty="0">
+                          <a:effectLst/>
+                        </a:rPr>
+                        <a:t>90</a:t>
+                      </a:r>
+                      <a:endParaRPr lang="nl-NL" sz="1100" dirty="0">
+                        <a:effectLst/>
+                        <a:latin typeface="Calibri"/>
+                        <a:ea typeface="Calibri"/>
+                        <a:cs typeface="Times New Roman"/>
+                      </a:endParaRPr>
+                    </a:p>
+                  </a:txBody>
+                  <a:tcPr marL="68580" marR="68580" marT="0" marB="0">
+                    <a:solidFill>
+                      <a:schemeClr val="tx2">
+                        <a:lumMod val="40000"/>
+                        <a:lumOff val="60000"/>
+                      </a:schemeClr>
                     </a:solidFill>
                   </a:tcPr>
                 </a:tc>
@@ -4700,8 +4919,13 @@
           <a:p>
             <a:r>
               <a:rPr lang="nl-NL" dirty="0" smtClean="0"/>
-              <a:t>EditStar beste performance</a:t>
-            </a:r>
+              <a:t>EditStar beste </a:t>
+            </a:r>
+            <a:r>
+              <a:rPr lang="nl-NL" dirty="0" smtClean="0"/>
+              <a:t>performance inversies</a:t>
+            </a:r>
+            <a:endParaRPr lang="nl-NL" dirty="0" smtClean="0"/>
           </a:p>
           <a:p>
             <a:endParaRPr lang="nl-NL" dirty="0"/>
@@ -4720,14 +4944,14 @@
           <p:nvPr>
             <p:extLst>
               <p:ext uri="{D42A27DB-BD31-4B8C-83A1-F6EECF244321}">
-                <p14:modId xmlns:p14="http://schemas.microsoft.com/office/powerpoint/2010/main" val="2031630157"/>
+                <p14:modId xmlns:p14="http://schemas.microsoft.com/office/powerpoint/2010/main" val="1534658450"/>
               </p:ext>
             </p:extLst>
           </p:nvPr>
         </p:nvGraphicFramePr>
         <p:xfrm>
-          <a:off x="380999" y="3200400"/>
-          <a:ext cx="7772401" cy="2560320"/>
+          <a:off x="152400" y="2819400"/>
+          <a:ext cx="8153400" cy="2560320"/>
         </p:xfrm>
         <a:graphic>
           <a:graphicData uri="http://schemas.openxmlformats.org/drawingml/2006/table">
@@ -4736,12 +4960,12 @@
                 <a:tableStyleId>{5C22544A-7EE6-4342-B048-85BDC9FD1C3A}</a:tableStyleId>
               </a:tblPr>
               <a:tblGrid>
-                <a:gridCol w="1414073"/>
-                <a:gridCol w="1443256"/>
-                <a:gridCol w="1364881"/>
-                <a:gridCol w="1198127"/>
-                <a:gridCol w="1251488"/>
-                <a:gridCol w="1100576"/>
+                <a:gridCol w="1483390"/>
+                <a:gridCol w="1514004"/>
+                <a:gridCol w="1431786"/>
+                <a:gridCol w="1256859"/>
+                <a:gridCol w="1312835"/>
+                <a:gridCol w="1154526"/>
               </a:tblGrid>
               <a:tr h="0">
                 <a:tc>
@@ -4790,7 +5014,13 @@
                         <a:rPr lang="nl-NL" sz="1400" dirty="0">
                           <a:effectLst/>
                         </a:rPr>
-                        <a:t>Gemiddelde aantal mutaties</a:t>
+                        <a:t>Gemiddelde aantal </a:t>
+                      </a:r>
+                      <a:r>
+                        <a:rPr lang="nl-NL" sz="1400" dirty="0" smtClean="0">
+                          <a:effectLst/>
+                        </a:rPr>
+                        <a:t>inversies</a:t>
                       </a:r>
                       <a:endParaRPr lang="nl-NL" sz="2400" dirty="0">
                         <a:effectLst/>
@@ -4819,7 +5049,13 @@
                         <a:rPr lang="nl-NL" sz="1400" dirty="0">
                           <a:effectLst/>
                         </a:rPr>
-                        <a:t>Minimum aantal mutaties</a:t>
+                        <a:t>Minimum aantal </a:t>
+                      </a:r>
+                      <a:r>
+                        <a:rPr lang="nl-NL" sz="1400" dirty="0" smtClean="0">
+                          <a:effectLst/>
+                        </a:rPr>
+                        <a:t>inversies</a:t>
                       </a:r>
                       <a:endParaRPr lang="nl-NL" sz="2400" dirty="0">
                         <a:effectLst/>
@@ -4848,7 +5084,13 @@
                         <a:rPr lang="nl-NL" sz="1400" dirty="0">
                           <a:effectLst/>
                         </a:rPr>
-                        <a:t>Maximum aantal mutaties</a:t>
+                        <a:t>Maximum aantal </a:t>
+                      </a:r>
+                      <a:r>
+                        <a:rPr lang="nl-NL" sz="1400" dirty="0" smtClean="0">
+                          <a:effectLst/>
+                        </a:rPr>
+                        <a:t>inversies</a:t>
                       </a:r>
                       <a:endParaRPr lang="nl-NL" sz="2400" dirty="0">
                         <a:effectLst/>
@@ -6222,14 +6464,14 @@
           <p:nvPr>
             <p:extLst>
               <p:ext uri="{D42A27DB-BD31-4B8C-83A1-F6EECF244321}">
-                <p14:modId xmlns:p14="http://schemas.microsoft.com/office/powerpoint/2010/main" val="192629263"/>
+                <p14:modId xmlns:p14="http://schemas.microsoft.com/office/powerpoint/2010/main" val="3609227651"/>
               </p:ext>
             </p:extLst>
           </p:nvPr>
         </p:nvGraphicFramePr>
         <p:xfrm>
           <a:off x="457200" y="1905000"/>
-          <a:ext cx="7086600" cy="3276597"/>
+          <a:ext cx="7391400" cy="2885358"/>
         </p:xfrm>
         <a:graphic>
           <a:graphicData uri="http://schemas.openxmlformats.org/drawingml/2006/table">
@@ -6238,15 +6480,15 @@
                 <a:tableStyleId>{5C22544A-7EE6-4342-B048-85BDC9FD1C3A}</a:tableStyleId>
               </a:tblPr>
               <a:tblGrid>
-                <a:gridCol w="1351687"/>
-                <a:gridCol w="767045"/>
-                <a:gridCol w="790143"/>
-                <a:gridCol w="677835"/>
-                <a:gridCol w="665887"/>
-                <a:gridCol w="700934"/>
-                <a:gridCol w="778196"/>
-                <a:gridCol w="677038"/>
-                <a:gridCol w="677835"/>
+                <a:gridCol w="1409824"/>
+                <a:gridCol w="800036"/>
+                <a:gridCol w="824128"/>
+                <a:gridCol w="706989"/>
+                <a:gridCol w="694527"/>
+                <a:gridCol w="731082"/>
+                <a:gridCol w="811667"/>
+                <a:gridCol w="706158"/>
+                <a:gridCol w="706989"/>
               </a:tblGrid>
               <a:tr h="537924">
                 <a:tc>
@@ -6263,12 +6505,12 @@
                         </a:spcAft>
                       </a:pPr>
                       <a:r>
-                        <a:rPr lang="nl-NL" sz="1200" baseline="-25000" dirty="0">
+                        <a:rPr lang="nl-NL" sz="1800" baseline="-25000" dirty="0">
                           <a:effectLst/>
                         </a:rPr>
                         <a:t> </a:t>
                       </a:r>
-                      <a:endParaRPr lang="nl-NL" sz="1100" dirty="0">
+                      <a:endParaRPr lang="nl-NL" sz="1600" dirty="0">
                         <a:effectLst/>
                         <a:latin typeface="Calibri"/>
                         <a:ea typeface="Calibri"/>
@@ -6292,12 +6534,12 @@
                         </a:spcAft>
                       </a:pPr>
                       <a:r>
-                        <a:rPr lang="nl-NL" sz="800" dirty="0">
+                        <a:rPr lang="nl-NL" sz="1050" dirty="0">
                           <a:effectLst/>
                         </a:rPr>
                         <a:t>Grootte</a:t>
                       </a:r>
-                      <a:endParaRPr lang="nl-NL" sz="1100" dirty="0">
+                      <a:endParaRPr lang="nl-NL" sz="1600" dirty="0">
                         <a:effectLst/>
                       </a:endParaRPr>
                     </a:p>
@@ -6311,12 +6553,12 @@
                         </a:spcAft>
                       </a:pPr>
                       <a:r>
-                        <a:rPr lang="nl-NL" sz="800" dirty="0">
+                        <a:rPr lang="nl-NL" sz="1050" dirty="0">
                           <a:effectLst/>
                         </a:rPr>
                         <a:t>inversies</a:t>
                       </a:r>
-                      <a:endParaRPr lang="nl-NL" sz="1100" dirty="0">
+                      <a:endParaRPr lang="nl-NL" sz="1600" dirty="0">
                         <a:effectLst/>
                         <a:latin typeface="Calibri"/>
                         <a:ea typeface="Calibri"/>
@@ -6340,12 +6582,12 @@
                         </a:spcAft>
                       </a:pPr>
                       <a:r>
-                        <a:rPr lang="nl-NL" sz="800">
+                        <a:rPr lang="nl-NL" sz="1050">
                           <a:effectLst/>
                         </a:rPr>
                         <a:t>Aantal genen </a:t>
                       </a:r>
-                      <a:endParaRPr lang="nl-NL" sz="1100">
+                      <a:endParaRPr lang="nl-NL" sz="1600">
                         <a:effectLst/>
                         <a:latin typeface="Calibri"/>
                         <a:ea typeface="Calibri"/>
@@ -6369,12 +6611,12 @@
                         </a:spcAft>
                       </a:pPr>
                       <a:r>
-                        <a:rPr lang="en-US" sz="800">
+                        <a:rPr lang="en-US" sz="1050">
                           <a:effectLst/>
                         </a:rPr>
                         <a:t>Min. genen</a:t>
                       </a:r>
-                      <a:endParaRPr lang="nl-NL" sz="1100">
+                      <a:endParaRPr lang="nl-NL" sz="1600">
                         <a:effectLst/>
                         <a:latin typeface="Calibri"/>
                         <a:ea typeface="Calibri"/>
@@ -6398,12 +6640,12 @@
                         </a:spcAft>
                       </a:pPr>
                       <a:r>
-                        <a:rPr lang="en-US" sz="800" dirty="0">
+                        <a:rPr lang="en-US" sz="1050" dirty="0">
                           <a:effectLst/>
                         </a:rPr>
                         <a:t>Max. genen</a:t>
                       </a:r>
-                      <a:endParaRPr lang="nl-NL" sz="1100" dirty="0">
+                      <a:endParaRPr lang="nl-NL" sz="1600" dirty="0">
                         <a:effectLst/>
                         <a:latin typeface="Calibri"/>
                         <a:ea typeface="Calibri"/>
@@ -6427,12 +6669,12 @@
                         </a:spcAft>
                       </a:pPr>
                       <a:r>
-                        <a:rPr lang="nl-NL" sz="800" dirty="0">
+                        <a:rPr lang="nl-NL" sz="1050" dirty="0">
                           <a:effectLst/>
                         </a:rPr>
                         <a:t>Grootte</a:t>
                       </a:r>
-                      <a:endParaRPr lang="nl-NL" sz="1100" dirty="0">
+                      <a:endParaRPr lang="nl-NL" sz="1600" dirty="0">
                         <a:effectLst/>
                       </a:endParaRPr>
                     </a:p>
@@ -6446,12 +6688,12 @@
                         </a:spcAft>
                       </a:pPr>
                       <a:r>
-                        <a:rPr lang="nl-NL" sz="800" dirty="0" smtClean="0">
+                        <a:rPr lang="nl-NL" sz="1050" dirty="0" smtClean="0">
                           <a:effectLst/>
                         </a:rPr>
                         <a:t>Inversies</a:t>
                       </a:r>
-                      <a:endParaRPr lang="nl-NL" sz="1100" dirty="0">
+                      <a:endParaRPr lang="nl-NL" sz="1600" dirty="0">
                         <a:effectLst/>
                         <a:latin typeface="Calibri"/>
                         <a:ea typeface="Calibri"/>
@@ -6481,12 +6723,12 @@
                         </a:spcAft>
                       </a:pPr>
                       <a:r>
-                        <a:rPr lang="nl-NL" sz="800" dirty="0">
+                        <a:rPr lang="nl-NL" sz="1050" dirty="0">
                           <a:effectLst/>
                         </a:rPr>
                         <a:t>Aantal genen</a:t>
                       </a:r>
-                      <a:endParaRPr lang="nl-NL" sz="1100" dirty="0">
+                      <a:endParaRPr lang="nl-NL" sz="1600" dirty="0">
                         <a:effectLst/>
                         <a:latin typeface="Calibri"/>
                         <a:ea typeface="Calibri"/>
@@ -6516,12 +6758,12 @@
                         </a:spcAft>
                       </a:pPr>
                       <a:r>
-                        <a:rPr lang="en-US" sz="800" dirty="0">
+                        <a:rPr lang="en-US" sz="1050" dirty="0">
                           <a:effectLst/>
                         </a:rPr>
                         <a:t>Min. genen</a:t>
                       </a:r>
-                      <a:endParaRPr lang="nl-NL" sz="1100" dirty="0">
+                      <a:endParaRPr lang="nl-NL" sz="1600" dirty="0">
                         <a:effectLst/>
                         <a:latin typeface="Calibri"/>
                         <a:ea typeface="Calibri"/>
@@ -6551,12 +6793,12 @@
                         </a:spcAft>
                       </a:pPr>
                       <a:r>
-                        <a:rPr lang="en-US" sz="800" dirty="0">
+                        <a:rPr lang="en-US" sz="1050" dirty="0">
                           <a:effectLst/>
                         </a:rPr>
                         <a:t>Max. genen</a:t>
                       </a:r>
-                      <a:endParaRPr lang="nl-NL" sz="1100" dirty="0">
+                      <a:endParaRPr lang="nl-NL" sz="1600" dirty="0">
                         <a:effectLst/>
                         <a:latin typeface="Calibri"/>
                         <a:ea typeface="Calibri"/>
@@ -6588,12 +6830,12 @@
                         </a:spcAft>
                       </a:pPr>
                       <a:r>
-                        <a:rPr lang="en-US" sz="1200" baseline="-25000" dirty="0">
+                        <a:rPr lang="en-US" sz="1800" baseline="-25000" dirty="0">
                           <a:effectLst/>
                         </a:rPr>
                         <a:t>Find&amp;Swap</a:t>
                       </a:r>
-                      <a:endParaRPr lang="nl-NL" sz="1100" dirty="0">
+                      <a:endParaRPr lang="nl-NL" sz="1600" dirty="0">
                         <a:effectLst/>
                         <a:latin typeface="Calibri"/>
                         <a:ea typeface="Calibri"/>
@@ -6621,12 +6863,12 @@
                         </a:spcAft>
                       </a:pPr>
                       <a:r>
-                        <a:rPr lang="en-US" sz="1200" baseline="-25000" dirty="0">
+                        <a:rPr lang="en-US" sz="1800" baseline="-25000" dirty="0">
                           <a:effectLst/>
                         </a:rPr>
                         <a:t>7,60</a:t>
                       </a:r>
-                      <a:endParaRPr lang="nl-NL" sz="1100" dirty="0">
+                      <a:endParaRPr lang="nl-NL" sz="1600" dirty="0">
                         <a:effectLst/>
                         <a:latin typeface="Calibri"/>
                         <a:ea typeface="Calibri"/>
@@ -6650,12 +6892,12 @@
                         </a:spcAft>
                       </a:pPr>
                       <a:r>
-                        <a:rPr lang="en-US" sz="1200" baseline="-25000">
+                        <a:rPr lang="en-US" sz="1800" baseline="-25000">
                           <a:effectLst/>
                         </a:rPr>
                         <a:t>170,59</a:t>
                       </a:r>
-                      <a:endParaRPr lang="nl-NL" sz="1100">
+                      <a:endParaRPr lang="nl-NL" sz="1600">
                         <a:effectLst/>
                         <a:latin typeface="Calibri"/>
                         <a:ea typeface="Calibri"/>
@@ -6679,12 +6921,12 @@
                         </a:spcAft>
                       </a:pPr>
                       <a:r>
-                        <a:rPr lang="en-US" sz="1200" baseline="-25000">
+                        <a:rPr lang="en-US" sz="1800" baseline="-25000">
                           <a:effectLst/>
                         </a:rPr>
                         <a:t>95</a:t>
                       </a:r>
-                      <a:endParaRPr lang="nl-NL" sz="1100">
+                      <a:endParaRPr lang="nl-NL" sz="1600">
                         <a:effectLst/>
                         <a:latin typeface="Calibri"/>
                         <a:ea typeface="Calibri"/>
@@ -6708,12 +6950,12 @@
                         </a:spcAft>
                       </a:pPr>
                       <a:r>
-                        <a:rPr lang="en-US" sz="1200" baseline="-25000">
+                        <a:rPr lang="en-US" sz="1800" baseline="-25000">
                           <a:effectLst/>
                         </a:rPr>
                         <a:t>250</a:t>
                       </a:r>
-                      <a:endParaRPr lang="nl-NL" sz="1100">
+                      <a:endParaRPr lang="nl-NL" sz="1600">
                         <a:effectLst/>
                         <a:latin typeface="Calibri"/>
                         <a:ea typeface="Calibri"/>
@@ -6737,12 +6979,12 @@
                         </a:spcAft>
                       </a:pPr>
                       <a:r>
-                        <a:rPr lang="en-US" sz="1200" baseline="-25000" dirty="0">
+                        <a:rPr lang="en-US" sz="1800" baseline="-25000" dirty="0">
                           <a:effectLst/>
                         </a:rPr>
                         <a:t>4,36</a:t>
                       </a:r>
-                      <a:endParaRPr lang="nl-NL" sz="1100" dirty="0">
+                      <a:endParaRPr lang="nl-NL" sz="1600" dirty="0">
                         <a:effectLst/>
                         <a:latin typeface="Calibri"/>
                         <a:ea typeface="Calibri"/>
@@ -6766,12 +7008,12 @@
                         </a:spcAft>
                       </a:pPr>
                       <a:r>
-                        <a:rPr lang="en-US" sz="1200" baseline="-25000" dirty="0">
+                        <a:rPr lang="en-US" sz="1800" baseline="-25000" dirty="0">
                           <a:effectLst/>
                         </a:rPr>
                         <a:t>90,50</a:t>
                       </a:r>
-                      <a:endParaRPr lang="nl-NL" sz="1100" dirty="0">
+                      <a:endParaRPr lang="nl-NL" sz="1600" dirty="0">
                         <a:effectLst/>
                         <a:latin typeface="Calibri"/>
                         <a:ea typeface="Calibri"/>
@@ -6795,12 +7037,12 @@
                         </a:spcAft>
                       </a:pPr>
                       <a:r>
-                        <a:rPr lang="en-US" sz="1200" baseline="-25000">
+                        <a:rPr lang="en-US" sz="1800" baseline="-25000">
                           <a:effectLst/>
                         </a:rPr>
                         <a:t>51</a:t>
                       </a:r>
-                      <a:endParaRPr lang="nl-NL" sz="1100">
+                      <a:endParaRPr lang="nl-NL" sz="1600">
                         <a:effectLst/>
                         <a:latin typeface="Calibri"/>
                         <a:ea typeface="Calibri"/>
@@ -6824,12 +7066,12 @@
                         </a:spcAft>
                       </a:pPr>
                       <a:r>
-                        <a:rPr lang="en-US" sz="1200" baseline="-25000">
+                        <a:rPr lang="en-US" sz="1800" baseline="-25000">
                           <a:effectLst/>
                         </a:rPr>
                         <a:t>127</a:t>
                       </a:r>
-                      <a:endParaRPr lang="nl-NL" sz="1100">
+                      <a:endParaRPr lang="nl-NL" sz="1600">
                         <a:effectLst/>
                         <a:latin typeface="Calibri"/>
                         <a:ea typeface="Calibri"/>
@@ -6855,12 +7097,12 @@
                         </a:spcAft>
                       </a:pPr>
                       <a:r>
-                        <a:rPr lang="en-US" sz="1200" baseline="-25000" dirty="0">
+                        <a:rPr lang="en-US" sz="1800" baseline="-25000" dirty="0">
                           <a:effectLst/>
                         </a:rPr>
                         <a:t>Find&amp;SwapRev</a:t>
                       </a:r>
-                      <a:endParaRPr lang="nl-NL" sz="1100" dirty="0">
+                      <a:endParaRPr lang="nl-NL" sz="1600" dirty="0">
                         <a:effectLst/>
                         <a:latin typeface="Calibri"/>
                         <a:ea typeface="Calibri"/>
@@ -6888,12 +7130,12 @@
                         </a:spcAft>
                       </a:pPr>
                       <a:r>
-                        <a:rPr lang="en-US" sz="1200" baseline="-25000">
+                        <a:rPr lang="en-US" sz="1800" baseline="-25000">
                           <a:effectLst/>
                         </a:rPr>
                         <a:t>7,63</a:t>
                       </a:r>
-                      <a:endParaRPr lang="nl-NL" sz="1100">
+                      <a:endParaRPr lang="nl-NL" sz="1600">
                         <a:effectLst/>
                         <a:latin typeface="Calibri"/>
                         <a:ea typeface="Calibri"/>
@@ -6917,12 +7159,12 @@
                         </a:spcAft>
                       </a:pPr>
                       <a:r>
-                        <a:rPr lang="en-US" sz="1200" baseline="-25000">
+                        <a:rPr lang="en-US" sz="1800" baseline="-25000">
                           <a:effectLst/>
                         </a:rPr>
                         <a:t>170,97</a:t>
                       </a:r>
-                      <a:endParaRPr lang="nl-NL" sz="1100">
+                      <a:endParaRPr lang="nl-NL" sz="1600">
                         <a:effectLst/>
                         <a:latin typeface="Calibri"/>
                         <a:ea typeface="Calibri"/>
@@ -6946,12 +7188,12 @@
                         </a:spcAft>
                       </a:pPr>
                       <a:r>
-                        <a:rPr lang="en-US" sz="1200" baseline="-25000">
+                        <a:rPr lang="en-US" sz="1800" baseline="-25000">
                           <a:effectLst/>
                         </a:rPr>
                         <a:t>86</a:t>
                       </a:r>
-                      <a:endParaRPr lang="nl-NL" sz="1100">
+                      <a:endParaRPr lang="nl-NL" sz="1600">
                         <a:effectLst/>
                         <a:latin typeface="Calibri"/>
                         <a:ea typeface="Calibri"/>
@@ -6975,12 +7217,12 @@
                         </a:spcAft>
                       </a:pPr>
                       <a:r>
-                        <a:rPr lang="en-US" sz="1200" baseline="-25000">
+                        <a:rPr lang="en-US" sz="1800" baseline="-25000">
                           <a:effectLst/>
                         </a:rPr>
                         <a:t>248</a:t>
                       </a:r>
-                      <a:endParaRPr lang="nl-NL" sz="1100">
+                      <a:endParaRPr lang="nl-NL" sz="1600">
                         <a:effectLst/>
                         <a:latin typeface="Calibri"/>
                         <a:ea typeface="Calibri"/>
@@ -7004,12 +7246,12 @@
                         </a:spcAft>
                       </a:pPr>
                       <a:r>
-                        <a:rPr lang="en-US" sz="1200" baseline="-25000" dirty="0">
+                        <a:rPr lang="en-US" sz="1800" baseline="-25000" dirty="0">
                           <a:effectLst/>
                         </a:rPr>
                         <a:t>4,37</a:t>
                       </a:r>
-                      <a:endParaRPr lang="nl-NL" sz="1100" dirty="0">
+                      <a:endParaRPr lang="nl-NL" sz="1600" dirty="0">
                         <a:effectLst/>
                         <a:latin typeface="Calibri"/>
                         <a:ea typeface="Calibri"/>
@@ -7033,12 +7275,12 @@
                         </a:spcAft>
                       </a:pPr>
                       <a:r>
-                        <a:rPr lang="en-US" sz="1200" baseline="-25000">
+                        <a:rPr lang="en-US" sz="1800" baseline="-25000">
                           <a:effectLst/>
                         </a:rPr>
                         <a:t>90,89</a:t>
                       </a:r>
-                      <a:endParaRPr lang="nl-NL" sz="1100">
+                      <a:endParaRPr lang="nl-NL" sz="1600">
                         <a:effectLst/>
                         <a:latin typeface="Calibri"/>
                         <a:ea typeface="Calibri"/>
@@ -7062,12 +7304,12 @@
                         </a:spcAft>
                       </a:pPr>
                       <a:r>
-                        <a:rPr lang="en-US" sz="1200" baseline="-25000">
+                        <a:rPr lang="en-US" sz="1800" baseline="-25000">
                           <a:effectLst/>
                         </a:rPr>
                         <a:t>50</a:t>
                       </a:r>
-                      <a:endParaRPr lang="nl-NL" sz="1100">
+                      <a:endParaRPr lang="nl-NL" sz="1600">
                         <a:effectLst/>
                         <a:latin typeface="Calibri"/>
                         <a:ea typeface="Calibri"/>
@@ -7091,12 +7333,12 @@
                         </a:spcAft>
                       </a:pPr>
                       <a:r>
-                        <a:rPr lang="en-US" sz="1200" baseline="-25000">
+                        <a:rPr lang="en-US" sz="1800" baseline="-25000">
                           <a:effectLst/>
                         </a:rPr>
                         <a:t>130</a:t>
                       </a:r>
-                      <a:endParaRPr lang="nl-NL" sz="1100">
+                      <a:endParaRPr lang="nl-NL" sz="1600">
                         <a:effectLst/>
                         <a:latin typeface="Calibri"/>
                         <a:ea typeface="Calibri"/>
@@ -7122,12 +7364,12 @@
                         </a:spcAft>
                       </a:pPr>
                       <a:r>
-                        <a:rPr lang="en-US" sz="1200" baseline="-25000" dirty="0">
+                        <a:rPr lang="en-US" sz="1800" baseline="-25000" dirty="0">
                           <a:effectLst/>
                         </a:rPr>
                         <a:t>Find&amp;SwapIteratief</a:t>
                       </a:r>
-                      <a:endParaRPr lang="nl-NL" sz="1100" dirty="0">
+                      <a:endParaRPr lang="nl-NL" sz="1600" dirty="0">
                         <a:effectLst/>
                         <a:latin typeface="Calibri"/>
                         <a:ea typeface="Calibri"/>
@@ -7155,12 +7397,12 @@
                         </a:spcAft>
                       </a:pPr>
                       <a:r>
-                        <a:rPr lang="en-US" sz="1200" baseline="-25000">
+                        <a:rPr lang="en-US" sz="1800" baseline="-25000">
                           <a:effectLst/>
                         </a:rPr>
                         <a:t>8,25</a:t>
                       </a:r>
-                      <a:endParaRPr lang="nl-NL" sz="1100">
+                      <a:endParaRPr lang="nl-NL" sz="1600">
                         <a:effectLst/>
                         <a:latin typeface="Calibri"/>
                         <a:ea typeface="Calibri"/>
@@ -7184,12 +7426,12 @@
                         </a:spcAft>
                       </a:pPr>
                       <a:r>
-                        <a:rPr lang="en-US" sz="1200" baseline="-25000">
+                        <a:rPr lang="en-US" sz="1800" baseline="-25000">
                           <a:effectLst/>
                         </a:rPr>
                         <a:t>183,47</a:t>
                       </a:r>
-                      <a:endParaRPr lang="nl-NL" sz="1100">
+                      <a:endParaRPr lang="nl-NL" sz="1600">
                         <a:effectLst/>
                         <a:latin typeface="Calibri"/>
                         <a:ea typeface="Calibri"/>
@@ -7213,12 +7455,12 @@
                         </a:spcAft>
                       </a:pPr>
                       <a:r>
-                        <a:rPr lang="en-US" sz="1200" baseline="-25000">
+                        <a:rPr lang="en-US" sz="1800" baseline="-25000">
                           <a:effectLst/>
                         </a:rPr>
                         <a:t>88</a:t>
                       </a:r>
-                      <a:endParaRPr lang="nl-NL" sz="1100">
+                      <a:endParaRPr lang="nl-NL" sz="1600">
                         <a:effectLst/>
                         <a:latin typeface="Calibri"/>
                         <a:ea typeface="Calibri"/>
@@ -7242,12 +7484,12 @@
                         </a:spcAft>
                       </a:pPr>
                       <a:r>
-                        <a:rPr lang="en-US" sz="1200" baseline="-25000">
+                        <a:rPr lang="en-US" sz="1800" baseline="-25000">
                           <a:effectLst/>
                         </a:rPr>
                         <a:t>242</a:t>
                       </a:r>
-                      <a:endParaRPr lang="nl-NL" sz="1100">
+                      <a:endParaRPr lang="nl-NL" sz="1600">
                         <a:effectLst/>
                         <a:latin typeface="Calibri"/>
                         <a:ea typeface="Calibri"/>
@@ -7271,12 +7513,12 @@
                         </a:spcAft>
                       </a:pPr>
                       <a:r>
-                        <a:rPr lang="en-US" sz="1200" baseline="-25000">
+                        <a:rPr lang="en-US" sz="1800" baseline="-25000">
                           <a:effectLst/>
                         </a:rPr>
                         <a:t>6,04</a:t>
                       </a:r>
-                      <a:endParaRPr lang="nl-NL" sz="1100">
+                      <a:endParaRPr lang="nl-NL" sz="1600">
                         <a:effectLst/>
                         <a:latin typeface="Calibri"/>
                         <a:ea typeface="Calibri"/>
@@ -7300,12 +7542,12 @@
                         </a:spcAft>
                       </a:pPr>
                       <a:r>
-                        <a:rPr lang="en-US" sz="1200" baseline="-25000">
+                        <a:rPr lang="en-US" sz="1800" baseline="-25000">
                           <a:effectLst/>
                         </a:rPr>
                         <a:t>122,29</a:t>
                       </a:r>
-                      <a:endParaRPr lang="nl-NL" sz="1100">
+                      <a:endParaRPr lang="nl-NL" sz="1600">
                         <a:effectLst/>
                         <a:latin typeface="Calibri"/>
                         <a:ea typeface="Calibri"/>
@@ -7329,12 +7571,12 @@
                         </a:spcAft>
                       </a:pPr>
                       <a:r>
-                        <a:rPr lang="en-US" sz="1200" baseline="-25000">
+                        <a:rPr lang="en-US" sz="1800" baseline="-25000">
                           <a:effectLst/>
                         </a:rPr>
                         <a:t>51</a:t>
                       </a:r>
-                      <a:endParaRPr lang="nl-NL" sz="1100">
+                      <a:endParaRPr lang="nl-NL" sz="1600">
                         <a:effectLst/>
                         <a:latin typeface="Calibri"/>
                         <a:ea typeface="Calibri"/>
@@ -7358,12 +7600,12 @@
                         </a:spcAft>
                       </a:pPr>
                       <a:r>
-                        <a:rPr lang="en-US" sz="1200" baseline="-25000">
+                        <a:rPr lang="en-US" sz="1800" baseline="-25000">
                           <a:effectLst/>
                         </a:rPr>
                         <a:t>214</a:t>
                       </a:r>
-                      <a:endParaRPr lang="nl-NL" sz="1100">
+                      <a:endParaRPr lang="nl-NL" sz="1600">
                         <a:effectLst/>
                         <a:latin typeface="Calibri"/>
                         <a:ea typeface="Calibri"/>
@@ -7389,18 +7631,18 @@
                         </a:spcAft>
                       </a:pPr>
                       <a:r>
-                        <a:rPr lang="en-US" sz="1200" baseline="-25000" dirty="0">
+                        <a:rPr lang="en-US" sz="1800" baseline="-25000" dirty="0">
                           <a:effectLst/>
                         </a:rPr>
                         <a:t>Fin</a:t>
                       </a:r>
                       <a:r>
-                        <a:rPr lang="nl-NL" sz="1200" baseline="-25000" dirty="0">
+                        <a:rPr lang="nl-NL" sz="1800" baseline="-25000" dirty="0">
                           <a:effectLst/>
                         </a:rPr>
                         <a:t>d&amp;SwapLoHi</a:t>
                       </a:r>
-                      <a:endParaRPr lang="nl-NL" sz="1100" dirty="0">
+                      <a:endParaRPr lang="nl-NL" sz="1600" dirty="0">
                         <a:effectLst/>
                         <a:latin typeface="Calibri"/>
                         <a:ea typeface="Calibri"/>
@@ -7428,12 +7670,12 @@
                         </a:spcAft>
                       </a:pPr>
                       <a:r>
-                        <a:rPr lang="nl-NL" sz="1200" baseline="-25000">
+                        <a:rPr lang="nl-NL" sz="1800" baseline="-25000">
                           <a:effectLst/>
                         </a:rPr>
                         <a:t>7,62</a:t>
                       </a:r>
-                      <a:endParaRPr lang="nl-NL" sz="1100">
+                      <a:endParaRPr lang="nl-NL" sz="1600">
                         <a:effectLst/>
                         <a:latin typeface="Calibri"/>
                         <a:ea typeface="Calibri"/>
@@ -7457,12 +7699,12 @@
                         </a:spcAft>
                       </a:pPr>
                       <a:r>
-                        <a:rPr lang="nl-NL" sz="1200" baseline="-25000">
+                        <a:rPr lang="nl-NL" sz="1800" baseline="-25000">
                           <a:effectLst/>
                         </a:rPr>
                         <a:t>170,84</a:t>
                       </a:r>
-                      <a:endParaRPr lang="nl-NL" sz="1100">
+                      <a:endParaRPr lang="nl-NL" sz="1600">
                         <a:effectLst/>
                         <a:latin typeface="Calibri"/>
                         <a:ea typeface="Calibri"/>
@@ -7486,12 +7728,12 @@
                         </a:spcAft>
                       </a:pPr>
                       <a:r>
-                        <a:rPr lang="nl-NL" sz="1200" baseline="-25000">
+                        <a:rPr lang="nl-NL" sz="1800" baseline="-25000">
                           <a:effectLst/>
                         </a:rPr>
                         <a:t>109</a:t>
                       </a:r>
-                      <a:endParaRPr lang="nl-NL" sz="1100">
+                      <a:endParaRPr lang="nl-NL" sz="1600">
                         <a:effectLst/>
                         <a:latin typeface="Calibri"/>
                         <a:ea typeface="Calibri"/>
@@ -7515,12 +7757,12 @@
                         </a:spcAft>
                       </a:pPr>
                       <a:r>
-                        <a:rPr lang="nl-NL" sz="1200" baseline="-25000">
+                        <a:rPr lang="nl-NL" sz="1800" baseline="-25000">
                           <a:effectLst/>
                         </a:rPr>
                         <a:t>252</a:t>
                       </a:r>
-                      <a:endParaRPr lang="nl-NL" sz="1100">
+                      <a:endParaRPr lang="nl-NL" sz="1600">
                         <a:effectLst/>
                         <a:latin typeface="Calibri"/>
                         <a:ea typeface="Calibri"/>
@@ -7544,12 +7786,12 @@
                         </a:spcAft>
                       </a:pPr>
                       <a:r>
-                        <a:rPr lang="en-US" sz="1200" baseline="-25000">
+                        <a:rPr lang="en-US" sz="1800" baseline="-25000">
                           <a:effectLst/>
                         </a:rPr>
                         <a:t>4,37</a:t>
                       </a:r>
-                      <a:endParaRPr lang="nl-NL" sz="1100">
+                      <a:endParaRPr lang="nl-NL" sz="1600">
                         <a:effectLst/>
                         <a:latin typeface="Calibri"/>
                         <a:ea typeface="Calibri"/>
@@ -7573,12 +7815,12 @@
                         </a:spcAft>
                       </a:pPr>
                       <a:r>
-                        <a:rPr lang="en-US" sz="1200" baseline="-25000">
+                        <a:rPr lang="en-US" sz="1800" baseline="-25000">
                           <a:effectLst/>
                         </a:rPr>
                         <a:t>90,77</a:t>
                       </a:r>
-                      <a:endParaRPr lang="nl-NL" sz="1100">
+                      <a:endParaRPr lang="nl-NL" sz="1600">
                         <a:effectLst/>
                         <a:latin typeface="Calibri"/>
                         <a:ea typeface="Calibri"/>
@@ -7602,12 +7844,12 @@
                         </a:spcAft>
                       </a:pPr>
                       <a:r>
-                        <a:rPr lang="en-US" sz="1200" baseline="-25000">
+                        <a:rPr lang="en-US" sz="1800" baseline="-25000">
                           <a:effectLst/>
                         </a:rPr>
                         <a:t>54</a:t>
                       </a:r>
-                      <a:endParaRPr lang="nl-NL" sz="1100">
+                      <a:endParaRPr lang="nl-NL" sz="1600">
                         <a:effectLst/>
                         <a:latin typeface="Calibri"/>
                         <a:ea typeface="Calibri"/>
@@ -7631,12 +7873,12 @@
                         </a:spcAft>
                       </a:pPr>
                       <a:r>
-                        <a:rPr lang="en-US" sz="1200" baseline="-25000">
+                        <a:rPr lang="en-US" sz="1800" baseline="-25000">
                           <a:effectLst/>
                         </a:rPr>
                         <a:t>127</a:t>
                       </a:r>
-                      <a:endParaRPr lang="nl-NL" sz="1100">
+                      <a:endParaRPr lang="nl-NL" sz="1600">
                         <a:effectLst/>
                         <a:latin typeface="Calibri"/>
                         <a:ea typeface="Calibri"/>
@@ -7662,12 +7904,12 @@
                         </a:spcAft>
                       </a:pPr>
                       <a:r>
-                        <a:rPr lang="nl-NL" sz="1200" baseline="-25000" dirty="0">
+                        <a:rPr lang="nl-NL" sz="1800" baseline="-25000" dirty="0">
                           <a:effectLst/>
                         </a:rPr>
                         <a:t>ChunkSwap</a:t>
                       </a:r>
-                      <a:endParaRPr lang="nl-NL" sz="1100" dirty="0">
+                      <a:endParaRPr lang="nl-NL" sz="1600" dirty="0">
                         <a:effectLst/>
                         <a:latin typeface="Calibri"/>
                         <a:ea typeface="Calibri"/>
@@ -7695,12 +7937,12 @@
                         </a:spcAft>
                       </a:pPr>
                       <a:r>
-                        <a:rPr lang="nl-NL" sz="1200" baseline="-25000">
+                        <a:rPr lang="nl-NL" sz="1800" baseline="-25000">
                           <a:effectLst/>
                         </a:rPr>
                         <a:t>7,45</a:t>
                       </a:r>
-                      <a:endParaRPr lang="nl-NL" sz="1100">
+                      <a:endParaRPr lang="nl-NL" sz="1600">
                         <a:effectLst/>
                         <a:latin typeface="Calibri"/>
                         <a:ea typeface="Calibri"/>
@@ -7724,12 +7966,12 @@
                         </a:spcAft>
                       </a:pPr>
                       <a:r>
-                        <a:rPr lang="nl-NL" sz="1200" baseline="-25000">
+                        <a:rPr lang="nl-NL" sz="1800" baseline="-25000">
                           <a:effectLst/>
                         </a:rPr>
                         <a:t>165,67</a:t>
                       </a:r>
-                      <a:endParaRPr lang="nl-NL" sz="1100">
+                      <a:endParaRPr lang="nl-NL" sz="1600">
                         <a:effectLst/>
                         <a:latin typeface="Calibri"/>
                         <a:ea typeface="Calibri"/>
@@ -7753,12 +7995,12 @@
                         </a:spcAft>
                       </a:pPr>
                       <a:r>
-                        <a:rPr lang="nl-NL" sz="1200" baseline="-25000">
+                        <a:rPr lang="nl-NL" sz="1800" baseline="-25000">
                           <a:effectLst/>
                         </a:rPr>
                         <a:t>93</a:t>
                       </a:r>
-                      <a:endParaRPr lang="nl-NL" sz="1100">
+                      <a:endParaRPr lang="nl-NL" sz="1600">
                         <a:effectLst/>
                         <a:latin typeface="Calibri"/>
                         <a:ea typeface="Calibri"/>
@@ -7782,12 +8024,12 @@
                         </a:spcAft>
                       </a:pPr>
                       <a:r>
-                        <a:rPr lang="nl-NL" sz="1200" baseline="-25000">
+                        <a:rPr lang="nl-NL" sz="1800" baseline="-25000">
                           <a:effectLst/>
                         </a:rPr>
                         <a:t>250</a:t>
                       </a:r>
-                      <a:endParaRPr lang="nl-NL" sz="1100">
+                      <a:endParaRPr lang="nl-NL" sz="1600">
                         <a:effectLst/>
                         <a:latin typeface="Calibri"/>
                         <a:ea typeface="Calibri"/>
@@ -7811,12 +8053,12 @@
                         </a:spcAft>
                       </a:pPr>
                       <a:r>
-                        <a:rPr lang="nl-NL" sz="1200" baseline="-25000">
+                        <a:rPr lang="nl-NL" sz="1800" baseline="-25000">
                           <a:effectLst/>
                         </a:rPr>
                         <a:t>4,33</a:t>
                       </a:r>
-                      <a:endParaRPr lang="nl-NL" sz="1100">
+                      <a:endParaRPr lang="nl-NL" sz="1600">
                         <a:effectLst/>
                         <a:latin typeface="Calibri"/>
                         <a:ea typeface="Calibri"/>
@@ -7840,12 +8082,12 @@
                         </a:spcAft>
                       </a:pPr>
                       <a:r>
-                        <a:rPr lang="nl-NL" sz="1200" baseline="-25000">
+                        <a:rPr lang="nl-NL" sz="1800" baseline="-25000">
                           <a:effectLst/>
                         </a:rPr>
                         <a:t>88,17</a:t>
                       </a:r>
-                      <a:endParaRPr lang="nl-NL" sz="1100">
+                      <a:endParaRPr lang="nl-NL" sz="1600">
                         <a:effectLst/>
                         <a:latin typeface="Calibri"/>
                         <a:ea typeface="Calibri"/>
@@ -7869,12 +8111,12 @@
                         </a:spcAft>
                       </a:pPr>
                       <a:r>
-                        <a:rPr lang="nl-NL" sz="1200" baseline="-25000">
+                        <a:rPr lang="nl-NL" sz="1800" baseline="-25000">
                           <a:effectLst/>
                         </a:rPr>
                         <a:t>51</a:t>
                       </a:r>
-                      <a:endParaRPr lang="nl-NL" sz="1100">
+                      <a:endParaRPr lang="nl-NL" sz="1600">
                         <a:effectLst/>
                         <a:latin typeface="Calibri"/>
                         <a:ea typeface="Calibri"/>
@@ -7898,12 +8140,12 @@
                         </a:spcAft>
                       </a:pPr>
                       <a:r>
-                        <a:rPr lang="nl-NL" sz="1200" baseline="-25000">
+                        <a:rPr lang="nl-NL" sz="1800" baseline="-25000">
                           <a:effectLst/>
                         </a:rPr>
                         <a:t>121</a:t>
                       </a:r>
-                      <a:endParaRPr lang="nl-NL" sz="1100">
+                      <a:endParaRPr lang="nl-NL" sz="1600">
                         <a:effectLst/>
                         <a:latin typeface="Calibri"/>
                         <a:ea typeface="Calibri"/>
@@ -7929,12 +8171,12 @@
                         </a:spcAft>
                       </a:pPr>
                       <a:r>
-                        <a:rPr lang="nl-NL" sz="1200" baseline="-25000" dirty="0">
+                        <a:rPr lang="nl-NL" sz="1800" baseline="-25000" dirty="0">
                           <a:effectLst/>
                         </a:rPr>
                         <a:t>EditStar</a:t>
                       </a:r>
-                      <a:endParaRPr lang="nl-NL" sz="1100" dirty="0">
+                      <a:endParaRPr lang="nl-NL" sz="1600" dirty="0">
                         <a:effectLst/>
                         <a:latin typeface="Calibri"/>
                         <a:ea typeface="Calibri"/>
@@ -7962,12 +8204,12 @@
                         </a:spcAft>
                       </a:pPr>
                       <a:r>
-                        <a:rPr lang="nl-NL" sz="1200" baseline="-25000">
+                        <a:rPr lang="nl-NL" sz="1800" baseline="-25000">
                           <a:effectLst/>
                         </a:rPr>
                         <a:t>9,16</a:t>
                       </a:r>
-                      <a:endParaRPr lang="nl-NL" sz="1100">
+                      <a:endParaRPr lang="nl-NL" sz="1600">
                         <a:effectLst/>
                         <a:latin typeface="Calibri"/>
                         <a:ea typeface="Calibri"/>
@@ -7991,12 +8233,12 @@
                         </a:spcAft>
                       </a:pPr>
                       <a:r>
-                        <a:rPr lang="nl-NL" sz="1200" baseline="-25000">
+                        <a:rPr lang="nl-NL" sz="1800" baseline="-25000">
                           <a:effectLst/>
                         </a:rPr>
                         <a:t>164,73</a:t>
                       </a:r>
-                      <a:endParaRPr lang="nl-NL" sz="1100">
+                      <a:endParaRPr lang="nl-NL" sz="1600">
                         <a:effectLst/>
                         <a:latin typeface="Calibri"/>
                         <a:ea typeface="Calibri"/>
@@ -8020,12 +8262,12 @@
                         </a:spcAft>
                       </a:pPr>
                       <a:r>
-                        <a:rPr lang="nl-NL" sz="1200" baseline="-25000" dirty="0">
+                        <a:rPr lang="nl-NL" sz="1800" baseline="-25000" dirty="0">
                           <a:effectLst/>
                         </a:rPr>
                         <a:t>118</a:t>
                       </a:r>
-                      <a:endParaRPr lang="nl-NL" sz="1100" dirty="0">
+                      <a:endParaRPr lang="nl-NL" sz="1600" dirty="0">
                         <a:effectLst/>
                         <a:latin typeface="Calibri"/>
                         <a:ea typeface="Calibri"/>
@@ -8049,12 +8291,12 @@
                         </a:spcAft>
                       </a:pPr>
                       <a:r>
-                        <a:rPr lang="nl-NL" sz="1200" baseline="-25000">
+                        <a:rPr lang="nl-NL" sz="1800" baseline="-25000">
                           <a:effectLst/>
                         </a:rPr>
                         <a:t>208</a:t>
                       </a:r>
-                      <a:endParaRPr lang="nl-NL" sz="1100">
+                      <a:endParaRPr lang="nl-NL" sz="1600">
                         <a:effectLst/>
                         <a:latin typeface="Calibri"/>
                         <a:ea typeface="Calibri"/>
@@ -8078,12 +8320,12 @@
                         </a:spcAft>
                       </a:pPr>
                       <a:r>
-                        <a:rPr lang="nl-NL" sz="1200" baseline="-25000">
+                        <a:rPr lang="nl-NL" sz="1800" baseline="-25000">
                           <a:effectLst/>
                         </a:rPr>
                         <a:t>6,22</a:t>
                       </a:r>
-                      <a:endParaRPr lang="nl-NL" sz="1100">
+                      <a:endParaRPr lang="nl-NL" sz="1600">
                         <a:effectLst/>
                         <a:latin typeface="Calibri"/>
                         <a:ea typeface="Calibri"/>
@@ -8107,12 +8349,12 @@
                         </a:spcAft>
                       </a:pPr>
                       <a:r>
-                        <a:rPr lang="nl-NL" sz="1200" baseline="-25000">
+                        <a:rPr lang="nl-NL" sz="1800" baseline="-25000">
                           <a:effectLst/>
                         </a:rPr>
                         <a:t>103,15</a:t>
                       </a:r>
-                      <a:endParaRPr lang="nl-NL" sz="1100">
+                      <a:endParaRPr lang="nl-NL" sz="1600">
                         <a:effectLst/>
                         <a:latin typeface="Calibri"/>
                         <a:ea typeface="Calibri"/>
@@ -8136,12 +8378,12 @@
                         </a:spcAft>
                       </a:pPr>
                       <a:r>
-                        <a:rPr lang="nl-NL" sz="1200" baseline="-25000">
+                        <a:rPr lang="nl-NL" sz="1800" baseline="-25000">
                           <a:effectLst/>
                         </a:rPr>
                         <a:t>47</a:t>
                       </a:r>
-                      <a:endParaRPr lang="nl-NL" sz="1100">
+                      <a:endParaRPr lang="nl-NL" sz="1600">
                         <a:effectLst/>
                         <a:latin typeface="Calibri"/>
                         <a:ea typeface="Calibri"/>
@@ -8165,279 +8407,12 @@
                         </a:spcAft>
                       </a:pPr>
                       <a:r>
-                        <a:rPr lang="nl-NL" sz="1200" baseline="-25000">
+                        <a:rPr lang="nl-NL" sz="1800" baseline="-25000" dirty="0">
                           <a:effectLst/>
                         </a:rPr>
                         <a:t>222</a:t>
                       </a:r>
-                      <a:endParaRPr lang="nl-NL" sz="1100">
-                        <a:effectLst/>
-                        <a:latin typeface="Calibri"/>
-                        <a:ea typeface="Calibri"/>
-                        <a:cs typeface="Times New Roman"/>
-                      </a:endParaRPr>
-                    </a:p>
-                  </a:txBody>
-                  <a:tcPr marL="68580" marR="68580" marT="0" marB="0"/>
-                </a:tc>
-              </a:tr>
-              <a:tr h="391239">
-                <a:tc>
-                  <a:txBody>
-                    <a:bodyPr/>
-                    <a:lstStyle/>
-                    <a:p>
-                      <a:pPr>
-                        <a:lnSpc>
-                          <a:spcPct val="115000"/>
-                        </a:lnSpc>
-                        <a:spcAft>
-                          <a:spcPts val="0"/>
-                        </a:spcAft>
-                      </a:pPr>
-                      <a:r>
-                        <a:rPr lang="nl-NL" sz="1200" baseline="-25000" dirty="0">
-                          <a:effectLst/>
-                        </a:rPr>
-                        <a:t>EditStarTotalGenes</a:t>
-                      </a:r>
-                      <a:endParaRPr lang="nl-NL" sz="1100" dirty="0">
-                        <a:effectLst/>
-                        <a:latin typeface="Calibri"/>
-                        <a:ea typeface="Calibri"/>
-                        <a:cs typeface="Times New Roman"/>
-                      </a:endParaRPr>
-                    </a:p>
-                  </a:txBody>
-                  <a:tcPr marL="68580" marR="68580" marT="0" marB="0">
-                    <a:solidFill>
-                      <a:srgbClr val="D52525"/>
-                    </a:solidFill>
-                  </a:tcPr>
-                </a:tc>
-                <a:tc>
-                  <a:txBody>
-                    <a:bodyPr/>
-                    <a:lstStyle/>
-                    <a:p>
-                      <a:pPr>
-                        <a:lnSpc>
-                          <a:spcPct val="115000"/>
-                        </a:lnSpc>
-                        <a:spcAft>
-                          <a:spcPts val="0"/>
-                        </a:spcAft>
-                      </a:pPr>
-                      <a:r>
-                        <a:rPr lang="nl-NL" sz="1200" baseline="-25000">
-                          <a:effectLst/>
-                        </a:rPr>
-                        <a:t> </a:t>
-                      </a:r>
-                      <a:endParaRPr lang="nl-NL" sz="1100">
-                        <a:effectLst/>
-                        <a:latin typeface="Calibri"/>
-                        <a:ea typeface="Calibri"/>
-                        <a:cs typeface="Times New Roman"/>
-                      </a:endParaRPr>
-                    </a:p>
-                  </a:txBody>
-                  <a:tcPr marL="68580" marR="68580" marT="0" marB="0"/>
-                </a:tc>
-                <a:tc>
-                  <a:txBody>
-                    <a:bodyPr/>
-                    <a:lstStyle/>
-                    <a:p>
-                      <a:pPr>
-                        <a:lnSpc>
-                          <a:spcPct val="115000"/>
-                        </a:lnSpc>
-                        <a:spcAft>
-                          <a:spcPts val="0"/>
-                        </a:spcAft>
-                      </a:pPr>
-                      <a:r>
-                        <a:rPr lang="nl-NL" sz="1200" baseline="-25000">
-                          <a:effectLst/>
-                        </a:rPr>
-                        <a:t> </a:t>
-                      </a:r>
-                      <a:endParaRPr lang="nl-NL" sz="1100">
-                        <a:effectLst/>
-                        <a:latin typeface="Calibri"/>
-                        <a:ea typeface="Calibri"/>
-                        <a:cs typeface="Times New Roman"/>
-                      </a:endParaRPr>
-                    </a:p>
-                  </a:txBody>
-                  <a:tcPr marL="68580" marR="68580" marT="0" marB="0"/>
-                </a:tc>
-                <a:tc>
-                  <a:txBody>
-                    <a:bodyPr/>
-                    <a:lstStyle/>
-                    <a:p>
-                      <a:pPr>
-                        <a:lnSpc>
-                          <a:spcPct val="115000"/>
-                        </a:lnSpc>
-                        <a:spcAft>
-                          <a:spcPts val="0"/>
-                        </a:spcAft>
-                      </a:pPr>
-                      <a:r>
-                        <a:rPr lang="nl-NL" sz="1200" baseline="-25000" dirty="0">
-                          <a:effectLst/>
-                        </a:rPr>
-                        <a:t> </a:t>
-                      </a:r>
-                      <a:endParaRPr lang="nl-NL" sz="1100" dirty="0">
-                        <a:effectLst/>
-                        <a:latin typeface="Calibri"/>
-                        <a:ea typeface="Calibri"/>
-                        <a:cs typeface="Times New Roman"/>
-                      </a:endParaRPr>
-                    </a:p>
-                  </a:txBody>
-                  <a:tcPr marL="68580" marR="68580" marT="0" marB="0"/>
-                </a:tc>
-                <a:tc>
-                  <a:txBody>
-                    <a:bodyPr/>
-                    <a:lstStyle/>
-                    <a:p>
-                      <a:pPr>
-                        <a:lnSpc>
-                          <a:spcPct val="115000"/>
-                        </a:lnSpc>
-                        <a:spcAft>
-                          <a:spcPts val="0"/>
-                        </a:spcAft>
-                      </a:pPr>
-                      <a:r>
-                        <a:rPr lang="nl-NL" sz="1200" baseline="-25000" dirty="0">
-                          <a:effectLst/>
-                        </a:rPr>
-                        <a:t> </a:t>
-                      </a:r>
-                      <a:endParaRPr lang="nl-NL" sz="1100" dirty="0">
-                        <a:effectLst/>
-                        <a:latin typeface="Calibri"/>
-                        <a:ea typeface="Calibri"/>
-                        <a:cs typeface="Times New Roman"/>
-                      </a:endParaRPr>
-                    </a:p>
-                  </a:txBody>
-                  <a:tcPr marL="68580" marR="68580" marT="0" marB="0"/>
-                </a:tc>
-                <a:tc>
-                  <a:txBody>
-                    <a:bodyPr/>
-                    <a:lstStyle/>
-                    <a:p>
-                      <a:pPr>
-                        <a:lnSpc>
-                          <a:spcPct val="115000"/>
-                        </a:lnSpc>
-                        <a:spcAft>
-                          <a:spcPts val="0"/>
-                        </a:spcAft>
-                      </a:pPr>
-                      <a:r>
-                        <a:rPr lang="nl-NL" sz="1200" baseline="-25000">
-                          <a:effectLst/>
-                        </a:rPr>
-                        <a:t> </a:t>
-                      </a:r>
-                      <a:endParaRPr lang="nl-NL" sz="1100">
-                        <a:effectLst/>
-                        <a:latin typeface="Calibri"/>
-                        <a:ea typeface="Calibri"/>
-                        <a:cs typeface="Times New Roman"/>
-                      </a:endParaRPr>
-                    </a:p>
-                  </a:txBody>
-                  <a:tcPr marL="68580" marR="68580" marT="0" marB="0"/>
-                </a:tc>
-                <a:tc>
-                  <a:txBody>
-                    <a:bodyPr/>
-                    <a:lstStyle/>
-                    <a:p>
-                      <a:pPr>
-                        <a:lnSpc>
-                          <a:spcPct val="115000"/>
-                        </a:lnSpc>
-                        <a:spcAft>
-                          <a:spcPts val="0"/>
-                        </a:spcAft>
-                      </a:pPr>
-                      <a:r>
-                        <a:rPr lang="nl-NL" sz="1200" baseline="-25000">
-                          <a:effectLst/>
-                        </a:rPr>
-                        <a:t> </a:t>
-                      </a:r>
-                      <a:endParaRPr lang="nl-NL" sz="1100">
-                        <a:effectLst/>
-                        <a:latin typeface="Calibri"/>
-                        <a:ea typeface="Calibri"/>
-                        <a:cs typeface="Times New Roman"/>
-                      </a:endParaRPr>
-                    </a:p>
-                  </a:txBody>
-                  <a:tcPr marL="68580" marR="68580" marT="0" marB="0"/>
-                </a:tc>
-                <a:tc>
-                  <a:txBody>
-                    <a:bodyPr/>
-                    <a:lstStyle/>
-                    <a:p>
-                      <a:pPr>
-                        <a:lnSpc>
-                          <a:spcPct val="115000"/>
-                        </a:lnSpc>
-                        <a:spcAft>
-                          <a:spcPts val="0"/>
-                        </a:spcAft>
-                      </a:pPr>
-                      <a:r>
-                        <a:rPr lang="nl-NL" sz="1200" baseline="-25000">
-                          <a:effectLst/>
-                        </a:rPr>
-                        <a:t> </a:t>
-                      </a:r>
-                      <a:endParaRPr lang="nl-NL" sz="1100">
-                        <a:effectLst/>
-                        <a:latin typeface="Calibri"/>
-                        <a:ea typeface="Calibri"/>
-                        <a:cs typeface="Times New Roman"/>
-                      </a:endParaRPr>
-                    </a:p>
-                  </a:txBody>
-                  <a:tcPr marL="68580" marR="68580" marT="0" marB="0"/>
-                </a:tc>
-                <a:tc>
-                  <a:txBody>
-                    <a:bodyPr/>
-                    <a:lstStyle/>
-                    <a:p>
-                      <a:pPr>
-                        <a:lnSpc>
-                          <a:spcPct val="115000"/>
-                        </a:lnSpc>
-                        <a:spcAft>
-                          <a:spcPts val="0"/>
-                        </a:spcAft>
-                      </a:pPr>
-                      <a:r>
-                        <a:rPr lang="nl-NL" sz="1200" baseline="-25000" dirty="0">
-                          <a:effectLst/>
-                        </a:rPr>
-                        <a:t> </a:t>
-                      </a:r>
-                      <a:endParaRPr lang="nl-NL" sz="1100" dirty="0">
+                      <a:endParaRPr lang="nl-NL" sz="1600" dirty="0">
                         <a:effectLst/>
                         <a:latin typeface="Calibri"/>
                         <a:ea typeface="Calibri"/>
@@ -8452,6 +8427,48 @@
           </a:graphicData>
         </a:graphic>
       </p:graphicFrame>
+      <p:sp>
+        <p:nvSpPr>
+          <p:cNvPr id="5" name="TextBox 4"/>
+          <p:cNvSpPr txBox="1"/>
+          <p:nvPr/>
+        </p:nvSpPr>
+        <p:spPr>
+          <a:xfrm>
+            <a:off x="1828800" y="1524000"/>
+            <a:ext cx="5086392" cy="338554"/>
+          </a:xfrm>
+          <a:prstGeom prst="rect">
+            <a:avLst/>
+          </a:prstGeom>
+          <a:noFill/>
+        </p:spPr>
+        <p:txBody>
+          <a:bodyPr wrap="none" rtlCol="0">
+            <a:spAutoFit/>
+          </a:bodyPr>
+          <a:lstStyle/>
+          <a:p>
+            <a:r>
+              <a:rPr lang="nl-NL" sz="1600" dirty="0" smtClean="0">
+                <a:solidFill>
+                  <a:schemeClr val="bg1">
+                    <a:lumMod val="50000"/>
+                  </a:schemeClr>
+                </a:solidFill>
+              </a:rPr>
+              <a:t>Pseudorandom		     Relatief goed geplaatst</a:t>
+            </a:r>
+            <a:endParaRPr lang="nl-NL" sz="1600" dirty="0">
+              <a:solidFill>
+                <a:schemeClr val="bg1">
+                  <a:lumMod val="50000"/>
+                </a:schemeClr>
+              </a:solidFill>
+            </a:endParaRPr>
+          </a:p>
+        </p:txBody>
+      </p:sp>
     </p:spTree>
     <p:extLst>
       <p:ext uri="{BB962C8B-B14F-4D97-AF65-F5344CB8AC3E}">

</xml_diff>